<commit_message>
Update Presentation for missing test
</commit_message>
<xml_diff>
--- a/documentation/P3 Presentation.pptx
+++ b/documentation/P3 Presentation.pptx
@@ -781,7 +781,7 @@
   <p:cSld>
     <p:spTree>
       <p:nvGrpSpPr>
-        <p:cNvPr id="127" name="Shape 127"/>
+        <p:cNvPr id="128" name="Shape 128"/>
         <p:cNvGrpSpPr/>
         <p:nvPr/>
       </p:nvGrpSpPr>
@@ -795,7 +795,7 @@
       </p:grpSpPr>
       <p:sp>
         <p:nvSpPr>
-          <p:cNvPr id="128" name="Shape 128"/>
+          <p:cNvPr id="129" name="Shape 129"/>
           <p:cNvSpPr/>
           <p:nvPr>
             <p:ph idx="2" type="sldImg"/>
@@ -829,7 +829,7 @@
       </p:sp>
       <p:sp>
         <p:nvSpPr>
-          <p:cNvPr id="129" name="Shape 129"/>
+          <p:cNvPr id="130" name="Shape 130"/>
           <p:cNvSpPr txBox="1"/>
           <p:nvPr>
             <p:ph idx="1" type="body"/>
@@ -5418,7 +5418,7 @@
         </p:nvSpPr>
         <p:spPr>
           <a:xfrm>
-            <a:off x="311700" y="114700"/>
+            <a:off x="285575" y="179950"/>
             <a:ext cx="8520600" cy="572700"/>
           </a:xfrm>
           <a:prstGeom prst="rect">
@@ -5474,7 +5474,7 @@
         </p:nvSpPr>
         <p:spPr>
           <a:xfrm>
-            <a:off x="411225" y="900775"/>
+            <a:off x="311700" y="1190000"/>
             <a:ext cx="4319700" cy="3883800"/>
           </a:xfrm>
           <a:prstGeom prst="rect">
@@ -5736,7 +5736,7 @@
         </p:nvSpPr>
         <p:spPr>
           <a:xfrm>
-            <a:off x="4479875" y="274150"/>
+            <a:off x="3135275" y="718025"/>
             <a:ext cx="4150200" cy="1060200"/>
           </a:xfrm>
           <a:prstGeom prst="rect">
@@ -5982,8 +5982,8 @@
         </p:nvSpPr>
         <p:spPr>
           <a:xfrm>
-            <a:off x="4479875" y="3361550"/>
-            <a:ext cx="3384300" cy="1586100"/>
+            <a:off x="6024700" y="2930800"/>
+            <a:ext cx="3090000" cy="1586100"/>
           </a:xfrm>
           <a:prstGeom prst="rect">
             <a:avLst/>
@@ -6217,6 +6217,165 @@
               <a:t/>
             </a:r>
             <a:endParaRPr sz="1200"/>
+          </a:p>
+        </p:txBody>
+      </p:sp>
+      <p:sp>
+        <p:nvSpPr>
+          <p:cNvPr id="127" name="Shape 127"/>
+          <p:cNvSpPr txBox="1"/>
+          <p:nvPr/>
+        </p:nvSpPr>
+        <p:spPr>
+          <a:xfrm>
+            <a:off x="5918400" y="228475"/>
+            <a:ext cx="2913900" cy="705000"/>
+          </a:xfrm>
+          <a:prstGeom prst="rect">
+            <a:avLst/>
+          </a:prstGeom>
+          <a:noFill/>
+          <a:ln>
+            <a:noFill/>
+          </a:ln>
+        </p:spPr>
+        <p:txBody>
+          <a:bodyPr anchorCtr="0" anchor="t" bIns="91425" lIns="91425" rIns="91425" wrap="square" tIns="91425">
+            <a:noAutofit/>
+          </a:bodyPr>
+          <a:lstStyle/>
+          <a:p>
+            <a:pPr indent="0" lvl="0" marL="0" rtl="0">
+              <a:lnSpc>
+                <a:spcPct val="115000"/>
+              </a:lnSpc>
+              <a:spcBef>
+                <a:spcPts val="0"/>
+              </a:spcBef>
+              <a:buNone/>
+            </a:pPr>
+            <a:r>
+              <a:rPr b="1" lang="es" sz="1100">
+                <a:solidFill>
+                  <a:schemeClr val="dk1"/>
+                </a:solidFill>
+              </a:rPr>
+              <a:t>TestAccountHandler</a:t>
+            </a:r>
+          </a:p>
+          <a:p>
+            <a:pPr indent="457200" lvl="0" marL="0" rtl="0">
+              <a:lnSpc>
+                <a:spcPct val="115000"/>
+              </a:lnSpc>
+              <a:spcBef>
+                <a:spcPts val="0"/>
+              </a:spcBef>
+              <a:buNone/>
+            </a:pPr>
+            <a:r>
+              <a:rPr lang="es" sz="1100">
+                <a:solidFill>
+                  <a:schemeClr val="dk1"/>
+                </a:solidFill>
+              </a:rPr>
+              <a:t>testRegisterUser</a:t>
+            </a:r>
+          </a:p>
+          <a:p>
+            <a:pPr indent="457200" lvl="0" marL="0" rtl="0">
+              <a:lnSpc>
+                <a:spcPct val="115000"/>
+              </a:lnSpc>
+              <a:spcBef>
+                <a:spcPts val="0"/>
+              </a:spcBef>
+              <a:buNone/>
+            </a:pPr>
+            <a:r>
+              <a:rPr lang="es" sz="1100">
+                <a:solidFill>
+                  <a:schemeClr val="dk1"/>
+                </a:solidFill>
+              </a:rPr>
+              <a:t>testRegisterUserAlreadyRegistered</a:t>
+            </a:r>
+          </a:p>
+          <a:p>
+            <a:pPr indent="457200" lvl="0" marL="0" rtl="0">
+              <a:lnSpc>
+                <a:spcPct val="115000"/>
+              </a:lnSpc>
+              <a:spcBef>
+                <a:spcPts val="0"/>
+              </a:spcBef>
+              <a:buNone/>
+            </a:pPr>
+            <a:r>
+              <a:rPr lang="es" sz="1100">
+                <a:solidFill>
+                  <a:schemeClr val="dk1"/>
+                </a:solidFill>
+              </a:rPr>
+              <a:t>testRegisterUserFailure</a:t>
+            </a:r>
+          </a:p>
+          <a:p>
+            <a:pPr indent="457200" lvl="0" marL="0" rtl="0">
+              <a:lnSpc>
+                <a:spcPct val="115000"/>
+              </a:lnSpc>
+              <a:spcBef>
+                <a:spcPts val="0"/>
+              </a:spcBef>
+              <a:buNone/>
+            </a:pPr>
+            <a:r>
+              <a:rPr lang="es" sz="1100">
+                <a:solidFill>
+                  <a:schemeClr val="dk1"/>
+                </a:solidFill>
+              </a:rPr>
+              <a:t>testUnregisterUser</a:t>
+            </a:r>
+          </a:p>
+          <a:p>
+            <a:pPr indent="457200" lvl="0" marL="0" rtl="0">
+              <a:lnSpc>
+                <a:spcPct val="115000"/>
+              </a:lnSpc>
+              <a:spcBef>
+                <a:spcPts val="0"/>
+              </a:spcBef>
+              <a:buNone/>
+            </a:pPr>
+            <a:r>
+              <a:rPr lang="es" sz="1100">
+                <a:solidFill>
+                  <a:schemeClr val="dk1"/>
+                </a:solidFill>
+              </a:rPr>
+              <a:t>testValidateLogin</a:t>
+            </a:r>
+          </a:p>
+          <a:p>
+            <a:pPr indent="457200" lvl="0" marL="0" rtl="0">
+              <a:lnSpc>
+                <a:spcPct val="115000"/>
+              </a:lnSpc>
+              <a:spcBef>
+                <a:spcPts val="0"/>
+              </a:spcBef>
+              <a:buNone/>
+            </a:pPr>
+            <a:r>
+              <a:rPr lang="es" sz="1100">
+                <a:solidFill>
+                  <a:schemeClr val="dk1"/>
+                </a:solidFill>
+              </a:rPr>
+              <a:t>testLogout</a:t>
+            </a:r>
           </a:p>
         </p:txBody>
       </p:sp>
@@ -6240,7 +6399,7 @@
     </p:bg>
     <p:spTree>
       <p:nvGrpSpPr>
-        <p:cNvPr id="130" name="Shape 130"/>
+        <p:cNvPr id="131" name="Shape 131"/>
         <p:cNvGrpSpPr/>
         <p:nvPr/>
       </p:nvGrpSpPr>
@@ -6254,7 +6413,7 @@
       </p:grpSpPr>
       <p:sp>
         <p:nvSpPr>
-          <p:cNvPr id="131" name="Shape 131"/>
+          <p:cNvPr id="132" name="Shape 132"/>
           <p:cNvSpPr txBox="1"/>
           <p:nvPr/>
         </p:nvSpPr>
@@ -7320,6 +7479,285 @@
 </file>
 
 <file path=ppt/theme/theme1.xml><?xml version="1.0" encoding="utf-8"?>
+<a:theme xmlns:a="http://schemas.openxmlformats.org/drawingml/2006/main" xmlns:r="http://schemas.openxmlformats.org/officeDocument/2006/relationships" name="Custom Theme">
+  <a:themeElements>
+    <a:clrScheme name="Default">
+      <a:dk1>
+        <a:srgbClr val="000000"/>
+      </a:dk1>
+      <a:lt1>
+        <a:srgbClr val="FFFFFF"/>
+      </a:lt1>
+      <a:dk2>
+        <a:srgbClr val="158158"/>
+      </a:dk2>
+      <a:lt2>
+        <a:srgbClr val="F3F3F3"/>
+      </a:lt2>
+      <a:accent1>
+        <a:srgbClr val="058DC7"/>
+      </a:accent1>
+      <a:accent2>
+        <a:srgbClr val="50B432"/>
+      </a:accent2>
+      <a:accent3>
+        <a:srgbClr val="ED561B"/>
+      </a:accent3>
+      <a:accent4>
+        <a:srgbClr val="EDEF00"/>
+      </a:accent4>
+      <a:accent5>
+        <a:srgbClr val="24CBE5"/>
+      </a:accent5>
+      <a:accent6>
+        <a:srgbClr val="64E572"/>
+      </a:accent6>
+      <a:hlink>
+        <a:srgbClr val="2200CC"/>
+      </a:hlink>
+      <a:folHlink>
+        <a:srgbClr val="551A8B"/>
+      </a:folHlink>
+    </a:clrScheme>
+    <a:fontScheme name="Office">
+      <a:majorFont>
+        <a:latin typeface="Arial"/>
+        <a:ea typeface=""/>
+        <a:cs typeface=""/>
+        <a:font script="Jpan" typeface="ＭＳ Ｐゴシック"/>
+        <a:font script="Hang" typeface="맑은 고딕"/>
+        <a:font script="Hans" typeface="宋体"/>
+        <a:font script="Hant" typeface="新細明體"/>
+        <a:font script="Arab" typeface="Times New Roman"/>
+        <a:font script="Hebr" typeface="Times New Roman"/>
+        <a:font script="Thai" typeface="Angsana New"/>
+        <a:font script="Ethi" typeface="Nyala"/>
+        <a:font script="Beng" typeface="Vrinda"/>
+        <a:font script="Gujr" typeface="Shruti"/>
+        <a:font script="Khmr" typeface="MoolBoran"/>
+        <a:font script="Knda" typeface="Tunga"/>
+        <a:font script="Guru" typeface="Raavi"/>
+        <a:font script="Cans" typeface="Euphemia"/>
+        <a:font script="Cher" typeface="Plantagenet Cherokee"/>
+        <a:font script="Yiii" typeface="Microsoft Yi Baiti"/>
+        <a:font script="Tibt" typeface="Microsoft Himalaya"/>
+        <a:font script="Thaa" typeface="MV Boli"/>
+        <a:font script="Deva" typeface="Mangal"/>
+        <a:font script="Telu" typeface="Gautami"/>
+        <a:font script="Taml" typeface="Latha"/>
+        <a:font script="Syrc" typeface="Estrangelo Edessa"/>
+        <a:font script="Orya" typeface="Kalinga"/>
+        <a:font script="Mlym" typeface="Kartika"/>
+        <a:font script="Laoo" typeface="DokChampa"/>
+        <a:font script="Sinh" typeface="Iskoola Pota"/>
+        <a:font script="Mong" typeface="Mongolian Baiti"/>
+        <a:font script="Viet" typeface="Times New Roman"/>
+        <a:font script="Uigh" typeface="Microsoft Uighur"/>
+        <a:font script="Geor" typeface="Sylfaen"/>
+      </a:majorFont>
+      <a:minorFont>
+        <a:latin typeface="Arial"/>
+        <a:ea typeface=""/>
+        <a:cs typeface=""/>
+        <a:font script="Jpan" typeface="ＭＳ Ｐゴシック"/>
+        <a:font script="Hang" typeface="맑은 고딕"/>
+        <a:font script="Hans" typeface="宋体"/>
+        <a:font script="Hant" typeface="新細明體"/>
+        <a:font script="Arab" typeface="Arial"/>
+        <a:font script="Hebr" typeface="Arial"/>
+        <a:font script="Thai" typeface="Cordia New"/>
+        <a:font script="Ethi" typeface="Nyala"/>
+        <a:font script="Beng" typeface="Vrinda"/>
+        <a:font script="Gujr" typeface="Shruti"/>
+        <a:font script="Khmr" typeface="DaunPenh"/>
+        <a:font script="Knda" typeface="Tunga"/>
+        <a:font script="Guru" typeface="Raavi"/>
+        <a:font script="Cans" typeface="Euphemia"/>
+        <a:font script="Cher" typeface="Plantagenet Cherokee"/>
+        <a:font script="Yiii" typeface="Microsoft Yi Baiti"/>
+        <a:font script="Tibt" typeface="Microsoft Himalaya"/>
+        <a:font script="Thaa" typeface="MV Boli"/>
+        <a:font script="Deva" typeface="Mangal"/>
+        <a:font script="Telu" typeface="Gautami"/>
+        <a:font script="Taml" typeface="Latha"/>
+        <a:font script="Syrc" typeface="Estrangelo Edessa"/>
+        <a:font script="Orya" typeface="Kalinga"/>
+        <a:font script="Mlym" typeface="Kartika"/>
+        <a:font script="Laoo" typeface="DokChampa"/>
+        <a:font script="Sinh" typeface="Iskoola Pota"/>
+        <a:font script="Mong" typeface="Mongolian Baiti"/>
+        <a:font script="Viet" typeface="Arial"/>
+        <a:font script="Uigh" typeface="Microsoft Uighur"/>
+        <a:font script="Geor" typeface="Sylfaen"/>
+      </a:minorFont>
+    </a:fontScheme>
+    <a:fmtScheme name="Office">
+      <a:fillStyleLst>
+        <a:solidFill>
+          <a:schemeClr val="phClr"/>
+        </a:solidFill>
+        <a:gradFill rotWithShape="1">
+          <a:gsLst>
+            <a:gs pos="0">
+              <a:schemeClr val="phClr">
+                <a:tint val="50000"/>
+                <a:satMod val="300000"/>
+              </a:schemeClr>
+            </a:gs>
+            <a:gs pos="35000">
+              <a:schemeClr val="phClr">
+                <a:tint val="37000"/>
+                <a:satMod val="300000"/>
+              </a:schemeClr>
+            </a:gs>
+            <a:gs pos="100000">
+              <a:schemeClr val="phClr">
+                <a:tint val="15000"/>
+                <a:satMod val="350000"/>
+              </a:schemeClr>
+            </a:gs>
+          </a:gsLst>
+          <a:lin ang="16200000" scaled="1"/>
+        </a:gradFill>
+        <a:gradFill rotWithShape="1">
+          <a:gsLst>
+            <a:gs pos="0">
+              <a:schemeClr val="phClr">
+                <a:tint val="100000"/>
+                <a:shade val="100000"/>
+                <a:satMod val="130000"/>
+              </a:schemeClr>
+            </a:gs>
+            <a:gs pos="100000">
+              <a:schemeClr val="phClr">
+                <a:tint val="50000"/>
+                <a:shade val="100000"/>
+                <a:satMod val="350000"/>
+              </a:schemeClr>
+            </a:gs>
+          </a:gsLst>
+          <a:lin ang="16200000" scaled="0"/>
+        </a:gradFill>
+      </a:fillStyleLst>
+      <a:lnStyleLst>
+        <a:ln w="9525" cap="flat" cmpd="sng" algn="ctr">
+          <a:solidFill>
+            <a:schemeClr val="phClr">
+              <a:shade val="95000"/>
+              <a:satMod val="105000"/>
+            </a:schemeClr>
+          </a:solidFill>
+          <a:prstDash val="solid"/>
+        </a:ln>
+        <a:ln w="25400" cap="flat" cmpd="sng" algn="ctr">
+          <a:solidFill>
+            <a:schemeClr val="phClr"/>
+          </a:solidFill>
+          <a:prstDash val="solid"/>
+        </a:ln>
+        <a:ln w="38100" cap="flat" cmpd="sng" algn="ctr">
+          <a:solidFill>
+            <a:schemeClr val="phClr"/>
+          </a:solidFill>
+          <a:prstDash val="solid"/>
+        </a:ln>
+      </a:lnStyleLst>
+      <a:effectStyleLst>
+        <a:effectStyle>
+          <a:effectLst>
+            <a:outerShdw blurRad="40000" dist="20000" dir="5400000" rotWithShape="0">
+              <a:srgbClr val="000000">
+                <a:alpha val="38000"/>
+              </a:srgbClr>
+            </a:outerShdw>
+          </a:effectLst>
+        </a:effectStyle>
+        <a:effectStyle>
+          <a:effectLst>
+            <a:outerShdw blurRad="40000" dist="23000" dir="5400000" rotWithShape="0">
+              <a:srgbClr val="000000">
+                <a:alpha val="35000"/>
+              </a:srgbClr>
+            </a:outerShdw>
+          </a:effectLst>
+        </a:effectStyle>
+        <a:effectStyle>
+          <a:effectLst>
+            <a:outerShdw blurRad="40000" dist="23000" dir="5400000" rotWithShape="0">
+              <a:srgbClr val="000000">
+                <a:alpha val="35000"/>
+              </a:srgbClr>
+            </a:outerShdw>
+          </a:effectLst>
+          <a:scene3d>
+            <a:camera prst="orthographicFront">
+              <a:rot lat="0" lon="0" rev="0"/>
+            </a:camera>
+            <a:lightRig rig="threePt" dir="t">
+              <a:rot lat="0" lon="0" rev="1200000"/>
+            </a:lightRig>
+          </a:scene3d>
+          <a:sp3d>
+            <a:bevelT w="63500" h="25400"/>
+          </a:sp3d>
+        </a:effectStyle>
+      </a:effectStyleLst>
+      <a:bgFillStyleLst>
+        <a:solidFill>
+          <a:schemeClr val="phClr"/>
+        </a:solidFill>
+        <a:gradFill rotWithShape="1">
+          <a:gsLst>
+            <a:gs pos="0">
+              <a:schemeClr val="phClr">
+                <a:tint val="40000"/>
+                <a:satMod val="350000"/>
+              </a:schemeClr>
+            </a:gs>
+            <a:gs pos="40000">
+              <a:schemeClr val="phClr">
+                <a:tint val="45000"/>
+                <a:shade val="99000"/>
+                <a:satMod val="350000"/>
+              </a:schemeClr>
+            </a:gs>
+            <a:gs pos="100000">
+              <a:schemeClr val="phClr">
+                <a:shade val="20000"/>
+                <a:satMod val="255000"/>
+              </a:schemeClr>
+            </a:gs>
+          </a:gsLst>
+          <a:path path="circle">
+            <a:fillToRect l="50000" t="-80000" r="50000" b="180000"/>
+          </a:path>
+        </a:gradFill>
+        <a:gradFill rotWithShape="1">
+          <a:gsLst>
+            <a:gs pos="0">
+              <a:schemeClr val="phClr">
+                <a:tint val="80000"/>
+                <a:satMod val="300000"/>
+              </a:schemeClr>
+            </a:gs>
+            <a:gs pos="100000">
+              <a:schemeClr val="phClr">
+                <a:shade val="30000"/>
+                <a:satMod val="200000"/>
+              </a:schemeClr>
+            </a:gs>
+          </a:gsLst>
+          <a:path path="circle">
+            <a:fillToRect l="50000" t="50000" r="50000" b="50000"/>
+          </a:path>
+        </a:gradFill>
+      </a:bgFillStyleLst>
+    </a:fmtScheme>
+  </a:themeElements>
+</a:theme>
+</file>
+
+<file path=ppt/theme/theme2.xml><?xml version="1.0" encoding="utf-8"?>
 <a:theme xmlns:a="http://schemas.openxmlformats.org/drawingml/2006/main" xmlns:r="http://schemas.openxmlformats.org/officeDocument/2006/relationships" name="Simple Light">
   <a:themeElements>
     <a:clrScheme name="Simple Light">
@@ -7596,283 +8034,4 @@
     </a:fmtScheme>
   </a:themeElements>
 </a:theme>
-</file>
-
-<file path=ppt/theme/theme2.xml><?xml version="1.0" encoding="utf-8"?>
-<a:theme xmlns:a="http://schemas.openxmlformats.org/drawingml/2006/main" xmlns:r="http://schemas.openxmlformats.org/officeDocument/2006/relationships" name="Custom Theme">
-  <a:themeElements>
-    <a:clrScheme name="Default">
-      <a:dk1>
-        <a:srgbClr val="000000"/>
-      </a:dk1>
-      <a:lt1>
-        <a:srgbClr val="FFFFFF"/>
-      </a:lt1>
-      <a:dk2>
-        <a:srgbClr val="158158"/>
-      </a:dk2>
-      <a:lt2>
-        <a:srgbClr val="F3F3F3"/>
-      </a:lt2>
-      <a:accent1>
-        <a:srgbClr val="058DC7"/>
-      </a:accent1>
-      <a:accent2>
-        <a:srgbClr val="50B432"/>
-      </a:accent2>
-      <a:accent3>
-        <a:srgbClr val="ED561B"/>
-      </a:accent3>
-      <a:accent4>
-        <a:srgbClr val="EDEF00"/>
-      </a:accent4>
-      <a:accent5>
-        <a:srgbClr val="24CBE5"/>
-      </a:accent5>
-      <a:accent6>
-        <a:srgbClr val="64E572"/>
-      </a:accent6>
-      <a:hlink>
-        <a:srgbClr val="2200CC"/>
-      </a:hlink>
-      <a:folHlink>
-        <a:srgbClr val="551A8B"/>
-      </a:folHlink>
-    </a:clrScheme>
-    <a:fontScheme name="Office">
-      <a:majorFont>
-        <a:latin typeface="Arial"/>
-        <a:ea typeface=""/>
-        <a:cs typeface=""/>
-        <a:font script="Jpan" typeface="ＭＳ Ｐゴシック"/>
-        <a:font script="Hang" typeface="맑은 고딕"/>
-        <a:font script="Hans" typeface="宋体"/>
-        <a:font script="Hant" typeface="新細明體"/>
-        <a:font script="Arab" typeface="Times New Roman"/>
-        <a:font script="Hebr" typeface="Times New Roman"/>
-        <a:font script="Thai" typeface="Angsana New"/>
-        <a:font script="Ethi" typeface="Nyala"/>
-        <a:font script="Beng" typeface="Vrinda"/>
-        <a:font script="Gujr" typeface="Shruti"/>
-        <a:font script="Khmr" typeface="MoolBoran"/>
-        <a:font script="Knda" typeface="Tunga"/>
-        <a:font script="Guru" typeface="Raavi"/>
-        <a:font script="Cans" typeface="Euphemia"/>
-        <a:font script="Cher" typeface="Plantagenet Cherokee"/>
-        <a:font script="Yiii" typeface="Microsoft Yi Baiti"/>
-        <a:font script="Tibt" typeface="Microsoft Himalaya"/>
-        <a:font script="Thaa" typeface="MV Boli"/>
-        <a:font script="Deva" typeface="Mangal"/>
-        <a:font script="Telu" typeface="Gautami"/>
-        <a:font script="Taml" typeface="Latha"/>
-        <a:font script="Syrc" typeface="Estrangelo Edessa"/>
-        <a:font script="Orya" typeface="Kalinga"/>
-        <a:font script="Mlym" typeface="Kartika"/>
-        <a:font script="Laoo" typeface="DokChampa"/>
-        <a:font script="Sinh" typeface="Iskoola Pota"/>
-        <a:font script="Mong" typeface="Mongolian Baiti"/>
-        <a:font script="Viet" typeface="Times New Roman"/>
-        <a:font script="Uigh" typeface="Microsoft Uighur"/>
-        <a:font script="Geor" typeface="Sylfaen"/>
-      </a:majorFont>
-      <a:minorFont>
-        <a:latin typeface="Arial"/>
-        <a:ea typeface=""/>
-        <a:cs typeface=""/>
-        <a:font script="Jpan" typeface="ＭＳ Ｐゴシック"/>
-        <a:font script="Hang" typeface="맑은 고딕"/>
-        <a:font script="Hans" typeface="宋体"/>
-        <a:font script="Hant" typeface="新細明體"/>
-        <a:font script="Arab" typeface="Arial"/>
-        <a:font script="Hebr" typeface="Arial"/>
-        <a:font script="Thai" typeface="Cordia New"/>
-        <a:font script="Ethi" typeface="Nyala"/>
-        <a:font script="Beng" typeface="Vrinda"/>
-        <a:font script="Gujr" typeface="Shruti"/>
-        <a:font script="Khmr" typeface="DaunPenh"/>
-        <a:font script="Knda" typeface="Tunga"/>
-        <a:font script="Guru" typeface="Raavi"/>
-        <a:font script="Cans" typeface="Euphemia"/>
-        <a:font script="Cher" typeface="Plantagenet Cherokee"/>
-        <a:font script="Yiii" typeface="Microsoft Yi Baiti"/>
-        <a:font script="Tibt" typeface="Microsoft Himalaya"/>
-        <a:font script="Thaa" typeface="MV Boli"/>
-        <a:font script="Deva" typeface="Mangal"/>
-        <a:font script="Telu" typeface="Gautami"/>
-        <a:font script="Taml" typeface="Latha"/>
-        <a:font script="Syrc" typeface="Estrangelo Edessa"/>
-        <a:font script="Orya" typeface="Kalinga"/>
-        <a:font script="Mlym" typeface="Kartika"/>
-        <a:font script="Laoo" typeface="DokChampa"/>
-        <a:font script="Sinh" typeface="Iskoola Pota"/>
-        <a:font script="Mong" typeface="Mongolian Baiti"/>
-        <a:font script="Viet" typeface="Arial"/>
-        <a:font script="Uigh" typeface="Microsoft Uighur"/>
-        <a:font script="Geor" typeface="Sylfaen"/>
-      </a:minorFont>
-    </a:fontScheme>
-    <a:fmtScheme name="Office">
-      <a:fillStyleLst>
-        <a:solidFill>
-          <a:schemeClr val="phClr"/>
-        </a:solidFill>
-        <a:gradFill rotWithShape="1">
-          <a:gsLst>
-            <a:gs pos="0">
-              <a:schemeClr val="phClr">
-                <a:tint val="50000"/>
-                <a:satMod val="300000"/>
-              </a:schemeClr>
-            </a:gs>
-            <a:gs pos="35000">
-              <a:schemeClr val="phClr">
-                <a:tint val="37000"/>
-                <a:satMod val="300000"/>
-              </a:schemeClr>
-            </a:gs>
-            <a:gs pos="100000">
-              <a:schemeClr val="phClr">
-                <a:tint val="15000"/>
-                <a:satMod val="350000"/>
-              </a:schemeClr>
-            </a:gs>
-          </a:gsLst>
-          <a:lin ang="16200000" scaled="1"/>
-        </a:gradFill>
-        <a:gradFill rotWithShape="1">
-          <a:gsLst>
-            <a:gs pos="0">
-              <a:schemeClr val="phClr">
-                <a:tint val="100000"/>
-                <a:shade val="100000"/>
-                <a:satMod val="130000"/>
-              </a:schemeClr>
-            </a:gs>
-            <a:gs pos="100000">
-              <a:schemeClr val="phClr">
-                <a:tint val="50000"/>
-                <a:shade val="100000"/>
-                <a:satMod val="350000"/>
-              </a:schemeClr>
-            </a:gs>
-          </a:gsLst>
-          <a:lin ang="16200000" scaled="0"/>
-        </a:gradFill>
-      </a:fillStyleLst>
-      <a:lnStyleLst>
-        <a:ln w="9525" cap="flat" cmpd="sng" algn="ctr">
-          <a:solidFill>
-            <a:schemeClr val="phClr">
-              <a:shade val="95000"/>
-              <a:satMod val="105000"/>
-            </a:schemeClr>
-          </a:solidFill>
-          <a:prstDash val="solid"/>
-        </a:ln>
-        <a:ln w="25400" cap="flat" cmpd="sng" algn="ctr">
-          <a:solidFill>
-            <a:schemeClr val="phClr"/>
-          </a:solidFill>
-          <a:prstDash val="solid"/>
-        </a:ln>
-        <a:ln w="38100" cap="flat" cmpd="sng" algn="ctr">
-          <a:solidFill>
-            <a:schemeClr val="phClr"/>
-          </a:solidFill>
-          <a:prstDash val="solid"/>
-        </a:ln>
-      </a:lnStyleLst>
-      <a:effectStyleLst>
-        <a:effectStyle>
-          <a:effectLst>
-            <a:outerShdw blurRad="40000" dist="20000" dir="5400000" rotWithShape="0">
-              <a:srgbClr val="000000">
-                <a:alpha val="38000"/>
-              </a:srgbClr>
-            </a:outerShdw>
-          </a:effectLst>
-        </a:effectStyle>
-        <a:effectStyle>
-          <a:effectLst>
-            <a:outerShdw blurRad="40000" dist="23000" dir="5400000" rotWithShape="0">
-              <a:srgbClr val="000000">
-                <a:alpha val="35000"/>
-              </a:srgbClr>
-            </a:outerShdw>
-          </a:effectLst>
-        </a:effectStyle>
-        <a:effectStyle>
-          <a:effectLst>
-            <a:outerShdw blurRad="40000" dist="23000" dir="5400000" rotWithShape="0">
-              <a:srgbClr val="000000">
-                <a:alpha val="35000"/>
-              </a:srgbClr>
-            </a:outerShdw>
-          </a:effectLst>
-          <a:scene3d>
-            <a:camera prst="orthographicFront">
-              <a:rot lat="0" lon="0" rev="0"/>
-            </a:camera>
-            <a:lightRig rig="threePt" dir="t">
-              <a:rot lat="0" lon="0" rev="1200000"/>
-            </a:lightRig>
-          </a:scene3d>
-          <a:sp3d>
-            <a:bevelT w="63500" h="25400"/>
-          </a:sp3d>
-        </a:effectStyle>
-      </a:effectStyleLst>
-      <a:bgFillStyleLst>
-        <a:solidFill>
-          <a:schemeClr val="phClr"/>
-        </a:solidFill>
-        <a:gradFill rotWithShape="1">
-          <a:gsLst>
-            <a:gs pos="0">
-              <a:schemeClr val="phClr">
-                <a:tint val="40000"/>
-                <a:satMod val="350000"/>
-              </a:schemeClr>
-            </a:gs>
-            <a:gs pos="40000">
-              <a:schemeClr val="phClr">
-                <a:tint val="45000"/>
-                <a:shade val="99000"/>
-                <a:satMod val="350000"/>
-              </a:schemeClr>
-            </a:gs>
-            <a:gs pos="100000">
-              <a:schemeClr val="phClr">
-                <a:shade val="20000"/>
-                <a:satMod val="255000"/>
-              </a:schemeClr>
-            </a:gs>
-          </a:gsLst>
-          <a:path path="circle">
-            <a:fillToRect l="50000" t="-80000" r="50000" b="180000"/>
-          </a:path>
-        </a:gradFill>
-        <a:gradFill rotWithShape="1">
-          <a:gsLst>
-            <a:gs pos="0">
-              <a:schemeClr val="phClr">
-                <a:tint val="80000"/>
-                <a:satMod val="300000"/>
-              </a:schemeClr>
-            </a:gs>
-            <a:gs pos="100000">
-              <a:schemeClr val="phClr">
-                <a:shade val="30000"/>
-                <a:satMod val="200000"/>
-              </a:schemeClr>
-            </a:gs>
-          </a:gsLst>
-          <a:path path="circle">
-            <a:fillToRect l="50000" t="50000" r="50000" b="50000"/>
-          </a:path>
-        </a:gradFill>
-      </a:bgFillStyleLst>
-    </a:fmtScheme>
-  </a:themeElements>
-</a:theme>
 </file>
</xml_diff>

<commit_message>
Add slide for Demo before Questions
</commit_message>
<xml_diff>
--- a/documentation/P3 Presentation.pptx
+++ b/documentation/P3 Presentation.pptx
@@ -21,6 +21,7 @@
     <p:sldId id="266" r:id="rId15"/>
     <p:sldId id="267" r:id="rId16"/>
     <p:sldId id="268" r:id="rId17"/>
+    <p:sldId id="269" r:id="rId18"/>
   </p:sldIdLst>
   <p:sldSz cy="5143500" cx="9144000"/>
   <p:notesSz cx="6858000" cy="9144000"/>
@@ -830,6 +831,101 @@
       <p:sp>
         <p:nvSpPr>
           <p:cNvPr id="130" name="Shape 130"/>
+          <p:cNvSpPr txBox="1"/>
+          <p:nvPr>
+            <p:ph idx="1" type="body"/>
+          </p:nvPr>
+        </p:nvSpPr>
+        <p:spPr>
+          <a:xfrm>
+            <a:off x="685800" y="4343400"/>
+            <a:ext cx="5486400" cy="4114800"/>
+          </a:xfrm>
+          <a:prstGeom prst="rect">
+            <a:avLst/>
+          </a:prstGeom>
+        </p:spPr>
+        <p:txBody>
+          <a:bodyPr anchorCtr="0" anchor="t" bIns="91425" lIns="91425" rIns="91425" wrap="square" tIns="91425">
+            <a:noAutofit/>
+          </a:bodyPr>
+          <a:lstStyle/>
+          <a:p>
+            <a:pPr lvl="0" rtl="0">
+              <a:spcBef>
+                <a:spcPts val="0"/>
+              </a:spcBef>
+              <a:buNone/>
+            </a:pPr>
+            <a:r>
+              <a:t/>
+            </a:r>
+            <a:endParaRPr/>
+          </a:p>
+        </p:txBody>
+      </p:sp>
+    </p:spTree>
+  </p:cSld>
+  <p:clrMapOvr>
+    <a:masterClrMapping/>
+  </p:clrMapOvr>
+</p:notes>
+</file>
+
+<file path=ppt/notesSlides/notesSlide14.xml><?xml version="1.0" encoding="utf-8"?>
+<p:notes xmlns:a="http://schemas.openxmlformats.org/drawingml/2006/main" xmlns:r="http://schemas.openxmlformats.org/officeDocument/2006/relationships" xmlns:mc="http://schemas.openxmlformats.org/markup-compatibility/2006" xmlns:mv="urn:schemas-microsoft-com:mac:vml" xmlns:p="http://schemas.openxmlformats.org/presentationml/2006/main" xmlns:c="http://schemas.openxmlformats.org/drawingml/2006/chart" xmlns:dgm="http://schemas.openxmlformats.org/drawingml/2006/diagram" xmlns:o="urn:schemas-microsoft-com:office:office" xmlns:v="urn:schemas-microsoft-com:vml" xmlns:pvml="urn:schemas-microsoft-com:office:powerpoint" xmlns:com="http://schemas.openxmlformats.org/drawingml/2006/compatibility" xmlns:p14="http://schemas.microsoft.com/office/powerpoint/2010/main" xmlns:p15="http://schemas.microsoft.com/office/powerpoint/2012/main" showMasterPhAnim="0" showMasterSp="0">
+  <p:cSld>
+    <p:spTree>
+      <p:nvGrpSpPr>
+        <p:cNvPr id="133" name="Shape 133"/>
+        <p:cNvGrpSpPr/>
+        <p:nvPr/>
+      </p:nvGrpSpPr>
+      <p:grpSpPr>
+        <a:xfrm>
+          <a:off x="0" y="0"/>
+          <a:ext cx="0" cy="0"/>
+          <a:chOff x="0" y="0"/>
+          <a:chExt cx="0" cy="0"/>
+        </a:xfrm>
+      </p:grpSpPr>
+      <p:sp>
+        <p:nvSpPr>
+          <p:cNvPr id="134" name="Shape 134"/>
+          <p:cNvSpPr/>
+          <p:nvPr>
+            <p:ph idx="2" type="sldImg"/>
+          </p:nvPr>
+        </p:nvSpPr>
+        <p:spPr>
+          <a:xfrm>
+            <a:off x="381300" y="685800"/>
+            <a:ext cx="6096000" cy="3429000"/>
+          </a:xfrm>
+          <a:custGeom>
+            <a:pathLst>
+              <a:path extrusionOk="0" h="120000" w="120000">
+                <a:moveTo>
+                  <a:pt x="0" y="0"/>
+                </a:moveTo>
+                <a:lnTo>
+                  <a:pt x="120000" y="0"/>
+                </a:lnTo>
+                <a:lnTo>
+                  <a:pt x="120000" y="120000"/>
+                </a:lnTo>
+                <a:lnTo>
+                  <a:pt x="0" y="120000"/>
+                </a:lnTo>
+                <a:close/>
+              </a:path>
+            </a:pathLst>
+          </a:custGeom>
+        </p:spPr>
+      </p:sp>
+      <p:sp>
+        <p:nvSpPr>
+          <p:cNvPr id="135" name="Shape 135"/>
           <p:cNvSpPr txBox="1"/>
           <p:nvPr>
             <p:ph idx="1" type="body"/>
@@ -5491,7 +5587,7 @@
           </a:bodyPr>
           <a:lstStyle/>
           <a:p>
-            <a:pPr lvl="0">
+            <a:pPr lvl="0" rtl="0">
               <a:spcBef>
                 <a:spcPts val="0"/>
               </a:spcBef>
@@ -5507,7 +5603,7 @@
             </a:r>
           </a:p>
           <a:p>
-            <a:pPr lvl="0">
+            <a:pPr lvl="0" rtl="0">
               <a:spcBef>
                 <a:spcPts val="0"/>
               </a:spcBef>
@@ -5519,7 +5615,7 @@
             </a:r>
           </a:p>
           <a:p>
-            <a:pPr lvl="0">
+            <a:pPr lvl="0" rtl="0">
               <a:spcBef>
                 <a:spcPts val="0"/>
               </a:spcBef>
@@ -5527,15 +5623,11 @@
             </a:pPr>
             <a:r>
               <a:rPr lang="es" sz="1200"/>
-              <a:t>	</a:t>
-            </a:r>
-            <a:r>
-              <a:rPr lang="es" sz="1200"/>
-              <a:t>testSetLocation_column_too_big</a:t>
-            </a:r>
-          </a:p>
-          <a:p>
-            <a:pPr lvl="0">
+              <a:t>	testSetLocation_column_too_big</a:t>
+            </a:r>
+          </a:p>
+          <a:p>
+            <a:pPr lvl="0" rtl="0">
               <a:spcBef>
                 <a:spcPts val="0"/>
               </a:spcBef>
@@ -5547,7 +5639,7 @@
             </a:r>
           </a:p>
           <a:p>
-            <a:pPr lvl="0">
+            <a:pPr lvl="0" rtl="0">
               <a:spcBef>
                 <a:spcPts val="0"/>
               </a:spcBef>
@@ -5559,7 +5651,7 @@
             </a:r>
           </a:p>
           <a:p>
-            <a:pPr lvl="0">
+            <a:pPr lvl="0" rtl="0">
               <a:spcBef>
                 <a:spcPts val="0"/>
               </a:spcBef>
@@ -5571,7 +5663,7 @@
             </a:r>
           </a:p>
           <a:p>
-            <a:pPr lvl="0">
+            <a:pPr lvl="0" rtl="0">
               <a:spcBef>
                 <a:spcPts val="0"/>
               </a:spcBef>
@@ -5583,7 +5675,7 @@
             </a:r>
           </a:p>
           <a:p>
-            <a:pPr lvl="0">
+            <a:pPr lvl="0" rtl="0">
               <a:spcBef>
                 <a:spcPts val="0"/>
               </a:spcBef>
@@ -5595,7 +5687,7 @@
             </a:r>
           </a:p>
           <a:p>
-            <a:pPr lvl="0">
+            <a:pPr lvl="0" rtl="0">
               <a:spcBef>
                 <a:spcPts val="0"/>
               </a:spcBef>
@@ -5607,7 +5699,7 @@
             </a:r>
           </a:p>
           <a:p>
-            <a:pPr lvl="0">
+            <a:pPr lvl="0" rtl="0">
               <a:spcBef>
                 <a:spcPts val="0"/>
               </a:spcBef>
@@ -5619,7 +5711,7 @@
             </a:r>
           </a:p>
           <a:p>
-            <a:pPr lvl="0">
+            <a:pPr lvl="0" rtl="0">
               <a:spcBef>
                 <a:spcPts val="0"/>
               </a:spcBef>
@@ -5631,7 +5723,7 @@
             </a:r>
           </a:p>
           <a:p>
-            <a:pPr lvl="0">
+            <a:pPr lvl="0" rtl="0">
               <a:spcBef>
                 <a:spcPts val="0"/>
               </a:spcBef>
@@ -5643,7 +5735,7 @@
             </a:r>
           </a:p>
           <a:p>
-            <a:pPr lvl="0">
+            <a:pPr lvl="0" rtl="0">
               <a:spcBef>
                 <a:spcPts val="0"/>
               </a:spcBef>
@@ -5655,7 +5747,7 @@
             </a:r>
           </a:p>
           <a:p>
-            <a:pPr lvl="0">
+            <a:pPr lvl="0" rtl="0">
               <a:spcBef>
                 <a:spcPts val="0"/>
               </a:spcBef>
@@ -5667,7 +5759,7 @@
             </a:r>
           </a:p>
           <a:p>
-            <a:pPr lvl="0">
+            <a:pPr lvl="0" rtl="0">
               <a:spcBef>
                 <a:spcPts val="0"/>
               </a:spcBef>
@@ -5679,7 +5771,7 @@
             </a:r>
           </a:p>
           <a:p>
-            <a:pPr lvl="0">
+            <a:pPr lvl="0" rtl="0">
               <a:spcBef>
                 <a:spcPts val="0"/>
               </a:spcBef>
@@ -5691,7 +5783,7 @@
             </a:r>
           </a:p>
           <a:p>
-            <a:pPr lvl="0">
+            <a:pPr lvl="0" rtl="0">
               <a:spcBef>
                 <a:spcPts val="0"/>
               </a:spcBef>
@@ -5703,7 +5795,7 @@
             </a:r>
           </a:p>
           <a:p>
-            <a:pPr lvl="0">
+            <a:pPr lvl="0" rtl="0">
               <a:spcBef>
                 <a:spcPts val="0"/>
               </a:spcBef>
@@ -5715,7 +5807,7 @@
             <a:endParaRPr sz="1200"/>
           </a:p>
           <a:p>
-            <a:pPr lvl="0">
+            <a:pPr lvl="0" rtl="0">
               <a:spcBef>
                 <a:spcPts val="0"/>
               </a:spcBef>
@@ -5753,7 +5845,7 @@
           </a:bodyPr>
           <a:lstStyle/>
           <a:p>
-            <a:pPr lvl="0">
+            <a:pPr lvl="0" rtl="0">
               <a:spcBef>
                 <a:spcPts val="0"/>
               </a:spcBef>
@@ -5769,7 +5861,7 @@
             </a:r>
           </a:p>
           <a:p>
-            <a:pPr lvl="0">
+            <a:pPr lvl="0" rtl="0">
               <a:spcBef>
                 <a:spcPts val="0"/>
               </a:spcBef>
@@ -5781,7 +5873,7 @@
             </a:r>
           </a:p>
           <a:p>
-            <a:pPr lvl="0">
+            <a:pPr lvl="0" rtl="0">
               <a:spcBef>
                 <a:spcPts val="0"/>
               </a:spcBef>
@@ -5817,7 +5909,7 @@
             </a:r>
           </a:p>
           <a:p>
-            <a:pPr indent="457200" lvl="0">
+            <a:pPr indent="457200" lvl="0" rtl="0">
               <a:spcBef>
                 <a:spcPts val="0"/>
               </a:spcBef>
@@ -5829,7 +5921,7 @@
             </a:r>
           </a:p>
           <a:p>
-            <a:pPr lvl="0">
+            <a:pPr lvl="0" rtl="0">
               <a:spcBef>
                 <a:spcPts val="0"/>
               </a:spcBef>
@@ -5841,7 +5933,7 @@
             </a:r>
           </a:p>
           <a:p>
-            <a:pPr lvl="0">
+            <a:pPr lvl="0" rtl="0">
               <a:spcBef>
                 <a:spcPts val="0"/>
               </a:spcBef>
@@ -5853,7 +5945,7 @@
             </a:r>
           </a:p>
           <a:p>
-            <a:pPr lvl="0">
+            <a:pPr lvl="0" rtl="0">
               <a:spcBef>
                 <a:spcPts val="0"/>
               </a:spcBef>
@@ -5865,7 +5957,7 @@
             </a:r>
           </a:p>
           <a:p>
-            <a:pPr lvl="0">
+            <a:pPr lvl="0" rtl="0">
               <a:spcBef>
                 <a:spcPts val="0"/>
               </a:spcBef>
@@ -5877,7 +5969,7 @@
             </a:r>
           </a:p>
           <a:p>
-            <a:pPr lvl="0">
+            <a:pPr lvl="0" rtl="0">
               <a:spcBef>
                 <a:spcPts val="0"/>
               </a:spcBef>
@@ -5889,7 +5981,7 @@
             </a:r>
           </a:p>
           <a:p>
-            <a:pPr lvl="0">
+            <a:pPr lvl="0" rtl="0">
               <a:spcBef>
                 <a:spcPts val="0"/>
               </a:spcBef>
@@ -5901,7 +5993,7 @@
             </a:r>
           </a:p>
           <a:p>
-            <a:pPr lvl="0">
+            <a:pPr lvl="0" rtl="0">
               <a:spcBef>
                 <a:spcPts val="0"/>
               </a:spcBef>
@@ -5913,7 +6005,7 @@
             </a:r>
           </a:p>
           <a:p>
-            <a:pPr lvl="0">
+            <a:pPr lvl="0" rtl="0">
               <a:spcBef>
                 <a:spcPts val="0"/>
               </a:spcBef>
@@ -5925,7 +6017,7 @@
             </a:r>
           </a:p>
           <a:p>
-            <a:pPr lvl="0">
+            <a:pPr lvl="0" rtl="0">
               <a:spcBef>
                 <a:spcPts val="0"/>
               </a:spcBef>
@@ -5937,7 +6029,7 @@
             </a:r>
           </a:p>
           <a:p>
-            <a:pPr lvl="0">
+            <a:pPr lvl="0" rtl="0">
               <a:spcBef>
                 <a:spcPts val="0"/>
               </a:spcBef>
@@ -5949,7 +6041,7 @@
             </a:r>
           </a:p>
           <a:p>
-            <a:pPr lvl="0">
+            <a:pPr lvl="0" rtl="0">
               <a:spcBef>
                 <a:spcPts val="0"/>
               </a:spcBef>
@@ -5961,7 +6053,7 @@
             </a:r>
           </a:p>
           <a:p>
-            <a:pPr lvl="0">
+            <a:pPr lvl="0" rtl="0">
               <a:spcBef>
                 <a:spcPts val="0"/>
               </a:spcBef>
@@ -5999,7 +6091,7 @@
           </a:bodyPr>
           <a:lstStyle/>
           <a:p>
-            <a:pPr lvl="0">
+            <a:pPr lvl="0" rtl="0">
               <a:spcBef>
                 <a:spcPts val="0"/>
               </a:spcBef>
@@ -6015,7 +6107,7 @@
             </a:r>
           </a:p>
           <a:p>
-            <a:pPr lvl="0">
+            <a:pPr lvl="0" rtl="0">
               <a:spcBef>
                 <a:spcPts val="0"/>
               </a:spcBef>
@@ -6027,7 +6119,7 @@
             </a:r>
           </a:p>
           <a:p>
-            <a:pPr lvl="0">
+            <a:pPr lvl="0" rtl="0">
               <a:spcBef>
                 <a:spcPts val="0"/>
               </a:spcBef>
@@ -6039,7 +6131,7 @@
             </a:r>
           </a:p>
           <a:p>
-            <a:pPr lvl="0">
+            <a:pPr lvl="0" rtl="0">
               <a:spcBef>
                 <a:spcPts val="0"/>
               </a:spcBef>
@@ -6051,7 +6143,7 @@
             </a:r>
           </a:p>
           <a:p>
-            <a:pPr indent="0" lvl="0" marL="457200">
+            <a:pPr indent="0" lvl="0" marL="457200" rtl="0">
               <a:spcBef>
                 <a:spcPts val="0"/>
               </a:spcBef>
@@ -6063,7 +6155,7 @@
             </a:r>
           </a:p>
           <a:p>
-            <a:pPr lvl="0">
+            <a:pPr lvl="0" rtl="0">
               <a:spcBef>
                 <a:spcPts val="0"/>
               </a:spcBef>
@@ -6075,7 +6167,7 @@
             </a:r>
           </a:p>
           <a:p>
-            <a:pPr lvl="0">
+            <a:pPr lvl="0" rtl="0">
               <a:spcBef>
                 <a:spcPts val="0"/>
               </a:spcBef>
@@ -6087,7 +6179,7 @@
             </a:r>
           </a:p>
           <a:p>
-            <a:pPr lvl="0">
+            <a:pPr lvl="0" rtl="0">
               <a:spcBef>
                 <a:spcPts val="0"/>
               </a:spcBef>
@@ -6099,7 +6191,7 @@
             <a:endParaRPr sz="1200"/>
           </a:p>
           <a:p>
-            <a:pPr lvl="0">
+            <a:pPr lvl="0" rtl="0">
               <a:spcBef>
                 <a:spcPts val="0"/>
               </a:spcBef>
@@ -6111,7 +6203,7 @@
             <a:endParaRPr sz="1200"/>
           </a:p>
           <a:p>
-            <a:pPr lvl="0">
+            <a:pPr lvl="0" rtl="0">
               <a:spcBef>
                 <a:spcPts val="0"/>
               </a:spcBef>
@@ -6123,7 +6215,7 @@
             <a:endParaRPr sz="1200"/>
           </a:p>
           <a:p>
-            <a:pPr lvl="0">
+            <a:pPr lvl="0" rtl="0">
               <a:spcBef>
                 <a:spcPts val="0"/>
               </a:spcBef>
@@ -6135,7 +6227,7 @@
             <a:endParaRPr sz="1200"/>
           </a:p>
           <a:p>
-            <a:pPr lvl="0">
+            <a:pPr lvl="0" rtl="0">
               <a:spcBef>
                 <a:spcPts val="0"/>
               </a:spcBef>
@@ -6147,7 +6239,7 @@
             <a:endParaRPr sz="1200"/>
           </a:p>
           <a:p>
-            <a:pPr lvl="0">
+            <a:pPr lvl="0" rtl="0">
               <a:spcBef>
                 <a:spcPts val="0"/>
               </a:spcBef>
@@ -6159,7 +6251,7 @@
             <a:endParaRPr sz="1200"/>
           </a:p>
           <a:p>
-            <a:pPr lvl="0">
+            <a:pPr lvl="0" rtl="0">
               <a:spcBef>
                 <a:spcPts val="0"/>
               </a:spcBef>
@@ -6171,7 +6263,7 @@
             <a:endParaRPr sz="1200"/>
           </a:p>
           <a:p>
-            <a:pPr lvl="0">
+            <a:pPr lvl="0" rtl="0">
               <a:spcBef>
                 <a:spcPts val="0"/>
               </a:spcBef>
@@ -6183,7 +6275,7 @@
             <a:endParaRPr sz="1200"/>
           </a:p>
           <a:p>
-            <a:pPr lvl="0">
+            <a:pPr lvl="0" rtl="0">
               <a:spcBef>
                 <a:spcPts val="0"/>
               </a:spcBef>
@@ -6195,7 +6287,7 @@
             <a:endParaRPr sz="1200"/>
           </a:p>
           <a:p>
-            <a:pPr lvl="0">
+            <a:pPr lvl="0" rtl="0">
               <a:spcBef>
                 <a:spcPts val="0"/>
               </a:spcBef>
@@ -6207,7 +6299,7 @@
             <a:endParaRPr sz="1200"/>
           </a:p>
           <a:p>
-            <a:pPr lvl="0">
+            <a:pPr lvl="0" rtl="0">
               <a:spcBef>
                 <a:spcPts val="0"/>
               </a:spcBef>
@@ -6414,6 +6506,80 @@
       <p:sp>
         <p:nvSpPr>
           <p:cNvPr id="132" name="Shape 132"/>
+          <p:cNvSpPr txBox="1"/>
+          <p:nvPr/>
+        </p:nvSpPr>
+        <p:spPr>
+          <a:xfrm>
+            <a:off x="1880250" y="1306650"/>
+            <a:ext cx="5775600" cy="2429100"/>
+          </a:xfrm>
+          <a:prstGeom prst="rect">
+            <a:avLst/>
+          </a:prstGeom>
+          <a:noFill/>
+          <a:ln>
+            <a:noFill/>
+          </a:ln>
+        </p:spPr>
+        <p:txBody>
+          <a:bodyPr anchorCtr="0" anchor="ctr" bIns="91425" lIns="91425" rIns="91425" wrap="square" tIns="91425">
+            <a:noAutofit/>
+          </a:bodyPr>
+          <a:lstStyle/>
+          <a:p>
+            <a:pPr indent="457200" lvl="0" marL="1371600" rtl="0">
+              <a:spcBef>
+                <a:spcPts val="0"/>
+              </a:spcBef>
+              <a:buNone/>
+            </a:pPr>
+            <a:r>
+              <a:rPr b="1" lang="es" sz="4800">
+                <a:solidFill>
+                  <a:schemeClr val="dk1"/>
+                </a:solidFill>
+              </a:rPr>
+              <a:t>Demo</a:t>
+            </a:r>
+          </a:p>
+        </p:txBody>
+      </p:sp>
+    </p:spTree>
+  </p:cSld>
+  <p:clrMapOvr>
+    <a:masterClrMapping/>
+  </p:clrMapOvr>
+</p:sld>
+</file>
+
+<file path=ppt/slides/slide14.xml><?xml version="1.0" encoding="utf-8"?>
+<p:sld xmlns:a="http://schemas.openxmlformats.org/drawingml/2006/main" xmlns:r="http://schemas.openxmlformats.org/officeDocument/2006/relationships" xmlns:mc="http://schemas.openxmlformats.org/markup-compatibility/2006" xmlns:mv="urn:schemas-microsoft-com:mac:vml" xmlns:p="http://schemas.openxmlformats.org/presentationml/2006/main" xmlns:c="http://schemas.openxmlformats.org/drawingml/2006/chart" xmlns:dgm="http://schemas.openxmlformats.org/drawingml/2006/diagram" xmlns:o="urn:schemas-microsoft-com:office:office" xmlns:v="urn:schemas-microsoft-com:vml" xmlns:pvml="urn:schemas-microsoft-com:office:powerpoint" xmlns:com="http://schemas.openxmlformats.org/drawingml/2006/compatibility" xmlns:p14="http://schemas.microsoft.com/office/powerpoint/2010/main" xmlns:p15="http://schemas.microsoft.com/office/powerpoint/2012/main">
+  <p:cSld>
+    <p:bg>
+      <p:bgPr>
+        <a:solidFill>
+          <a:srgbClr val="EFEFEF"/>
+        </a:solidFill>
+      </p:bgPr>
+    </p:bg>
+    <p:spTree>
+      <p:nvGrpSpPr>
+        <p:cNvPr id="136" name="Shape 136"/>
+        <p:cNvGrpSpPr/>
+        <p:nvPr/>
+      </p:nvGrpSpPr>
+      <p:grpSpPr>
+        <a:xfrm>
+          <a:off x="0" y="0"/>
+          <a:ext cx="0" cy="0"/>
+          <a:chOff x="0" y="0"/>
+          <a:chExt cx="0" cy="0"/>
+        </a:xfrm>
+      </p:grpSpPr>
+      <p:sp>
+        <p:nvSpPr>
+          <p:cNvPr id="137" name="Shape 137"/>
           <p:cNvSpPr txBox="1"/>
           <p:nvPr/>
         </p:nvSpPr>

</xml_diff>

<commit_message>
updated presentation with the changes made to the domain model
</commit_message>
<xml_diff>
--- a/documentation/P3 Presentation.pptx
+++ b/documentation/P3 Presentation.pptx
@@ -22,6 +22,8 @@
     <p:sldId id="267" r:id="rId16"/>
     <p:sldId id="268" r:id="rId17"/>
     <p:sldId id="269" r:id="rId18"/>
+    <p:sldId id="270" r:id="rId19"/>
+    <p:sldId id="271" r:id="rId20"/>
   </p:sldIdLst>
   <p:sldSz cy="5143500" cx="9144000"/>
   <p:notesSz cx="6858000" cy="9144000"/>
@@ -497,7 +499,7 @@
   <p:cSld>
     <p:spTree>
       <p:nvGrpSpPr>
-        <p:cNvPr id="107" name="Shape 107"/>
+        <p:cNvPr id="109" name="Shape 109"/>
         <p:cNvGrpSpPr/>
         <p:nvPr/>
       </p:nvGrpSpPr>
@@ -511,7 +513,7 @@
       </p:grpSpPr>
       <p:sp>
         <p:nvSpPr>
-          <p:cNvPr id="108" name="Shape 108"/>
+          <p:cNvPr id="110" name="Shape 110"/>
           <p:cNvSpPr/>
           <p:nvPr>
             <p:ph idx="2" type="sldImg"/>
@@ -545,7 +547,7 @@
       </p:sp>
       <p:sp>
         <p:nvSpPr>
-          <p:cNvPr id="109" name="Shape 109"/>
+          <p:cNvPr id="111" name="Shape 111"/>
           <p:cNvSpPr txBox="1"/>
           <p:nvPr>
             <p:ph idx="1" type="body"/>
@@ -566,7 +568,7 @@
           </a:bodyPr>
           <a:lstStyle/>
           <a:p>
-            <a:pPr lvl="0" rtl="0">
+            <a:pPr lvl="0">
               <a:spcBef>
                 <a:spcPts val="0"/>
               </a:spcBef>
@@ -592,7 +594,7 @@
   <p:cSld>
     <p:spTree>
       <p:nvGrpSpPr>
-        <p:cNvPr id="113" name="Shape 113"/>
+        <p:cNvPr id="115" name="Shape 115"/>
         <p:cNvGrpSpPr/>
         <p:nvPr/>
       </p:nvGrpSpPr>
@@ -606,7 +608,7 @@
       </p:grpSpPr>
       <p:sp>
         <p:nvSpPr>
-          <p:cNvPr id="114" name="Shape 114"/>
+          <p:cNvPr id="116" name="Shape 116"/>
           <p:cNvSpPr/>
           <p:nvPr>
             <p:ph idx="2" type="sldImg"/>
@@ -640,7 +642,7 @@
       </p:sp>
       <p:sp>
         <p:nvSpPr>
-          <p:cNvPr id="115" name="Shape 115"/>
+          <p:cNvPr id="117" name="Shape 117"/>
           <p:cNvSpPr txBox="1"/>
           <p:nvPr>
             <p:ph idx="1" type="body"/>
@@ -687,7 +689,7 @@
   <p:cSld>
     <p:spTree>
       <p:nvGrpSpPr>
-        <p:cNvPr id="119" name="Shape 119"/>
+        <p:cNvPr id="121" name="Shape 121"/>
         <p:cNvGrpSpPr/>
         <p:nvPr/>
       </p:nvGrpSpPr>
@@ -701,7 +703,7 @@
       </p:grpSpPr>
       <p:sp>
         <p:nvSpPr>
-          <p:cNvPr id="120" name="Shape 120"/>
+          <p:cNvPr id="122" name="Shape 122"/>
           <p:cNvSpPr/>
           <p:nvPr>
             <p:ph idx="2" type="sldImg"/>
@@ -735,7 +737,7 @@
       </p:sp>
       <p:sp>
         <p:nvSpPr>
-          <p:cNvPr id="121" name="Shape 121"/>
+          <p:cNvPr id="123" name="Shape 123"/>
           <p:cNvSpPr txBox="1"/>
           <p:nvPr>
             <p:ph idx="1" type="body"/>
@@ -782,7 +784,7 @@
   <p:cSld>
     <p:spTree>
       <p:nvGrpSpPr>
-        <p:cNvPr id="128" name="Shape 128"/>
+        <p:cNvPr id="127" name="Shape 127"/>
         <p:cNvGrpSpPr/>
         <p:nvPr/>
       </p:nvGrpSpPr>
@@ -796,7 +798,7 @@
       </p:grpSpPr>
       <p:sp>
         <p:nvSpPr>
-          <p:cNvPr id="129" name="Shape 129"/>
+          <p:cNvPr id="128" name="Shape 128"/>
           <p:cNvSpPr/>
           <p:nvPr>
             <p:ph idx="2" type="sldImg"/>
@@ -830,7 +832,7 @@
       </p:sp>
       <p:sp>
         <p:nvSpPr>
-          <p:cNvPr id="130" name="Shape 130"/>
+          <p:cNvPr id="129" name="Shape 129"/>
           <p:cNvSpPr txBox="1"/>
           <p:nvPr>
             <p:ph idx="1" type="body"/>
@@ -967,6 +969,196 @@
 </p:notes>
 </file>
 
+<file path=ppt/notesSlides/notesSlide15.xml><?xml version="1.0" encoding="utf-8"?>
+<p:notes xmlns:a="http://schemas.openxmlformats.org/drawingml/2006/main" xmlns:r="http://schemas.openxmlformats.org/officeDocument/2006/relationships" xmlns:mc="http://schemas.openxmlformats.org/markup-compatibility/2006" xmlns:mv="urn:schemas-microsoft-com:mac:vml" xmlns:p="http://schemas.openxmlformats.org/presentationml/2006/main" xmlns:c="http://schemas.openxmlformats.org/drawingml/2006/chart" xmlns:dgm="http://schemas.openxmlformats.org/drawingml/2006/diagram" xmlns:o="urn:schemas-microsoft-com:office:office" xmlns:v="urn:schemas-microsoft-com:vml" xmlns:pvml="urn:schemas-microsoft-com:office:powerpoint" xmlns:com="http://schemas.openxmlformats.org/drawingml/2006/compatibility" xmlns:p14="http://schemas.microsoft.com/office/powerpoint/2010/main" xmlns:p15="http://schemas.microsoft.com/office/powerpoint/2012/main" showMasterPhAnim="0" showMasterSp="0">
+  <p:cSld>
+    <p:spTree>
+      <p:nvGrpSpPr>
+        <p:cNvPr id="142" name="Shape 142"/>
+        <p:cNvGrpSpPr/>
+        <p:nvPr/>
+      </p:nvGrpSpPr>
+      <p:grpSpPr>
+        <a:xfrm>
+          <a:off x="0" y="0"/>
+          <a:ext cx="0" cy="0"/>
+          <a:chOff x="0" y="0"/>
+          <a:chExt cx="0" cy="0"/>
+        </a:xfrm>
+      </p:grpSpPr>
+      <p:sp>
+        <p:nvSpPr>
+          <p:cNvPr id="143" name="Shape 143"/>
+          <p:cNvSpPr/>
+          <p:nvPr>
+            <p:ph idx="2" type="sldImg"/>
+          </p:nvPr>
+        </p:nvSpPr>
+        <p:spPr>
+          <a:xfrm>
+            <a:off x="381300" y="685800"/>
+            <a:ext cx="6096000" cy="3429000"/>
+          </a:xfrm>
+          <a:custGeom>
+            <a:pathLst>
+              <a:path extrusionOk="0" h="120000" w="120000">
+                <a:moveTo>
+                  <a:pt x="0" y="0"/>
+                </a:moveTo>
+                <a:lnTo>
+                  <a:pt x="120000" y="0"/>
+                </a:lnTo>
+                <a:lnTo>
+                  <a:pt x="120000" y="120000"/>
+                </a:lnTo>
+                <a:lnTo>
+                  <a:pt x="0" y="120000"/>
+                </a:lnTo>
+                <a:close/>
+              </a:path>
+            </a:pathLst>
+          </a:custGeom>
+        </p:spPr>
+      </p:sp>
+      <p:sp>
+        <p:nvSpPr>
+          <p:cNvPr id="144" name="Shape 144"/>
+          <p:cNvSpPr txBox="1"/>
+          <p:nvPr>
+            <p:ph idx="1" type="body"/>
+          </p:nvPr>
+        </p:nvSpPr>
+        <p:spPr>
+          <a:xfrm>
+            <a:off x="685800" y="4343400"/>
+            <a:ext cx="5486400" cy="4114800"/>
+          </a:xfrm>
+          <a:prstGeom prst="rect">
+            <a:avLst/>
+          </a:prstGeom>
+        </p:spPr>
+        <p:txBody>
+          <a:bodyPr anchorCtr="0" anchor="t" bIns="91425" lIns="91425" rIns="91425" wrap="square" tIns="91425">
+            <a:noAutofit/>
+          </a:bodyPr>
+          <a:lstStyle/>
+          <a:p>
+            <a:pPr lvl="0" rtl="0">
+              <a:spcBef>
+                <a:spcPts val="0"/>
+              </a:spcBef>
+              <a:buNone/>
+            </a:pPr>
+            <a:r>
+              <a:t/>
+            </a:r>
+            <a:endParaRPr/>
+          </a:p>
+        </p:txBody>
+      </p:sp>
+    </p:spTree>
+  </p:cSld>
+  <p:clrMapOvr>
+    <a:masterClrMapping/>
+  </p:clrMapOvr>
+</p:notes>
+</file>
+
+<file path=ppt/notesSlides/notesSlide16.xml><?xml version="1.0" encoding="utf-8"?>
+<p:notes xmlns:a="http://schemas.openxmlformats.org/drawingml/2006/main" xmlns:r="http://schemas.openxmlformats.org/officeDocument/2006/relationships" xmlns:mc="http://schemas.openxmlformats.org/markup-compatibility/2006" xmlns:mv="urn:schemas-microsoft-com:mac:vml" xmlns:p="http://schemas.openxmlformats.org/presentationml/2006/main" xmlns:c="http://schemas.openxmlformats.org/drawingml/2006/chart" xmlns:dgm="http://schemas.openxmlformats.org/drawingml/2006/diagram" xmlns:o="urn:schemas-microsoft-com:office:office" xmlns:v="urn:schemas-microsoft-com:vml" xmlns:pvml="urn:schemas-microsoft-com:office:powerpoint" xmlns:com="http://schemas.openxmlformats.org/drawingml/2006/compatibility" xmlns:p14="http://schemas.microsoft.com/office/powerpoint/2010/main" xmlns:p15="http://schemas.microsoft.com/office/powerpoint/2012/main" showMasterPhAnim="0" showMasterSp="0">
+  <p:cSld>
+    <p:spTree>
+      <p:nvGrpSpPr>
+        <p:cNvPr id="147" name="Shape 147"/>
+        <p:cNvGrpSpPr/>
+        <p:nvPr/>
+      </p:nvGrpSpPr>
+      <p:grpSpPr>
+        <a:xfrm>
+          <a:off x="0" y="0"/>
+          <a:ext cx="0" cy="0"/>
+          <a:chOff x="0" y="0"/>
+          <a:chExt cx="0" cy="0"/>
+        </a:xfrm>
+      </p:grpSpPr>
+      <p:sp>
+        <p:nvSpPr>
+          <p:cNvPr id="148" name="Shape 148"/>
+          <p:cNvSpPr/>
+          <p:nvPr>
+            <p:ph idx="2" type="sldImg"/>
+          </p:nvPr>
+        </p:nvSpPr>
+        <p:spPr>
+          <a:xfrm>
+            <a:off x="381300" y="685800"/>
+            <a:ext cx="6096000" cy="3429000"/>
+          </a:xfrm>
+          <a:custGeom>
+            <a:pathLst>
+              <a:path extrusionOk="0" h="120000" w="120000">
+                <a:moveTo>
+                  <a:pt x="0" y="0"/>
+                </a:moveTo>
+                <a:lnTo>
+                  <a:pt x="120000" y="0"/>
+                </a:lnTo>
+                <a:lnTo>
+                  <a:pt x="120000" y="120000"/>
+                </a:lnTo>
+                <a:lnTo>
+                  <a:pt x="0" y="120000"/>
+                </a:lnTo>
+                <a:close/>
+              </a:path>
+            </a:pathLst>
+          </a:custGeom>
+        </p:spPr>
+      </p:sp>
+      <p:sp>
+        <p:nvSpPr>
+          <p:cNvPr id="149" name="Shape 149"/>
+          <p:cNvSpPr txBox="1"/>
+          <p:nvPr>
+            <p:ph idx="1" type="body"/>
+          </p:nvPr>
+        </p:nvSpPr>
+        <p:spPr>
+          <a:xfrm>
+            <a:off x="685800" y="4343400"/>
+            <a:ext cx="5486400" cy="4114800"/>
+          </a:xfrm>
+          <a:prstGeom prst="rect">
+            <a:avLst/>
+          </a:prstGeom>
+        </p:spPr>
+        <p:txBody>
+          <a:bodyPr anchorCtr="0" anchor="t" bIns="91425" lIns="91425" rIns="91425" wrap="square" tIns="91425">
+            <a:noAutofit/>
+          </a:bodyPr>
+          <a:lstStyle/>
+          <a:p>
+            <a:pPr lvl="0" rtl="0">
+              <a:spcBef>
+                <a:spcPts val="0"/>
+              </a:spcBef>
+              <a:buNone/>
+            </a:pPr>
+            <a:r>
+              <a:t/>
+            </a:r>
+            <a:endParaRPr/>
+          </a:p>
+        </p:txBody>
+      </p:sp>
+    </p:spTree>
+  </p:cSld>
+  <p:clrMapOvr>
+    <a:masterClrMapping/>
+  </p:clrMapOvr>
+</p:notes>
+</file>
+
 <file path=ppt/notesSlides/notesSlide2.xml><?xml version="1.0" encoding="utf-8"?>
 <p:notes xmlns:a="http://schemas.openxmlformats.org/drawingml/2006/main" xmlns:r="http://schemas.openxmlformats.org/officeDocument/2006/relationships" xmlns:mc="http://schemas.openxmlformats.org/markup-compatibility/2006" xmlns:mv="urn:schemas-microsoft-com:mac:vml" xmlns:p="http://schemas.openxmlformats.org/presentationml/2006/main" xmlns:c="http://schemas.openxmlformats.org/drawingml/2006/chart" xmlns:dgm="http://schemas.openxmlformats.org/drawingml/2006/diagram" xmlns:o="urn:schemas-microsoft-com:office:office" xmlns:v="urn:schemas-microsoft-com:vml" xmlns:pvml="urn:schemas-microsoft-com:office:powerpoint" xmlns:com="http://schemas.openxmlformats.org/drawingml/2006/compatibility" xmlns:p14="http://schemas.microsoft.com/office/powerpoint/2010/main" xmlns:p15="http://schemas.microsoft.com/office/powerpoint/2012/main" showMasterPhAnim="0" showMasterSp="0">
   <p:cSld>
@@ -1162,7 +1354,7 @@
   <p:cSld>
     <p:spTree>
       <p:nvGrpSpPr>
-        <p:cNvPr id="71" name="Shape 71"/>
+        <p:cNvPr id="72" name="Shape 72"/>
         <p:cNvGrpSpPr/>
         <p:nvPr/>
       </p:nvGrpSpPr>
@@ -1176,7 +1368,7 @@
       </p:grpSpPr>
       <p:sp>
         <p:nvSpPr>
-          <p:cNvPr id="72" name="Shape 72"/>
+          <p:cNvPr id="73" name="Shape 73"/>
           <p:cNvSpPr/>
           <p:nvPr>
             <p:ph idx="2" type="sldImg"/>
@@ -1210,7 +1402,7 @@
       </p:sp>
       <p:sp>
         <p:nvSpPr>
-          <p:cNvPr id="73" name="Shape 73"/>
+          <p:cNvPr id="74" name="Shape 74"/>
           <p:cNvSpPr txBox="1"/>
           <p:nvPr>
             <p:ph idx="1" type="body"/>
@@ -1257,7 +1449,7 @@
   <p:cSld>
     <p:spTree>
       <p:nvGrpSpPr>
-        <p:cNvPr id="77" name="Shape 77"/>
+        <p:cNvPr id="79" name="Shape 79"/>
         <p:cNvGrpSpPr/>
         <p:nvPr/>
       </p:nvGrpSpPr>
@@ -1271,7 +1463,7 @@
       </p:grpSpPr>
       <p:sp>
         <p:nvSpPr>
-          <p:cNvPr id="78" name="Shape 78"/>
+          <p:cNvPr id="80" name="Shape 80"/>
           <p:cNvSpPr/>
           <p:nvPr>
             <p:ph idx="2" type="sldImg"/>
@@ -1305,7 +1497,7 @@
       </p:sp>
       <p:sp>
         <p:nvSpPr>
-          <p:cNvPr id="79" name="Shape 79"/>
+          <p:cNvPr id="81" name="Shape 81"/>
           <p:cNvSpPr txBox="1"/>
           <p:nvPr>
             <p:ph idx="1" type="body"/>
@@ -1352,7 +1544,7 @@
   <p:cSld>
     <p:spTree>
       <p:nvGrpSpPr>
-        <p:cNvPr id="83" name="Shape 83"/>
+        <p:cNvPr id="85" name="Shape 85"/>
         <p:cNvGrpSpPr/>
         <p:nvPr/>
       </p:nvGrpSpPr>
@@ -1366,7 +1558,7 @@
       </p:grpSpPr>
       <p:sp>
         <p:nvSpPr>
-          <p:cNvPr id="84" name="Shape 84"/>
+          <p:cNvPr id="86" name="Shape 86"/>
           <p:cNvSpPr/>
           <p:nvPr>
             <p:ph idx="2" type="sldImg"/>
@@ -1400,7 +1592,7 @@
       </p:sp>
       <p:sp>
         <p:nvSpPr>
-          <p:cNvPr id="85" name="Shape 85"/>
+          <p:cNvPr id="87" name="Shape 87"/>
           <p:cNvSpPr txBox="1"/>
           <p:nvPr>
             <p:ph idx="1" type="body"/>
@@ -1447,7 +1639,7 @@
   <p:cSld>
     <p:spTree>
       <p:nvGrpSpPr>
-        <p:cNvPr id="89" name="Shape 89"/>
+        <p:cNvPr id="91" name="Shape 91"/>
         <p:cNvGrpSpPr/>
         <p:nvPr/>
       </p:nvGrpSpPr>
@@ -1461,7 +1653,7 @@
       </p:grpSpPr>
       <p:sp>
         <p:nvSpPr>
-          <p:cNvPr id="90" name="Shape 90"/>
+          <p:cNvPr id="92" name="Shape 92"/>
           <p:cNvSpPr/>
           <p:nvPr>
             <p:ph idx="2" type="sldImg"/>
@@ -1495,7 +1687,7 @@
       </p:sp>
       <p:sp>
         <p:nvSpPr>
-          <p:cNvPr id="91" name="Shape 91"/>
+          <p:cNvPr id="93" name="Shape 93"/>
           <p:cNvSpPr txBox="1"/>
           <p:nvPr>
             <p:ph idx="1" type="body"/>
@@ -1542,7 +1734,7 @@
   <p:cSld>
     <p:spTree>
       <p:nvGrpSpPr>
-        <p:cNvPr id="95" name="Shape 95"/>
+        <p:cNvPr id="97" name="Shape 97"/>
         <p:cNvGrpSpPr/>
         <p:nvPr/>
       </p:nvGrpSpPr>
@@ -1556,7 +1748,7 @@
       </p:grpSpPr>
       <p:sp>
         <p:nvSpPr>
-          <p:cNvPr id="96" name="Shape 96"/>
+          <p:cNvPr id="98" name="Shape 98"/>
           <p:cNvSpPr/>
           <p:nvPr>
             <p:ph idx="2" type="sldImg"/>
@@ -1590,7 +1782,7 @@
       </p:sp>
       <p:sp>
         <p:nvSpPr>
-          <p:cNvPr id="97" name="Shape 97"/>
+          <p:cNvPr id="99" name="Shape 99"/>
           <p:cNvSpPr txBox="1"/>
           <p:nvPr>
             <p:ph idx="1" type="body"/>
@@ -1611,7 +1803,7 @@
           </a:bodyPr>
           <a:lstStyle/>
           <a:p>
-            <a:pPr lvl="0">
+            <a:pPr lvl="0" rtl="0">
               <a:spcBef>
                 <a:spcPts val="0"/>
               </a:spcBef>
@@ -1637,7 +1829,7 @@
   <p:cSld>
     <p:spTree>
       <p:nvGrpSpPr>
-        <p:cNvPr id="101" name="Shape 101"/>
+        <p:cNvPr id="103" name="Shape 103"/>
         <p:cNvGrpSpPr/>
         <p:nvPr/>
       </p:nvGrpSpPr>
@@ -1651,7 +1843,7 @@
       </p:grpSpPr>
       <p:sp>
         <p:nvSpPr>
-          <p:cNvPr id="102" name="Shape 102"/>
+          <p:cNvPr id="104" name="Shape 104"/>
           <p:cNvSpPr/>
           <p:nvPr>
             <p:ph idx="2" type="sldImg"/>
@@ -1685,7 +1877,7 @@
       </p:sp>
       <p:sp>
         <p:nvSpPr>
-          <p:cNvPr id="103" name="Shape 103"/>
+          <p:cNvPr id="105" name="Shape 105"/>
           <p:cNvSpPr txBox="1"/>
           <p:nvPr>
             <p:ph idx="1" type="body"/>
@@ -5290,7 +5482,7 @@
     </p:bg>
     <p:spTree>
       <p:nvGrpSpPr>
-        <p:cNvPr id="110" name="Shape 110"/>
+        <p:cNvPr id="112" name="Shape 112"/>
         <p:cNvGrpSpPr/>
         <p:nvPr/>
       </p:nvGrpSpPr>
@@ -5302,50 +5494,9 @@
           <a:chExt cx="0" cy="0"/>
         </a:xfrm>
       </p:grpSpPr>
-      <p:sp>
-        <p:nvSpPr>
-          <p:cNvPr id="111" name="Shape 111"/>
-          <p:cNvSpPr txBox="1"/>
-          <p:nvPr>
-            <p:ph type="title"/>
-          </p:nvPr>
-        </p:nvSpPr>
-        <p:spPr>
-          <a:xfrm>
-            <a:off x="311700" y="114700"/>
-            <a:ext cx="8520600" cy="572700"/>
-          </a:xfrm>
-          <a:prstGeom prst="rect">
-            <a:avLst/>
-          </a:prstGeom>
-        </p:spPr>
-        <p:txBody>
-          <a:bodyPr anchorCtr="0" anchor="t" bIns="91425" lIns="91425" rIns="91425" wrap="square" tIns="91425">
-            <a:noAutofit/>
-          </a:bodyPr>
-          <a:lstStyle/>
-          <a:p>
-            <a:pPr lvl="0" rtl="0" algn="l">
-              <a:spcBef>
-                <a:spcPts val="0"/>
-              </a:spcBef>
-              <a:buNone/>
-            </a:pPr>
-            <a:r>
-              <a:rPr b="1" i="1" lang="es">
-                <a:latin typeface="Cambria"/>
-                <a:ea typeface="Cambria"/>
-                <a:cs typeface="Cambria"/>
-                <a:sym typeface="Cambria"/>
-              </a:rPr>
-              <a:t>Class  Diagram cont.</a:t>
-            </a:r>
-          </a:p>
-        </p:txBody>
-      </p:sp>
       <p:pic>
         <p:nvPicPr>
-          <p:cNvPr id="112" name="Shape 112"/>
+          <p:cNvPr id="113" name="Shape 113"/>
           <p:cNvPicPr preferRelativeResize="0"/>
           <p:nvPr/>
         </p:nvPicPr>
@@ -5359,8 +5510,8 @@
         </p:blipFill>
         <p:spPr>
           <a:xfrm>
-            <a:off x="0" y="547983"/>
-            <a:ext cx="9143999" cy="4214033"/>
+            <a:off x="3387850" y="221525"/>
+            <a:ext cx="4181475" cy="4476750"/>
           </a:xfrm>
           <a:prstGeom prst="rect">
             <a:avLst/>
@@ -5371,6 +5522,52 @@
           </a:ln>
         </p:spPr>
       </p:pic>
+      <p:sp>
+        <p:nvSpPr>
+          <p:cNvPr id="114" name="Shape 114"/>
+          <p:cNvSpPr txBox="1"/>
+          <p:nvPr/>
+        </p:nvSpPr>
+        <p:spPr>
+          <a:xfrm>
+            <a:off x="0" y="0"/>
+            <a:ext cx="3000000" cy="698100"/>
+          </a:xfrm>
+          <a:prstGeom prst="rect">
+            <a:avLst/>
+          </a:prstGeom>
+          <a:noFill/>
+          <a:ln>
+            <a:noFill/>
+          </a:ln>
+        </p:spPr>
+        <p:txBody>
+          <a:bodyPr anchorCtr="0" anchor="ctr" bIns="91425" lIns="91425" rIns="91425" wrap="square" tIns="91425">
+            <a:noAutofit/>
+          </a:bodyPr>
+          <a:lstStyle/>
+          <a:p>
+            <a:pPr lvl="0" rtl="0">
+              <a:spcBef>
+                <a:spcPts val="0"/>
+              </a:spcBef>
+              <a:buNone/>
+            </a:pPr>
+            <a:r>
+              <a:rPr b="1" i="1" lang="es" sz="2800">
+                <a:solidFill>
+                  <a:schemeClr val="dk1"/>
+                </a:solidFill>
+                <a:latin typeface="Cambria"/>
+                <a:ea typeface="Cambria"/>
+                <a:cs typeface="Cambria"/>
+                <a:sym typeface="Cambria"/>
+              </a:rPr>
+              <a:t>Class Diagram</a:t>
+            </a:r>
+          </a:p>
+        </p:txBody>
+      </p:sp>
     </p:spTree>
   </p:cSld>
   <p:clrMapOvr>
@@ -5391,7 +5588,7 @@
     </p:bg>
     <p:spTree>
       <p:nvGrpSpPr>
-        <p:cNvPr id="116" name="Shape 116"/>
+        <p:cNvPr id="118" name="Shape 118"/>
         <p:cNvGrpSpPr/>
         <p:nvPr/>
       </p:nvGrpSpPr>
@@ -5405,7 +5602,7 @@
       </p:grpSpPr>
       <p:sp>
         <p:nvSpPr>
-          <p:cNvPr id="117" name="Shape 117"/>
+          <p:cNvPr id="119" name="Shape 119"/>
           <p:cNvSpPr txBox="1"/>
           <p:nvPr>
             <p:ph type="title"/>
@@ -5439,14 +5636,14 @@
                 <a:cs typeface="Cambria"/>
                 <a:sym typeface="Cambria"/>
               </a:rPr>
-              <a:t>Class Diagram cont.</a:t>
+              <a:t>Class Diagram</a:t>
             </a:r>
           </a:p>
         </p:txBody>
       </p:sp>
       <p:pic>
         <p:nvPicPr>
-          <p:cNvPr id="118" name="Shape 118"/>
+          <p:cNvPr id="120" name="Shape 120"/>
           <p:cNvPicPr preferRelativeResize="0"/>
           <p:nvPr/>
         </p:nvPicPr>
@@ -5461,7 +5658,7 @@
         <p:spPr>
           <a:xfrm>
             <a:off x="152400" y="839800"/>
-            <a:ext cx="8839201" cy="3666109"/>
+            <a:ext cx="7963901" cy="4223700"/>
           </a:xfrm>
           <a:prstGeom prst="rect">
             <a:avLst/>
@@ -5492,7 +5689,7 @@
     </p:bg>
     <p:spTree>
       <p:nvGrpSpPr>
-        <p:cNvPr id="122" name="Shape 122"/>
+        <p:cNvPr id="124" name="Shape 124"/>
         <p:cNvGrpSpPr/>
         <p:nvPr/>
       </p:nvGrpSpPr>
@@ -5506,7 +5703,7 @@
       </p:grpSpPr>
       <p:sp>
         <p:nvSpPr>
-          <p:cNvPr id="123" name="Shape 123"/>
+          <p:cNvPr id="125" name="Shape 125"/>
           <p:cNvSpPr txBox="1"/>
           <p:nvPr>
             <p:ph type="title"/>
@@ -5514,7 +5711,7 @@
         </p:nvSpPr>
         <p:spPr>
           <a:xfrm>
-            <a:off x="285575" y="179950"/>
+            <a:off x="311700" y="114700"/>
             <a:ext cx="8520600" cy="572700"/>
           </a:xfrm>
           <a:prstGeom prst="rect">
@@ -5540,38 +5737,29 @@
                 <a:cs typeface="Cambria"/>
                 <a:sym typeface="Cambria"/>
               </a:rPr>
-              <a:t>List of test cases:</a:t>
-            </a:r>
-          </a:p>
-          <a:p>
-            <a:pPr lvl="0" rtl="0" algn="l">
-              <a:spcBef>
-                <a:spcPts val="0"/>
-              </a:spcBef>
-              <a:buNone/>
-            </a:pPr>
-            <a:r>
-              <a:t/>
-            </a:r>
-            <a:endParaRPr b="1" i="1">
-              <a:latin typeface="Cambria"/>
-              <a:ea typeface="Cambria"/>
-              <a:cs typeface="Cambria"/>
-              <a:sym typeface="Cambria"/>
-            </a:endParaRPr>
+              <a:t>Class  Diagram cont.</a:t>
+            </a:r>
           </a:p>
         </p:txBody>
       </p:sp>
-      <p:sp>
-        <p:nvSpPr>
-          <p:cNvPr id="124" name="Shape 124"/>
-          <p:cNvSpPr txBox="1"/>
+      <p:pic>
+        <p:nvPicPr>
+          <p:cNvPr id="126" name="Shape 126"/>
+          <p:cNvPicPr preferRelativeResize="0"/>
           <p:nvPr/>
-        </p:nvSpPr>
-        <p:spPr>
-          <a:xfrm>
-            <a:off x="311700" y="1190000"/>
-            <a:ext cx="4319700" cy="3883800"/>
+        </p:nvPicPr>
+        <p:blipFill>
+          <a:blip r:embed="rId3">
+            <a:alphaModFix/>
+          </a:blip>
+          <a:stretch>
+            <a:fillRect/>
+          </a:stretch>
+        </p:blipFill>
+        <p:spPr>
+          <a:xfrm>
+            <a:off x="0" y="547983"/>
+            <a:ext cx="9143999" cy="4214033"/>
           </a:xfrm>
           <a:prstGeom prst="rect">
             <a:avLst/>
@@ -5581,896 +5769,7 @@
             <a:noFill/>
           </a:ln>
         </p:spPr>
-        <p:txBody>
-          <a:bodyPr anchorCtr="0" anchor="t" bIns="91425" lIns="91425" rIns="91425" wrap="square" tIns="91425">
-            <a:noAutofit/>
-          </a:bodyPr>
-          <a:lstStyle/>
-          <a:p>
-            <a:pPr lvl="0" rtl="0">
-              <a:spcBef>
-                <a:spcPts val="0"/>
-              </a:spcBef>
-              <a:buNone/>
-            </a:pPr>
-            <a:r>
-              <a:rPr b="1" lang="es" sz="1200"/>
-              <a:t>TestBoardSquare</a:t>
-            </a:r>
-            <a:r>
-              <a:rPr lang="es" sz="1200"/>
-              <a:t>:</a:t>
-            </a:r>
-          </a:p>
-          <a:p>
-            <a:pPr lvl="0" rtl="0">
-              <a:spcBef>
-                <a:spcPts val="0"/>
-              </a:spcBef>
-              <a:buNone/>
-            </a:pPr>
-            <a:r>
-              <a:rPr lang="es" sz="1200"/>
-              <a:t>	testSetLocation_bottom_right_corner</a:t>
-            </a:r>
-          </a:p>
-          <a:p>
-            <a:pPr lvl="0" rtl="0">
-              <a:spcBef>
-                <a:spcPts val="0"/>
-              </a:spcBef>
-              <a:buNone/>
-            </a:pPr>
-            <a:r>
-              <a:rPr lang="es" sz="1200"/>
-              <a:t>	testSetLocation_column_too_big</a:t>
-            </a:r>
-          </a:p>
-          <a:p>
-            <a:pPr lvl="0" rtl="0">
-              <a:spcBef>
-                <a:spcPts val="0"/>
-              </a:spcBef>
-              <a:buNone/>
-            </a:pPr>
-            <a:r>
-              <a:rPr lang="es" sz="1200"/>
-              <a:t>	testSetLocation_column_too_small</a:t>
-            </a:r>
-          </a:p>
-          <a:p>
-            <a:pPr lvl="0" rtl="0">
-              <a:spcBef>
-                <a:spcPts val="0"/>
-              </a:spcBef>
-              <a:buNone/>
-            </a:pPr>
-            <a:r>
-              <a:rPr lang="es" sz="1200"/>
-              <a:t>	testSetLocation_row_too_big</a:t>
-            </a:r>
-          </a:p>
-          <a:p>
-            <a:pPr lvl="0" rtl="0">
-              <a:spcBef>
-                <a:spcPts val="0"/>
-              </a:spcBef>
-              <a:buNone/>
-            </a:pPr>
-            <a:r>
-              <a:rPr lang="es" sz="1200"/>
-              <a:t>	testSetLocation_row_too_small</a:t>
-            </a:r>
-          </a:p>
-          <a:p>
-            <a:pPr lvl="0" rtl="0">
-              <a:spcBef>
-                <a:spcPts val="0"/>
-              </a:spcBef>
-              <a:buNone/>
-            </a:pPr>
-            <a:r>
-              <a:rPr lang="es" sz="1200"/>
-              <a:t>	testSetPowerLevel_zero</a:t>
-            </a:r>
-          </a:p>
-          <a:p>
-            <a:pPr lvl="0" rtl="0">
-              <a:spcBef>
-                <a:spcPts val="0"/>
-              </a:spcBef>
-              <a:buNone/>
-            </a:pPr>
-            <a:r>
-              <a:rPr lang="es" sz="1200"/>
-              <a:t>	testSetPowerLevel_too_small</a:t>
-            </a:r>
-          </a:p>
-          <a:p>
-            <a:pPr lvl="0" rtl="0">
-              <a:spcBef>
-                <a:spcPts val="0"/>
-              </a:spcBef>
-              <a:buNone/>
-            </a:pPr>
-            <a:r>
-              <a:rPr lang="es" sz="1200"/>
-              <a:t>	testSetPowerLevel_eight</a:t>
-            </a:r>
-          </a:p>
-          <a:p>
-            <a:pPr lvl="0" rtl="0">
-              <a:spcBef>
-                <a:spcPts val="0"/>
-              </a:spcBef>
-              <a:buNone/>
-            </a:pPr>
-            <a:r>
-              <a:rPr lang="es" sz="1200"/>
-              <a:t>	testSetPowerLevel_too_big</a:t>
-            </a:r>
-          </a:p>
-          <a:p>
-            <a:pPr lvl="0" rtl="0">
-              <a:spcBef>
-                <a:spcPts val="0"/>
-              </a:spcBef>
-              <a:buNone/>
-            </a:pPr>
-            <a:r>
-              <a:rPr lang="es" sz="1200"/>
-              <a:t>	testCanOccupy_river</a:t>
-            </a:r>
-          </a:p>
-          <a:p>
-            <a:pPr lvl="0" rtl="0">
-              <a:spcBef>
-                <a:spcPts val="0"/>
-              </a:spcBef>
-              <a:buNone/>
-            </a:pPr>
-            <a:r>
-              <a:rPr lang="es" sz="1200"/>
-              <a:t>	testCanOccupy_river_rat</a:t>
-            </a:r>
-          </a:p>
-          <a:p>
-            <a:pPr lvl="0" rtl="0">
-              <a:spcBef>
-                <a:spcPts val="0"/>
-              </a:spcBef>
-              <a:buNone/>
-            </a:pPr>
-            <a:r>
-              <a:rPr lang="es" sz="1200"/>
-              <a:t>	testCanOccupy_friendly_piece</a:t>
-            </a:r>
-          </a:p>
-          <a:p>
-            <a:pPr lvl="0" rtl="0">
-              <a:spcBef>
-                <a:spcPts val="0"/>
-              </a:spcBef>
-              <a:buNone/>
-            </a:pPr>
-            <a:r>
-              <a:rPr lang="es" sz="1200"/>
-              <a:t>	testCanOccupy_friendly_den</a:t>
-            </a:r>
-          </a:p>
-          <a:p>
-            <a:pPr lvl="0" rtl="0">
-              <a:spcBef>
-                <a:spcPts val="0"/>
-              </a:spcBef>
-              <a:buNone/>
-            </a:pPr>
-            <a:r>
-              <a:rPr lang="es" sz="1200"/>
-              <a:t>	testCanOccupy_square_not_adjacent_row</a:t>
-            </a:r>
-          </a:p>
-          <a:p>
-            <a:pPr lvl="0" rtl="0">
-              <a:spcBef>
-                <a:spcPts val="0"/>
-              </a:spcBef>
-              <a:buNone/>
-            </a:pPr>
-            <a:r>
-              <a:rPr lang="es" sz="1200"/>
-              <a:t>	testCanOccupy_square_not_adjacent_column</a:t>
-            </a:r>
-          </a:p>
-          <a:p>
-            <a:pPr lvl="0" rtl="0">
-              <a:spcBef>
-                <a:spcPts val="0"/>
-              </a:spcBef>
-              <a:buNone/>
-            </a:pPr>
-            <a:r>
-              <a:rPr lang="es" sz="1200"/>
-              <a:t>	testCanOccupy_square_not_adjacent_leopard</a:t>
-            </a:r>
-          </a:p>
-          <a:p>
-            <a:pPr lvl="0" rtl="0">
-              <a:spcBef>
-                <a:spcPts val="0"/>
-              </a:spcBef>
-              <a:buNone/>
-            </a:pPr>
-            <a:r>
-              <a:t/>
-            </a:r>
-            <a:endParaRPr sz="1200"/>
-          </a:p>
-          <a:p>
-            <a:pPr lvl="0" rtl="0">
-              <a:spcBef>
-                <a:spcPts val="0"/>
-              </a:spcBef>
-              <a:buNone/>
-            </a:pPr>
-            <a:r>
-              <a:t/>
-            </a:r>
-            <a:endParaRPr sz="1200"/>
-          </a:p>
-        </p:txBody>
-      </p:sp>
-      <p:sp>
-        <p:nvSpPr>
-          <p:cNvPr id="125" name="Shape 125"/>
-          <p:cNvSpPr txBox="1"/>
-          <p:nvPr/>
-        </p:nvSpPr>
-        <p:spPr>
-          <a:xfrm>
-            <a:off x="3135275" y="718025"/>
-            <a:ext cx="4150200" cy="1060200"/>
-          </a:xfrm>
-          <a:prstGeom prst="rect">
-            <a:avLst/>
-          </a:prstGeom>
-          <a:noFill/>
-          <a:ln>
-            <a:noFill/>
-          </a:ln>
-        </p:spPr>
-        <p:txBody>
-          <a:bodyPr anchorCtr="0" anchor="t" bIns="91425" lIns="91425" rIns="91425" wrap="square" tIns="91425">
-            <a:noAutofit/>
-          </a:bodyPr>
-          <a:lstStyle/>
-          <a:p>
-            <a:pPr lvl="0" rtl="0">
-              <a:spcBef>
-                <a:spcPts val="0"/>
-              </a:spcBef>
-              <a:buNone/>
-            </a:pPr>
-            <a:r>
-              <a:rPr b="1" lang="es" sz="1200"/>
-              <a:t>TestGameBoard</a:t>
-            </a:r>
-            <a:r>
-              <a:rPr lang="es" sz="1200"/>
-              <a:t>:</a:t>
-            </a:r>
-          </a:p>
-          <a:p>
-            <a:pPr lvl="0" rtl="0">
-              <a:spcBef>
-                <a:spcPts val="0"/>
-              </a:spcBef>
-              <a:buNone/>
-            </a:pPr>
-            <a:r>
-              <a:rPr lang="es" sz="1200"/>
-              <a:t>	testGetPieceAt_normal</a:t>
-            </a:r>
-          </a:p>
-          <a:p>
-            <a:pPr lvl="0" rtl="0">
-              <a:spcBef>
-                <a:spcPts val="0"/>
-              </a:spcBef>
-              <a:buNone/>
-            </a:pPr>
-            <a:r>
-              <a:rPr lang="es" sz="1200"/>
-              <a:t>	testGetPieceAt_column_too_big</a:t>
-            </a:r>
-          </a:p>
-          <a:p>
-            <a:pPr indent="457200" lvl="0" rtl="0">
-              <a:spcBef>
-                <a:spcPts val="0"/>
-              </a:spcBef>
-              <a:buNone/>
-            </a:pPr>
-            <a:r>
-              <a:rPr lang="es" sz="1200"/>
-              <a:t>testGetPieceAt_column_too_small	</a:t>
-            </a:r>
-          </a:p>
-          <a:p>
-            <a:pPr indent="457200" lvl="0" rtl="0">
-              <a:spcBef>
-                <a:spcPts val="0"/>
-              </a:spcBef>
-              <a:buNone/>
-            </a:pPr>
-            <a:r>
-              <a:rPr lang="es" sz="1200"/>
-              <a:t>testGetPieceAt_empty_square</a:t>
-            </a:r>
-          </a:p>
-          <a:p>
-            <a:pPr indent="457200" lvl="0" rtl="0">
-              <a:spcBef>
-                <a:spcPts val="0"/>
-              </a:spcBef>
-              <a:buNone/>
-            </a:pPr>
-            <a:r>
-              <a:rPr lang="es" sz="1200"/>
-              <a:t>testGetPieceAt_row_too_big</a:t>
-            </a:r>
-          </a:p>
-          <a:p>
-            <a:pPr lvl="0" rtl="0">
-              <a:spcBef>
-                <a:spcPts val="0"/>
-              </a:spcBef>
-              <a:buNone/>
-            </a:pPr>
-            <a:r>
-              <a:rPr lang="es" sz="1200"/>
-              <a:t>	testGetPieceAt_row_too_small</a:t>
-            </a:r>
-          </a:p>
-          <a:p>
-            <a:pPr lvl="0" rtl="0">
-              <a:spcBef>
-                <a:spcPts val="0"/>
-              </a:spcBef>
-              <a:buNone/>
-            </a:pPr>
-            <a:r>
-              <a:rPr lang="es" sz="1200"/>
-              <a:t>	testGetSquareAt_top_left_table_edge</a:t>
-            </a:r>
-          </a:p>
-          <a:p>
-            <a:pPr lvl="0" rtl="0">
-              <a:spcBef>
-                <a:spcPts val="0"/>
-              </a:spcBef>
-              <a:buNone/>
-            </a:pPr>
-            <a:r>
-              <a:rPr lang="es" sz="1200"/>
-              <a:t>	testGetSquareAt_bottom_right_table_edge</a:t>
-            </a:r>
-          </a:p>
-          <a:p>
-            <a:pPr lvl="0" rtl="0">
-              <a:spcBef>
-                <a:spcPts val="0"/>
-              </a:spcBef>
-              <a:buNone/>
-            </a:pPr>
-            <a:r>
-              <a:rPr lang="es" sz="1200"/>
-              <a:t>	testGetSquareAt_column_too_big</a:t>
-            </a:r>
-          </a:p>
-          <a:p>
-            <a:pPr lvl="0" rtl="0">
-              <a:spcBef>
-                <a:spcPts val="0"/>
-              </a:spcBef>
-              <a:buNone/>
-            </a:pPr>
-            <a:r>
-              <a:rPr lang="es" sz="1200"/>
-              <a:t>	testGetSquareAt_column_too_small</a:t>
-            </a:r>
-          </a:p>
-          <a:p>
-            <a:pPr lvl="0" rtl="0">
-              <a:spcBef>
-                <a:spcPts val="0"/>
-              </a:spcBef>
-              <a:buNone/>
-            </a:pPr>
-            <a:r>
-              <a:rPr lang="es" sz="1200"/>
-              <a:t>	testGetSquareAt_row_too_big</a:t>
-            </a:r>
-          </a:p>
-          <a:p>
-            <a:pPr lvl="0" rtl="0">
-              <a:spcBef>
-                <a:spcPts val="0"/>
-              </a:spcBef>
-              <a:buNone/>
-            </a:pPr>
-            <a:r>
-              <a:rPr lang="es" sz="1200"/>
-              <a:t>	testGetSquareAt_row_too_small</a:t>
-            </a:r>
-          </a:p>
-          <a:p>
-            <a:pPr lvl="0" rtl="0">
-              <a:spcBef>
-                <a:spcPts val="0"/>
-              </a:spcBef>
-              <a:buNone/>
-            </a:pPr>
-            <a:r>
-              <a:rPr lang="es" sz="1200"/>
-              <a:t>	testGetValidMoves_corner</a:t>
-            </a:r>
-          </a:p>
-          <a:p>
-            <a:pPr lvl="0" rtl="0">
-              <a:spcBef>
-                <a:spcPts val="0"/>
-              </a:spcBef>
-              <a:buNone/>
-            </a:pPr>
-            <a:r>
-              <a:rPr lang="es" sz="1200"/>
-              <a:t>	testGetValidMoves_leopard</a:t>
-            </a:r>
-          </a:p>
-          <a:p>
-            <a:pPr lvl="0" rtl="0">
-              <a:spcBef>
-                <a:spcPts val="0"/>
-              </a:spcBef>
-              <a:buNone/>
-            </a:pPr>
-            <a:r>
-              <a:rPr lang="es" sz="1200"/>
-              <a:t>	testMovePiece</a:t>
-            </a:r>
-          </a:p>
-          <a:p>
-            <a:pPr lvl="0" rtl="0">
-              <a:spcBef>
-                <a:spcPts val="0"/>
-              </a:spcBef>
-              <a:buNone/>
-            </a:pPr>
-            <a:r>
-              <a:rPr lang="es" sz="1200"/>
-              <a:t>	</a:t>
-            </a:r>
-          </a:p>
-          <a:p>
-            <a:pPr lvl="0" rtl="0">
-              <a:spcBef>
-                <a:spcPts val="0"/>
-              </a:spcBef>
-              <a:buNone/>
-            </a:pPr>
-            <a:r>
-              <a:t/>
-            </a:r>
-            <a:endParaRPr sz="1200"/>
-          </a:p>
-        </p:txBody>
-      </p:sp>
-      <p:sp>
-        <p:nvSpPr>
-          <p:cNvPr id="126" name="Shape 126"/>
-          <p:cNvSpPr txBox="1"/>
-          <p:nvPr/>
-        </p:nvSpPr>
-        <p:spPr>
-          <a:xfrm>
-            <a:off x="6024700" y="2930800"/>
-            <a:ext cx="3090000" cy="1586100"/>
-          </a:xfrm>
-          <a:prstGeom prst="rect">
-            <a:avLst/>
-          </a:prstGeom>
-          <a:noFill/>
-          <a:ln>
-            <a:noFill/>
-          </a:ln>
-        </p:spPr>
-        <p:txBody>
-          <a:bodyPr anchorCtr="0" anchor="t" bIns="91425" lIns="91425" rIns="91425" wrap="square" tIns="91425">
-            <a:noAutofit/>
-          </a:bodyPr>
-          <a:lstStyle/>
-          <a:p>
-            <a:pPr lvl="0" rtl="0">
-              <a:spcBef>
-                <a:spcPts val="0"/>
-              </a:spcBef>
-              <a:buNone/>
-            </a:pPr>
-            <a:r>
-              <a:rPr b="1" lang="es" sz="1200"/>
-              <a:t>TestBoardSquare</a:t>
-            </a:r>
-            <a:r>
-              <a:rPr lang="es" sz="1200"/>
-              <a:t>:</a:t>
-            </a:r>
-          </a:p>
-          <a:p>
-            <a:pPr lvl="0" rtl="0">
-              <a:spcBef>
-                <a:spcPts val="0"/>
-              </a:spcBef>
-              <a:buNone/>
-            </a:pPr>
-            <a:r>
-              <a:rPr lang="es" sz="1200"/>
-              <a:t>	testConstructorWithPlayerColor</a:t>
-            </a:r>
-          </a:p>
-          <a:p>
-            <a:pPr lvl="0" rtl="0">
-              <a:spcBef>
-                <a:spcPts val="0"/>
-              </a:spcBef>
-              <a:buNone/>
-            </a:pPr>
-            <a:r>
-              <a:rPr lang="es" sz="1200"/>
-              <a:t>	testClearPiece</a:t>
-            </a:r>
-          </a:p>
-          <a:p>
-            <a:pPr lvl="0" rtl="0">
-              <a:spcBef>
-                <a:spcPts val="0"/>
-              </a:spcBef>
-              <a:buNone/>
-            </a:pPr>
-            <a:r>
-              <a:rPr lang="es" sz="1200"/>
-              <a:t>	testIsEmpty</a:t>
-            </a:r>
-          </a:p>
-          <a:p>
-            <a:pPr indent="0" lvl="0" marL="457200" rtl="0">
-              <a:spcBef>
-                <a:spcPts val="0"/>
-              </a:spcBef>
-              <a:buNone/>
-            </a:pPr>
-            <a:r>
-              <a:rPr lang="es" sz="1200"/>
-              <a:t>testIsEmpty_not</a:t>
-            </a:r>
-          </a:p>
-          <a:p>
-            <a:pPr lvl="0" rtl="0">
-              <a:spcBef>
-                <a:spcPts val="0"/>
-              </a:spcBef>
-              <a:buNone/>
-            </a:pPr>
-            <a:r>
-              <a:rPr lang="es" sz="1200"/>
-              <a:t>	testSetPiece</a:t>
-            </a:r>
-          </a:p>
-          <a:p>
-            <a:pPr lvl="0" rtl="0">
-              <a:spcBef>
-                <a:spcPts val="0"/>
-              </a:spcBef>
-              <a:buNone/>
-            </a:pPr>
-            <a:r>
-              <a:rPr lang="es" sz="1200"/>
-              <a:t>	testSetPiece_null</a:t>
-            </a:r>
-          </a:p>
-          <a:p>
-            <a:pPr lvl="0" rtl="0">
-              <a:spcBef>
-                <a:spcPts val="0"/>
-              </a:spcBef>
-              <a:buNone/>
-            </a:pPr>
-            <a:r>
-              <a:t/>
-            </a:r>
-            <a:endParaRPr sz="1200"/>
-          </a:p>
-          <a:p>
-            <a:pPr lvl="0" rtl="0">
-              <a:spcBef>
-                <a:spcPts val="0"/>
-              </a:spcBef>
-              <a:buNone/>
-            </a:pPr>
-            <a:r>
-              <a:t/>
-            </a:r>
-            <a:endParaRPr sz="1200"/>
-          </a:p>
-          <a:p>
-            <a:pPr lvl="0" rtl="0">
-              <a:spcBef>
-                <a:spcPts val="0"/>
-              </a:spcBef>
-              <a:buNone/>
-            </a:pPr>
-            <a:r>
-              <a:t/>
-            </a:r>
-            <a:endParaRPr sz="1200"/>
-          </a:p>
-          <a:p>
-            <a:pPr lvl="0" rtl="0">
-              <a:spcBef>
-                <a:spcPts val="0"/>
-              </a:spcBef>
-              <a:buNone/>
-            </a:pPr>
-            <a:r>
-              <a:t/>
-            </a:r>
-            <a:endParaRPr sz="1200"/>
-          </a:p>
-          <a:p>
-            <a:pPr lvl="0" rtl="0">
-              <a:spcBef>
-                <a:spcPts val="0"/>
-              </a:spcBef>
-              <a:buNone/>
-            </a:pPr>
-            <a:r>
-              <a:t/>
-            </a:r>
-            <a:endParaRPr sz="1200"/>
-          </a:p>
-          <a:p>
-            <a:pPr lvl="0" rtl="0">
-              <a:spcBef>
-                <a:spcPts val="0"/>
-              </a:spcBef>
-              <a:buNone/>
-            </a:pPr>
-            <a:r>
-              <a:t/>
-            </a:r>
-            <a:endParaRPr sz="1200"/>
-          </a:p>
-          <a:p>
-            <a:pPr lvl="0" rtl="0">
-              <a:spcBef>
-                <a:spcPts val="0"/>
-              </a:spcBef>
-              <a:buNone/>
-            </a:pPr>
-            <a:r>
-              <a:t/>
-            </a:r>
-            <a:endParaRPr sz="1200"/>
-          </a:p>
-          <a:p>
-            <a:pPr lvl="0" rtl="0">
-              <a:spcBef>
-                <a:spcPts val="0"/>
-              </a:spcBef>
-              <a:buNone/>
-            </a:pPr>
-            <a:r>
-              <a:t/>
-            </a:r>
-            <a:endParaRPr sz="1200"/>
-          </a:p>
-          <a:p>
-            <a:pPr lvl="0" rtl="0">
-              <a:spcBef>
-                <a:spcPts val="0"/>
-              </a:spcBef>
-              <a:buNone/>
-            </a:pPr>
-            <a:r>
-              <a:t/>
-            </a:r>
-            <a:endParaRPr sz="1200"/>
-          </a:p>
-          <a:p>
-            <a:pPr lvl="0" rtl="0">
-              <a:spcBef>
-                <a:spcPts val="0"/>
-              </a:spcBef>
-              <a:buNone/>
-            </a:pPr>
-            <a:r>
-              <a:t/>
-            </a:r>
-            <a:endParaRPr sz="1200"/>
-          </a:p>
-          <a:p>
-            <a:pPr lvl="0" rtl="0">
-              <a:spcBef>
-                <a:spcPts val="0"/>
-              </a:spcBef>
-              <a:buNone/>
-            </a:pPr>
-            <a:r>
-              <a:t/>
-            </a:r>
-            <a:endParaRPr sz="1200"/>
-          </a:p>
-        </p:txBody>
-      </p:sp>
-      <p:sp>
-        <p:nvSpPr>
-          <p:cNvPr id="127" name="Shape 127"/>
-          <p:cNvSpPr txBox="1"/>
-          <p:nvPr/>
-        </p:nvSpPr>
-        <p:spPr>
-          <a:xfrm>
-            <a:off x="5918400" y="228475"/>
-            <a:ext cx="2913900" cy="705000"/>
-          </a:xfrm>
-          <a:prstGeom prst="rect">
-            <a:avLst/>
-          </a:prstGeom>
-          <a:noFill/>
-          <a:ln>
-            <a:noFill/>
-          </a:ln>
-        </p:spPr>
-        <p:txBody>
-          <a:bodyPr anchorCtr="0" anchor="t" bIns="91425" lIns="91425" rIns="91425" wrap="square" tIns="91425">
-            <a:noAutofit/>
-          </a:bodyPr>
-          <a:lstStyle/>
-          <a:p>
-            <a:pPr indent="0" lvl="0" marL="0" rtl="0">
-              <a:lnSpc>
-                <a:spcPct val="115000"/>
-              </a:lnSpc>
-              <a:spcBef>
-                <a:spcPts val="0"/>
-              </a:spcBef>
-              <a:buNone/>
-            </a:pPr>
-            <a:r>
-              <a:rPr b="1" lang="es" sz="1100">
-                <a:solidFill>
-                  <a:schemeClr val="dk1"/>
-                </a:solidFill>
-              </a:rPr>
-              <a:t>TestAccountHandler</a:t>
-            </a:r>
-          </a:p>
-          <a:p>
-            <a:pPr indent="457200" lvl="0" marL="0" rtl="0">
-              <a:lnSpc>
-                <a:spcPct val="115000"/>
-              </a:lnSpc>
-              <a:spcBef>
-                <a:spcPts val="0"/>
-              </a:spcBef>
-              <a:buNone/>
-            </a:pPr>
-            <a:r>
-              <a:rPr lang="es" sz="1100">
-                <a:solidFill>
-                  <a:schemeClr val="dk1"/>
-                </a:solidFill>
-              </a:rPr>
-              <a:t>testRegisterUser</a:t>
-            </a:r>
-          </a:p>
-          <a:p>
-            <a:pPr indent="457200" lvl="0" marL="0" rtl="0">
-              <a:lnSpc>
-                <a:spcPct val="115000"/>
-              </a:lnSpc>
-              <a:spcBef>
-                <a:spcPts val="0"/>
-              </a:spcBef>
-              <a:buNone/>
-            </a:pPr>
-            <a:r>
-              <a:rPr lang="es" sz="1100">
-                <a:solidFill>
-                  <a:schemeClr val="dk1"/>
-                </a:solidFill>
-              </a:rPr>
-              <a:t>testRegisterUserAlreadyRegistered</a:t>
-            </a:r>
-          </a:p>
-          <a:p>
-            <a:pPr indent="457200" lvl="0" marL="0" rtl="0">
-              <a:lnSpc>
-                <a:spcPct val="115000"/>
-              </a:lnSpc>
-              <a:spcBef>
-                <a:spcPts val="0"/>
-              </a:spcBef>
-              <a:buNone/>
-            </a:pPr>
-            <a:r>
-              <a:rPr lang="es" sz="1100">
-                <a:solidFill>
-                  <a:schemeClr val="dk1"/>
-                </a:solidFill>
-              </a:rPr>
-              <a:t>testRegisterUserFailure</a:t>
-            </a:r>
-          </a:p>
-          <a:p>
-            <a:pPr indent="457200" lvl="0" marL="0" rtl="0">
-              <a:lnSpc>
-                <a:spcPct val="115000"/>
-              </a:lnSpc>
-              <a:spcBef>
-                <a:spcPts val="0"/>
-              </a:spcBef>
-              <a:buNone/>
-            </a:pPr>
-            <a:r>
-              <a:rPr lang="es" sz="1100">
-                <a:solidFill>
-                  <a:schemeClr val="dk1"/>
-                </a:solidFill>
-              </a:rPr>
-              <a:t>testUnregisterUser</a:t>
-            </a:r>
-          </a:p>
-          <a:p>
-            <a:pPr indent="457200" lvl="0" marL="0" rtl="0">
-              <a:lnSpc>
-                <a:spcPct val="115000"/>
-              </a:lnSpc>
-              <a:spcBef>
-                <a:spcPts val="0"/>
-              </a:spcBef>
-              <a:buNone/>
-            </a:pPr>
-            <a:r>
-              <a:rPr lang="es" sz="1100">
-                <a:solidFill>
-                  <a:schemeClr val="dk1"/>
-                </a:solidFill>
-              </a:rPr>
-              <a:t>testValidateLogin</a:t>
-            </a:r>
-          </a:p>
-          <a:p>
-            <a:pPr indent="457200" lvl="0" marL="0" rtl="0">
-              <a:lnSpc>
-                <a:spcPct val="115000"/>
-              </a:lnSpc>
-              <a:spcBef>
-                <a:spcPts val="0"/>
-              </a:spcBef>
-              <a:buNone/>
-            </a:pPr>
-            <a:r>
-              <a:rPr lang="es" sz="1100">
-                <a:solidFill>
-                  <a:schemeClr val="dk1"/>
-                </a:solidFill>
-              </a:rPr>
-              <a:t>testLogout</a:t>
-            </a:r>
-          </a:p>
-        </p:txBody>
-      </p:sp>
+      </p:pic>
     </p:spTree>
   </p:cSld>
   <p:clrMapOvr>
@@ -6491,7 +5790,7 @@
     </p:bg>
     <p:spTree>
       <p:nvGrpSpPr>
-        <p:cNvPr id="131" name="Shape 131"/>
+        <p:cNvPr id="130" name="Shape 130"/>
         <p:cNvGrpSpPr/>
         <p:nvPr/>
       </p:nvGrpSpPr>
@@ -6505,14 +5804,63 @@
       </p:grpSpPr>
       <p:sp>
         <p:nvSpPr>
+          <p:cNvPr id="131" name="Shape 131"/>
+          <p:cNvSpPr txBox="1"/>
+          <p:nvPr>
+            <p:ph type="title"/>
+          </p:nvPr>
+        </p:nvSpPr>
+        <p:spPr>
+          <a:xfrm>
+            <a:off x="311700" y="114700"/>
+            <a:ext cx="8520600" cy="572700"/>
+          </a:xfrm>
+          <a:prstGeom prst="rect">
+            <a:avLst/>
+          </a:prstGeom>
+        </p:spPr>
+        <p:txBody>
+          <a:bodyPr anchorCtr="0" anchor="t" bIns="91425" lIns="91425" rIns="91425" wrap="square" tIns="91425">
+            <a:noAutofit/>
+          </a:bodyPr>
+          <a:lstStyle/>
+          <a:p>
+            <a:pPr lvl="0" rtl="0" algn="l">
+              <a:spcBef>
+                <a:spcPts val="0"/>
+              </a:spcBef>
+              <a:buNone/>
+            </a:pPr>
+            <a:r>
+              <a:rPr b="1" i="1" lang="es">
+                <a:latin typeface="Cambria"/>
+                <a:ea typeface="Cambria"/>
+                <a:cs typeface="Cambria"/>
+                <a:sym typeface="Cambria"/>
+              </a:rPr>
+              <a:t>Class Diagram cont.</a:t>
+            </a:r>
+          </a:p>
+        </p:txBody>
+      </p:sp>
+      <p:pic>
+        <p:nvPicPr>
           <p:cNvPr id="132" name="Shape 132"/>
-          <p:cNvSpPr txBox="1"/>
+          <p:cNvPicPr preferRelativeResize="0"/>
           <p:nvPr/>
-        </p:nvSpPr>
-        <p:spPr>
-          <a:xfrm>
-            <a:off x="1880250" y="1306650"/>
-            <a:ext cx="5775600" cy="2429100"/>
+        </p:nvPicPr>
+        <p:blipFill>
+          <a:blip r:embed="rId3">
+            <a:alphaModFix/>
+          </a:blip>
+          <a:stretch>
+            <a:fillRect/>
+          </a:stretch>
+        </p:blipFill>
+        <p:spPr>
+          <a:xfrm>
+            <a:off x="152400" y="839800"/>
+            <a:ext cx="8839201" cy="3666109"/>
           </a:xfrm>
           <a:prstGeom prst="rect">
             <a:avLst/>
@@ -6522,29 +5870,7 @@
             <a:noFill/>
           </a:ln>
         </p:spPr>
-        <p:txBody>
-          <a:bodyPr anchorCtr="0" anchor="ctr" bIns="91425" lIns="91425" rIns="91425" wrap="square" tIns="91425">
-            <a:noAutofit/>
-          </a:bodyPr>
-          <a:lstStyle/>
-          <a:p>
-            <a:pPr indent="457200" lvl="0" marL="1371600" rtl="0">
-              <a:spcBef>
-                <a:spcPts val="0"/>
-              </a:spcBef>
-              <a:buNone/>
-            </a:pPr>
-            <a:r>
-              <a:rPr b="1" lang="es" sz="4800">
-                <a:solidFill>
-                  <a:schemeClr val="dk1"/>
-                </a:solidFill>
-              </a:rPr>
-              <a:t>Demo</a:t>
-            </a:r>
-          </a:p>
-        </p:txBody>
-      </p:sp>
+      </p:pic>
     </p:spTree>
   </p:cSld>
   <p:clrMapOvr>
@@ -6581,6 +5907,1079 @@
         <p:nvSpPr>
           <p:cNvPr id="137" name="Shape 137"/>
           <p:cNvSpPr txBox="1"/>
+          <p:nvPr>
+            <p:ph type="title"/>
+          </p:nvPr>
+        </p:nvSpPr>
+        <p:spPr>
+          <a:xfrm>
+            <a:off x="285575" y="179950"/>
+            <a:ext cx="8520600" cy="572700"/>
+          </a:xfrm>
+          <a:prstGeom prst="rect">
+            <a:avLst/>
+          </a:prstGeom>
+        </p:spPr>
+        <p:txBody>
+          <a:bodyPr anchorCtr="0" anchor="t" bIns="91425" lIns="91425" rIns="91425" wrap="square" tIns="91425">
+            <a:noAutofit/>
+          </a:bodyPr>
+          <a:lstStyle/>
+          <a:p>
+            <a:pPr lvl="0" rtl="0" algn="l">
+              <a:spcBef>
+                <a:spcPts val="0"/>
+              </a:spcBef>
+              <a:buNone/>
+            </a:pPr>
+            <a:r>
+              <a:rPr b="1" i="1" lang="es">
+                <a:latin typeface="Cambria"/>
+                <a:ea typeface="Cambria"/>
+                <a:cs typeface="Cambria"/>
+                <a:sym typeface="Cambria"/>
+              </a:rPr>
+              <a:t>List of test cases:</a:t>
+            </a:r>
+          </a:p>
+          <a:p>
+            <a:pPr lvl="0" rtl="0" algn="l">
+              <a:spcBef>
+                <a:spcPts val="0"/>
+              </a:spcBef>
+              <a:buNone/>
+            </a:pPr>
+            <a:r>
+              <a:t/>
+            </a:r>
+            <a:endParaRPr b="1" i="1">
+              <a:latin typeface="Cambria"/>
+              <a:ea typeface="Cambria"/>
+              <a:cs typeface="Cambria"/>
+              <a:sym typeface="Cambria"/>
+            </a:endParaRPr>
+          </a:p>
+        </p:txBody>
+      </p:sp>
+      <p:sp>
+        <p:nvSpPr>
+          <p:cNvPr id="138" name="Shape 138"/>
+          <p:cNvSpPr txBox="1"/>
+          <p:nvPr/>
+        </p:nvSpPr>
+        <p:spPr>
+          <a:xfrm>
+            <a:off x="311700" y="1190000"/>
+            <a:ext cx="4319700" cy="3883800"/>
+          </a:xfrm>
+          <a:prstGeom prst="rect">
+            <a:avLst/>
+          </a:prstGeom>
+          <a:noFill/>
+          <a:ln>
+            <a:noFill/>
+          </a:ln>
+        </p:spPr>
+        <p:txBody>
+          <a:bodyPr anchorCtr="0" anchor="t" bIns="91425" lIns="91425" rIns="91425" wrap="square" tIns="91425">
+            <a:noAutofit/>
+          </a:bodyPr>
+          <a:lstStyle/>
+          <a:p>
+            <a:pPr lvl="0" rtl="0">
+              <a:spcBef>
+                <a:spcPts val="0"/>
+              </a:spcBef>
+              <a:buNone/>
+            </a:pPr>
+            <a:r>
+              <a:rPr b="1" lang="es" sz="1200"/>
+              <a:t>TestBoardSquare</a:t>
+            </a:r>
+            <a:r>
+              <a:rPr lang="es" sz="1200"/>
+              <a:t>:</a:t>
+            </a:r>
+          </a:p>
+          <a:p>
+            <a:pPr lvl="0" rtl="0">
+              <a:spcBef>
+                <a:spcPts val="0"/>
+              </a:spcBef>
+              <a:buNone/>
+            </a:pPr>
+            <a:r>
+              <a:rPr lang="es" sz="1200"/>
+              <a:t>	testSetLocation_bottom_right_corner</a:t>
+            </a:r>
+          </a:p>
+          <a:p>
+            <a:pPr lvl="0" rtl="0">
+              <a:spcBef>
+                <a:spcPts val="0"/>
+              </a:spcBef>
+              <a:buNone/>
+            </a:pPr>
+            <a:r>
+              <a:rPr lang="es" sz="1200"/>
+              <a:t>	testSetLocation_column_too_big</a:t>
+            </a:r>
+          </a:p>
+          <a:p>
+            <a:pPr lvl="0" rtl="0">
+              <a:spcBef>
+                <a:spcPts val="0"/>
+              </a:spcBef>
+              <a:buNone/>
+            </a:pPr>
+            <a:r>
+              <a:rPr lang="es" sz="1200"/>
+              <a:t>	testSetLocation_column_too_small</a:t>
+            </a:r>
+          </a:p>
+          <a:p>
+            <a:pPr lvl="0" rtl="0">
+              <a:spcBef>
+                <a:spcPts val="0"/>
+              </a:spcBef>
+              <a:buNone/>
+            </a:pPr>
+            <a:r>
+              <a:rPr lang="es" sz="1200"/>
+              <a:t>	testSetLocation_row_too_big</a:t>
+            </a:r>
+          </a:p>
+          <a:p>
+            <a:pPr lvl="0" rtl="0">
+              <a:spcBef>
+                <a:spcPts val="0"/>
+              </a:spcBef>
+              <a:buNone/>
+            </a:pPr>
+            <a:r>
+              <a:rPr lang="es" sz="1200"/>
+              <a:t>	testSetLocation_row_too_small</a:t>
+            </a:r>
+          </a:p>
+          <a:p>
+            <a:pPr lvl="0" rtl="0">
+              <a:spcBef>
+                <a:spcPts val="0"/>
+              </a:spcBef>
+              <a:buNone/>
+            </a:pPr>
+            <a:r>
+              <a:rPr lang="es" sz="1200"/>
+              <a:t>	testSetPowerLevel_zero</a:t>
+            </a:r>
+          </a:p>
+          <a:p>
+            <a:pPr lvl="0" rtl="0">
+              <a:spcBef>
+                <a:spcPts val="0"/>
+              </a:spcBef>
+              <a:buNone/>
+            </a:pPr>
+            <a:r>
+              <a:rPr lang="es" sz="1200"/>
+              <a:t>	testSetPowerLevel_too_small</a:t>
+            </a:r>
+          </a:p>
+          <a:p>
+            <a:pPr lvl="0" rtl="0">
+              <a:spcBef>
+                <a:spcPts val="0"/>
+              </a:spcBef>
+              <a:buNone/>
+            </a:pPr>
+            <a:r>
+              <a:rPr lang="es" sz="1200"/>
+              <a:t>	testSetPowerLevel_eight</a:t>
+            </a:r>
+          </a:p>
+          <a:p>
+            <a:pPr lvl="0" rtl="0">
+              <a:spcBef>
+                <a:spcPts val="0"/>
+              </a:spcBef>
+              <a:buNone/>
+            </a:pPr>
+            <a:r>
+              <a:rPr lang="es" sz="1200"/>
+              <a:t>	testSetPowerLevel_too_big</a:t>
+            </a:r>
+          </a:p>
+          <a:p>
+            <a:pPr lvl="0" rtl="0">
+              <a:spcBef>
+                <a:spcPts val="0"/>
+              </a:spcBef>
+              <a:buNone/>
+            </a:pPr>
+            <a:r>
+              <a:rPr lang="es" sz="1200"/>
+              <a:t>	testCanOccupy_river</a:t>
+            </a:r>
+          </a:p>
+          <a:p>
+            <a:pPr lvl="0" rtl="0">
+              <a:spcBef>
+                <a:spcPts val="0"/>
+              </a:spcBef>
+              <a:buNone/>
+            </a:pPr>
+            <a:r>
+              <a:rPr lang="es" sz="1200"/>
+              <a:t>	testCanOccupy_river_rat</a:t>
+            </a:r>
+          </a:p>
+          <a:p>
+            <a:pPr lvl="0" rtl="0">
+              <a:spcBef>
+                <a:spcPts val="0"/>
+              </a:spcBef>
+              <a:buNone/>
+            </a:pPr>
+            <a:r>
+              <a:rPr lang="es" sz="1200"/>
+              <a:t>	testCanOccupy_friendly_piece</a:t>
+            </a:r>
+          </a:p>
+          <a:p>
+            <a:pPr lvl="0" rtl="0">
+              <a:spcBef>
+                <a:spcPts val="0"/>
+              </a:spcBef>
+              <a:buNone/>
+            </a:pPr>
+            <a:r>
+              <a:rPr lang="es" sz="1200"/>
+              <a:t>	testCanOccupy_friendly_den</a:t>
+            </a:r>
+          </a:p>
+          <a:p>
+            <a:pPr lvl="0" rtl="0">
+              <a:spcBef>
+                <a:spcPts val="0"/>
+              </a:spcBef>
+              <a:buNone/>
+            </a:pPr>
+            <a:r>
+              <a:rPr lang="es" sz="1200"/>
+              <a:t>	testCanOccupy_square_not_adjacent_row</a:t>
+            </a:r>
+          </a:p>
+          <a:p>
+            <a:pPr lvl="0" rtl="0">
+              <a:spcBef>
+                <a:spcPts val="0"/>
+              </a:spcBef>
+              <a:buNone/>
+            </a:pPr>
+            <a:r>
+              <a:rPr lang="es" sz="1200"/>
+              <a:t>	testCanOccupy_square_not_adjacent_column</a:t>
+            </a:r>
+          </a:p>
+          <a:p>
+            <a:pPr lvl="0" rtl="0">
+              <a:spcBef>
+                <a:spcPts val="0"/>
+              </a:spcBef>
+              <a:buNone/>
+            </a:pPr>
+            <a:r>
+              <a:rPr lang="es" sz="1200"/>
+              <a:t>	testCanOccupy_square_not_adjacent_leopard</a:t>
+            </a:r>
+          </a:p>
+          <a:p>
+            <a:pPr lvl="0" rtl="0">
+              <a:spcBef>
+                <a:spcPts val="0"/>
+              </a:spcBef>
+              <a:buNone/>
+            </a:pPr>
+            <a:r>
+              <a:t/>
+            </a:r>
+            <a:endParaRPr sz="1200"/>
+          </a:p>
+          <a:p>
+            <a:pPr lvl="0" rtl="0">
+              <a:spcBef>
+                <a:spcPts val="0"/>
+              </a:spcBef>
+              <a:buNone/>
+            </a:pPr>
+            <a:r>
+              <a:t/>
+            </a:r>
+            <a:endParaRPr sz="1200"/>
+          </a:p>
+        </p:txBody>
+      </p:sp>
+      <p:sp>
+        <p:nvSpPr>
+          <p:cNvPr id="139" name="Shape 139"/>
+          <p:cNvSpPr txBox="1"/>
+          <p:nvPr/>
+        </p:nvSpPr>
+        <p:spPr>
+          <a:xfrm>
+            <a:off x="3135275" y="718025"/>
+            <a:ext cx="4150200" cy="1060200"/>
+          </a:xfrm>
+          <a:prstGeom prst="rect">
+            <a:avLst/>
+          </a:prstGeom>
+          <a:noFill/>
+          <a:ln>
+            <a:noFill/>
+          </a:ln>
+        </p:spPr>
+        <p:txBody>
+          <a:bodyPr anchorCtr="0" anchor="t" bIns="91425" lIns="91425" rIns="91425" wrap="square" tIns="91425">
+            <a:noAutofit/>
+          </a:bodyPr>
+          <a:lstStyle/>
+          <a:p>
+            <a:pPr lvl="0" rtl="0">
+              <a:spcBef>
+                <a:spcPts val="0"/>
+              </a:spcBef>
+              <a:buNone/>
+            </a:pPr>
+            <a:r>
+              <a:rPr b="1" lang="es" sz="1200"/>
+              <a:t>TestGameBoard</a:t>
+            </a:r>
+            <a:r>
+              <a:rPr lang="es" sz="1200"/>
+              <a:t>:</a:t>
+            </a:r>
+          </a:p>
+          <a:p>
+            <a:pPr lvl="0" rtl="0">
+              <a:spcBef>
+                <a:spcPts val="0"/>
+              </a:spcBef>
+              <a:buNone/>
+            </a:pPr>
+            <a:r>
+              <a:rPr lang="es" sz="1200"/>
+              <a:t>	testGetPieceAt_normal</a:t>
+            </a:r>
+          </a:p>
+          <a:p>
+            <a:pPr lvl="0" rtl="0">
+              <a:spcBef>
+                <a:spcPts val="0"/>
+              </a:spcBef>
+              <a:buNone/>
+            </a:pPr>
+            <a:r>
+              <a:rPr lang="es" sz="1200"/>
+              <a:t>	testGetPieceAt_column_too_big</a:t>
+            </a:r>
+          </a:p>
+          <a:p>
+            <a:pPr indent="457200" lvl="0" rtl="0">
+              <a:spcBef>
+                <a:spcPts val="0"/>
+              </a:spcBef>
+              <a:buNone/>
+            </a:pPr>
+            <a:r>
+              <a:rPr lang="es" sz="1200"/>
+              <a:t>testGetPieceAt_column_too_small	</a:t>
+            </a:r>
+          </a:p>
+          <a:p>
+            <a:pPr indent="457200" lvl="0" rtl="0">
+              <a:spcBef>
+                <a:spcPts val="0"/>
+              </a:spcBef>
+              <a:buNone/>
+            </a:pPr>
+            <a:r>
+              <a:rPr lang="es" sz="1200"/>
+              <a:t>testGetPieceAt_empty_square</a:t>
+            </a:r>
+          </a:p>
+          <a:p>
+            <a:pPr indent="457200" lvl="0" rtl="0">
+              <a:spcBef>
+                <a:spcPts val="0"/>
+              </a:spcBef>
+              <a:buNone/>
+            </a:pPr>
+            <a:r>
+              <a:rPr lang="es" sz="1200"/>
+              <a:t>testGetPieceAt_row_too_big</a:t>
+            </a:r>
+          </a:p>
+          <a:p>
+            <a:pPr lvl="0" rtl="0">
+              <a:spcBef>
+                <a:spcPts val="0"/>
+              </a:spcBef>
+              <a:buNone/>
+            </a:pPr>
+            <a:r>
+              <a:rPr lang="es" sz="1200"/>
+              <a:t>	testGetPieceAt_row_too_small</a:t>
+            </a:r>
+          </a:p>
+          <a:p>
+            <a:pPr lvl="0" rtl="0">
+              <a:spcBef>
+                <a:spcPts val="0"/>
+              </a:spcBef>
+              <a:buNone/>
+            </a:pPr>
+            <a:r>
+              <a:rPr lang="es" sz="1200"/>
+              <a:t>	testGetSquareAt_top_left_table_edge</a:t>
+            </a:r>
+          </a:p>
+          <a:p>
+            <a:pPr lvl="0" rtl="0">
+              <a:spcBef>
+                <a:spcPts val="0"/>
+              </a:spcBef>
+              <a:buNone/>
+            </a:pPr>
+            <a:r>
+              <a:rPr lang="es" sz="1200"/>
+              <a:t>	testGetSquareAt_bottom_right_table_edge</a:t>
+            </a:r>
+          </a:p>
+          <a:p>
+            <a:pPr lvl="0" rtl="0">
+              <a:spcBef>
+                <a:spcPts val="0"/>
+              </a:spcBef>
+              <a:buNone/>
+            </a:pPr>
+            <a:r>
+              <a:rPr lang="es" sz="1200"/>
+              <a:t>	testGetSquareAt_column_too_big</a:t>
+            </a:r>
+          </a:p>
+          <a:p>
+            <a:pPr lvl="0" rtl="0">
+              <a:spcBef>
+                <a:spcPts val="0"/>
+              </a:spcBef>
+              <a:buNone/>
+            </a:pPr>
+            <a:r>
+              <a:rPr lang="es" sz="1200"/>
+              <a:t>	testGetSquareAt_column_too_small</a:t>
+            </a:r>
+          </a:p>
+          <a:p>
+            <a:pPr lvl="0" rtl="0">
+              <a:spcBef>
+                <a:spcPts val="0"/>
+              </a:spcBef>
+              <a:buNone/>
+            </a:pPr>
+            <a:r>
+              <a:rPr lang="es" sz="1200"/>
+              <a:t>	testGetSquareAt_row_too_big</a:t>
+            </a:r>
+          </a:p>
+          <a:p>
+            <a:pPr lvl="0" rtl="0">
+              <a:spcBef>
+                <a:spcPts val="0"/>
+              </a:spcBef>
+              <a:buNone/>
+            </a:pPr>
+            <a:r>
+              <a:rPr lang="es" sz="1200"/>
+              <a:t>	testGetSquareAt_row_too_small</a:t>
+            </a:r>
+          </a:p>
+          <a:p>
+            <a:pPr lvl="0" rtl="0">
+              <a:spcBef>
+                <a:spcPts val="0"/>
+              </a:spcBef>
+              <a:buNone/>
+            </a:pPr>
+            <a:r>
+              <a:rPr lang="es" sz="1200"/>
+              <a:t>	testGetValidMoves_corner</a:t>
+            </a:r>
+          </a:p>
+          <a:p>
+            <a:pPr lvl="0" rtl="0">
+              <a:spcBef>
+                <a:spcPts val="0"/>
+              </a:spcBef>
+              <a:buNone/>
+            </a:pPr>
+            <a:r>
+              <a:rPr lang="es" sz="1200"/>
+              <a:t>	testGetValidMoves_leopard</a:t>
+            </a:r>
+          </a:p>
+          <a:p>
+            <a:pPr lvl="0" rtl="0">
+              <a:spcBef>
+                <a:spcPts val="0"/>
+              </a:spcBef>
+              <a:buNone/>
+            </a:pPr>
+            <a:r>
+              <a:rPr lang="es" sz="1200"/>
+              <a:t>	testMovePiece</a:t>
+            </a:r>
+          </a:p>
+          <a:p>
+            <a:pPr lvl="0" rtl="0">
+              <a:spcBef>
+                <a:spcPts val="0"/>
+              </a:spcBef>
+              <a:buNone/>
+            </a:pPr>
+            <a:r>
+              <a:rPr lang="es" sz="1200"/>
+              <a:t>	</a:t>
+            </a:r>
+          </a:p>
+          <a:p>
+            <a:pPr lvl="0" rtl="0">
+              <a:spcBef>
+                <a:spcPts val="0"/>
+              </a:spcBef>
+              <a:buNone/>
+            </a:pPr>
+            <a:r>
+              <a:t/>
+            </a:r>
+            <a:endParaRPr sz="1200"/>
+          </a:p>
+        </p:txBody>
+      </p:sp>
+      <p:sp>
+        <p:nvSpPr>
+          <p:cNvPr id="140" name="Shape 140"/>
+          <p:cNvSpPr txBox="1"/>
+          <p:nvPr/>
+        </p:nvSpPr>
+        <p:spPr>
+          <a:xfrm>
+            <a:off x="6024700" y="2930800"/>
+            <a:ext cx="3090000" cy="1586100"/>
+          </a:xfrm>
+          <a:prstGeom prst="rect">
+            <a:avLst/>
+          </a:prstGeom>
+          <a:noFill/>
+          <a:ln>
+            <a:noFill/>
+          </a:ln>
+        </p:spPr>
+        <p:txBody>
+          <a:bodyPr anchorCtr="0" anchor="t" bIns="91425" lIns="91425" rIns="91425" wrap="square" tIns="91425">
+            <a:noAutofit/>
+          </a:bodyPr>
+          <a:lstStyle/>
+          <a:p>
+            <a:pPr lvl="0" rtl="0">
+              <a:spcBef>
+                <a:spcPts val="0"/>
+              </a:spcBef>
+              <a:buNone/>
+            </a:pPr>
+            <a:r>
+              <a:rPr b="1" lang="es" sz="1200"/>
+              <a:t>TestBoardSquare</a:t>
+            </a:r>
+            <a:r>
+              <a:rPr lang="es" sz="1200"/>
+              <a:t>:</a:t>
+            </a:r>
+          </a:p>
+          <a:p>
+            <a:pPr lvl="0" rtl="0">
+              <a:spcBef>
+                <a:spcPts val="0"/>
+              </a:spcBef>
+              <a:buNone/>
+            </a:pPr>
+            <a:r>
+              <a:rPr lang="es" sz="1200"/>
+              <a:t>	testConstructorWithPlayerColor</a:t>
+            </a:r>
+          </a:p>
+          <a:p>
+            <a:pPr lvl="0" rtl="0">
+              <a:spcBef>
+                <a:spcPts val="0"/>
+              </a:spcBef>
+              <a:buNone/>
+            </a:pPr>
+            <a:r>
+              <a:rPr lang="es" sz="1200"/>
+              <a:t>	testClearPiece</a:t>
+            </a:r>
+          </a:p>
+          <a:p>
+            <a:pPr lvl="0" rtl="0">
+              <a:spcBef>
+                <a:spcPts val="0"/>
+              </a:spcBef>
+              <a:buNone/>
+            </a:pPr>
+            <a:r>
+              <a:rPr lang="es" sz="1200"/>
+              <a:t>	testIsEmpty</a:t>
+            </a:r>
+          </a:p>
+          <a:p>
+            <a:pPr indent="0" lvl="0" marL="457200" rtl="0">
+              <a:spcBef>
+                <a:spcPts val="0"/>
+              </a:spcBef>
+              <a:buNone/>
+            </a:pPr>
+            <a:r>
+              <a:rPr lang="es" sz="1200"/>
+              <a:t>testIsEmpty_not</a:t>
+            </a:r>
+          </a:p>
+          <a:p>
+            <a:pPr lvl="0" rtl="0">
+              <a:spcBef>
+                <a:spcPts val="0"/>
+              </a:spcBef>
+              <a:buNone/>
+            </a:pPr>
+            <a:r>
+              <a:rPr lang="es" sz="1200"/>
+              <a:t>	testSetPiece</a:t>
+            </a:r>
+          </a:p>
+          <a:p>
+            <a:pPr lvl="0" rtl="0">
+              <a:spcBef>
+                <a:spcPts val="0"/>
+              </a:spcBef>
+              <a:buNone/>
+            </a:pPr>
+            <a:r>
+              <a:rPr lang="es" sz="1200"/>
+              <a:t>	testSetPiece_null</a:t>
+            </a:r>
+          </a:p>
+          <a:p>
+            <a:pPr lvl="0" rtl="0">
+              <a:spcBef>
+                <a:spcPts val="0"/>
+              </a:spcBef>
+              <a:buNone/>
+            </a:pPr>
+            <a:r>
+              <a:t/>
+            </a:r>
+            <a:endParaRPr sz="1200"/>
+          </a:p>
+          <a:p>
+            <a:pPr lvl="0" rtl="0">
+              <a:spcBef>
+                <a:spcPts val="0"/>
+              </a:spcBef>
+              <a:buNone/>
+            </a:pPr>
+            <a:r>
+              <a:t/>
+            </a:r>
+            <a:endParaRPr sz="1200"/>
+          </a:p>
+          <a:p>
+            <a:pPr lvl="0" rtl="0">
+              <a:spcBef>
+                <a:spcPts val="0"/>
+              </a:spcBef>
+              <a:buNone/>
+            </a:pPr>
+            <a:r>
+              <a:t/>
+            </a:r>
+            <a:endParaRPr sz="1200"/>
+          </a:p>
+          <a:p>
+            <a:pPr lvl="0" rtl="0">
+              <a:spcBef>
+                <a:spcPts val="0"/>
+              </a:spcBef>
+              <a:buNone/>
+            </a:pPr>
+            <a:r>
+              <a:t/>
+            </a:r>
+            <a:endParaRPr sz="1200"/>
+          </a:p>
+          <a:p>
+            <a:pPr lvl="0" rtl="0">
+              <a:spcBef>
+                <a:spcPts val="0"/>
+              </a:spcBef>
+              <a:buNone/>
+            </a:pPr>
+            <a:r>
+              <a:t/>
+            </a:r>
+            <a:endParaRPr sz="1200"/>
+          </a:p>
+          <a:p>
+            <a:pPr lvl="0" rtl="0">
+              <a:spcBef>
+                <a:spcPts val="0"/>
+              </a:spcBef>
+              <a:buNone/>
+            </a:pPr>
+            <a:r>
+              <a:t/>
+            </a:r>
+            <a:endParaRPr sz="1200"/>
+          </a:p>
+          <a:p>
+            <a:pPr lvl="0" rtl="0">
+              <a:spcBef>
+                <a:spcPts val="0"/>
+              </a:spcBef>
+              <a:buNone/>
+            </a:pPr>
+            <a:r>
+              <a:t/>
+            </a:r>
+            <a:endParaRPr sz="1200"/>
+          </a:p>
+          <a:p>
+            <a:pPr lvl="0" rtl="0">
+              <a:spcBef>
+                <a:spcPts val="0"/>
+              </a:spcBef>
+              <a:buNone/>
+            </a:pPr>
+            <a:r>
+              <a:t/>
+            </a:r>
+            <a:endParaRPr sz="1200"/>
+          </a:p>
+          <a:p>
+            <a:pPr lvl="0" rtl="0">
+              <a:spcBef>
+                <a:spcPts val="0"/>
+              </a:spcBef>
+              <a:buNone/>
+            </a:pPr>
+            <a:r>
+              <a:t/>
+            </a:r>
+            <a:endParaRPr sz="1200"/>
+          </a:p>
+          <a:p>
+            <a:pPr lvl="0" rtl="0">
+              <a:spcBef>
+                <a:spcPts val="0"/>
+              </a:spcBef>
+              <a:buNone/>
+            </a:pPr>
+            <a:r>
+              <a:t/>
+            </a:r>
+            <a:endParaRPr sz="1200"/>
+          </a:p>
+          <a:p>
+            <a:pPr lvl="0" rtl="0">
+              <a:spcBef>
+                <a:spcPts val="0"/>
+              </a:spcBef>
+              <a:buNone/>
+            </a:pPr>
+            <a:r>
+              <a:t/>
+            </a:r>
+            <a:endParaRPr sz="1200"/>
+          </a:p>
+        </p:txBody>
+      </p:sp>
+      <p:sp>
+        <p:nvSpPr>
+          <p:cNvPr id="141" name="Shape 141"/>
+          <p:cNvSpPr txBox="1"/>
+          <p:nvPr/>
+        </p:nvSpPr>
+        <p:spPr>
+          <a:xfrm>
+            <a:off x="5918400" y="228475"/>
+            <a:ext cx="2913900" cy="705000"/>
+          </a:xfrm>
+          <a:prstGeom prst="rect">
+            <a:avLst/>
+          </a:prstGeom>
+          <a:noFill/>
+          <a:ln>
+            <a:noFill/>
+          </a:ln>
+        </p:spPr>
+        <p:txBody>
+          <a:bodyPr anchorCtr="0" anchor="t" bIns="91425" lIns="91425" rIns="91425" wrap="square" tIns="91425">
+            <a:noAutofit/>
+          </a:bodyPr>
+          <a:lstStyle/>
+          <a:p>
+            <a:pPr indent="0" lvl="0" marL="0" rtl="0">
+              <a:lnSpc>
+                <a:spcPct val="115000"/>
+              </a:lnSpc>
+              <a:spcBef>
+                <a:spcPts val="0"/>
+              </a:spcBef>
+              <a:buNone/>
+            </a:pPr>
+            <a:r>
+              <a:rPr b="1" lang="es" sz="1100">
+                <a:solidFill>
+                  <a:schemeClr val="dk1"/>
+                </a:solidFill>
+              </a:rPr>
+              <a:t>TestAccountHandler</a:t>
+            </a:r>
+          </a:p>
+          <a:p>
+            <a:pPr indent="457200" lvl="0" marL="0" rtl="0">
+              <a:lnSpc>
+                <a:spcPct val="115000"/>
+              </a:lnSpc>
+              <a:spcBef>
+                <a:spcPts val="0"/>
+              </a:spcBef>
+              <a:buNone/>
+            </a:pPr>
+            <a:r>
+              <a:rPr lang="es" sz="1100">
+                <a:solidFill>
+                  <a:schemeClr val="dk1"/>
+                </a:solidFill>
+              </a:rPr>
+              <a:t>testRegisterUser</a:t>
+            </a:r>
+          </a:p>
+          <a:p>
+            <a:pPr indent="457200" lvl="0" marL="0" rtl="0">
+              <a:lnSpc>
+                <a:spcPct val="115000"/>
+              </a:lnSpc>
+              <a:spcBef>
+                <a:spcPts val="0"/>
+              </a:spcBef>
+              <a:buNone/>
+            </a:pPr>
+            <a:r>
+              <a:rPr lang="es" sz="1100">
+                <a:solidFill>
+                  <a:schemeClr val="dk1"/>
+                </a:solidFill>
+              </a:rPr>
+              <a:t>testRegisterUserAlreadyRegistered</a:t>
+            </a:r>
+          </a:p>
+          <a:p>
+            <a:pPr indent="457200" lvl="0" marL="0" rtl="0">
+              <a:lnSpc>
+                <a:spcPct val="115000"/>
+              </a:lnSpc>
+              <a:spcBef>
+                <a:spcPts val="0"/>
+              </a:spcBef>
+              <a:buNone/>
+            </a:pPr>
+            <a:r>
+              <a:rPr lang="es" sz="1100">
+                <a:solidFill>
+                  <a:schemeClr val="dk1"/>
+                </a:solidFill>
+              </a:rPr>
+              <a:t>testRegisterUserFailure</a:t>
+            </a:r>
+          </a:p>
+          <a:p>
+            <a:pPr indent="457200" lvl="0" marL="0" rtl="0">
+              <a:lnSpc>
+                <a:spcPct val="115000"/>
+              </a:lnSpc>
+              <a:spcBef>
+                <a:spcPts val="0"/>
+              </a:spcBef>
+              <a:buNone/>
+            </a:pPr>
+            <a:r>
+              <a:rPr lang="es" sz="1100">
+                <a:solidFill>
+                  <a:schemeClr val="dk1"/>
+                </a:solidFill>
+              </a:rPr>
+              <a:t>testUnregisterUser</a:t>
+            </a:r>
+          </a:p>
+          <a:p>
+            <a:pPr indent="457200" lvl="0" marL="0" rtl="0">
+              <a:lnSpc>
+                <a:spcPct val="115000"/>
+              </a:lnSpc>
+              <a:spcBef>
+                <a:spcPts val="0"/>
+              </a:spcBef>
+              <a:buNone/>
+            </a:pPr>
+            <a:r>
+              <a:rPr lang="es" sz="1100">
+                <a:solidFill>
+                  <a:schemeClr val="dk1"/>
+                </a:solidFill>
+              </a:rPr>
+              <a:t>testValidateLogin</a:t>
+            </a:r>
+          </a:p>
+          <a:p>
+            <a:pPr indent="457200" lvl="0" marL="0" rtl="0">
+              <a:lnSpc>
+                <a:spcPct val="115000"/>
+              </a:lnSpc>
+              <a:spcBef>
+                <a:spcPts val="0"/>
+              </a:spcBef>
+              <a:buNone/>
+            </a:pPr>
+            <a:r>
+              <a:rPr lang="es" sz="1100">
+                <a:solidFill>
+                  <a:schemeClr val="dk1"/>
+                </a:solidFill>
+              </a:rPr>
+              <a:t>testLogout</a:t>
+            </a:r>
+          </a:p>
+        </p:txBody>
+      </p:sp>
+    </p:spTree>
+  </p:cSld>
+  <p:clrMapOvr>
+    <a:masterClrMapping/>
+  </p:clrMapOvr>
+</p:sld>
+</file>
+
+<file path=ppt/slides/slide15.xml><?xml version="1.0" encoding="utf-8"?>
+<p:sld xmlns:a="http://schemas.openxmlformats.org/drawingml/2006/main" xmlns:r="http://schemas.openxmlformats.org/officeDocument/2006/relationships" xmlns:mc="http://schemas.openxmlformats.org/markup-compatibility/2006" xmlns:mv="urn:schemas-microsoft-com:mac:vml" xmlns:p="http://schemas.openxmlformats.org/presentationml/2006/main" xmlns:c="http://schemas.openxmlformats.org/drawingml/2006/chart" xmlns:dgm="http://schemas.openxmlformats.org/drawingml/2006/diagram" xmlns:o="urn:schemas-microsoft-com:office:office" xmlns:v="urn:schemas-microsoft-com:vml" xmlns:pvml="urn:schemas-microsoft-com:office:powerpoint" xmlns:com="http://schemas.openxmlformats.org/drawingml/2006/compatibility" xmlns:p14="http://schemas.microsoft.com/office/powerpoint/2010/main" xmlns:p15="http://schemas.microsoft.com/office/powerpoint/2012/main">
+  <p:cSld>
+    <p:bg>
+      <p:bgPr>
+        <a:solidFill>
+          <a:srgbClr val="EFEFEF"/>
+        </a:solidFill>
+      </p:bgPr>
+    </p:bg>
+    <p:spTree>
+      <p:nvGrpSpPr>
+        <p:cNvPr id="145" name="Shape 145"/>
+        <p:cNvGrpSpPr/>
+        <p:nvPr/>
+      </p:nvGrpSpPr>
+      <p:grpSpPr>
+        <a:xfrm>
+          <a:off x="0" y="0"/>
+          <a:ext cx="0" cy="0"/>
+          <a:chOff x="0" y="0"/>
+          <a:chExt cx="0" cy="0"/>
+        </a:xfrm>
+      </p:grpSpPr>
+      <p:sp>
+        <p:nvSpPr>
+          <p:cNvPr id="146" name="Shape 146"/>
+          <p:cNvSpPr txBox="1"/>
+          <p:nvPr/>
+        </p:nvSpPr>
+        <p:spPr>
+          <a:xfrm>
+            <a:off x="1880250" y="1306650"/>
+            <a:ext cx="5775600" cy="2429100"/>
+          </a:xfrm>
+          <a:prstGeom prst="rect">
+            <a:avLst/>
+          </a:prstGeom>
+          <a:noFill/>
+          <a:ln>
+            <a:noFill/>
+          </a:ln>
+        </p:spPr>
+        <p:txBody>
+          <a:bodyPr anchorCtr="0" anchor="ctr" bIns="91425" lIns="91425" rIns="91425" wrap="square" tIns="91425">
+            <a:noAutofit/>
+          </a:bodyPr>
+          <a:lstStyle/>
+          <a:p>
+            <a:pPr indent="457200" lvl="0" marL="1371600" rtl="0">
+              <a:spcBef>
+                <a:spcPts val="0"/>
+              </a:spcBef>
+              <a:buNone/>
+            </a:pPr>
+            <a:r>
+              <a:rPr b="1" lang="es" sz="4800">
+                <a:solidFill>
+                  <a:schemeClr val="dk1"/>
+                </a:solidFill>
+              </a:rPr>
+              <a:t>Demo</a:t>
+            </a:r>
+          </a:p>
+        </p:txBody>
+      </p:sp>
+    </p:spTree>
+  </p:cSld>
+  <p:clrMapOvr>
+    <a:masterClrMapping/>
+  </p:clrMapOvr>
+</p:sld>
+</file>
+
+<file path=ppt/slides/slide16.xml><?xml version="1.0" encoding="utf-8"?>
+<p:sld xmlns:a="http://schemas.openxmlformats.org/drawingml/2006/main" xmlns:r="http://schemas.openxmlformats.org/officeDocument/2006/relationships" xmlns:mc="http://schemas.openxmlformats.org/markup-compatibility/2006" xmlns:mv="urn:schemas-microsoft-com:mac:vml" xmlns:p="http://schemas.openxmlformats.org/presentationml/2006/main" xmlns:c="http://schemas.openxmlformats.org/drawingml/2006/chart" xmlns:dgm="http://schemas.openxmlformats.org/drawingml/2006/diagram" xmlns:o="urn:schemas-microsoft-com:office:office" xmlns:v="urn:schemas-microsoft-com:vml" xmlns:pvml="urn:schemas-microsoft-com:office:powerpoint" xmlns:com="http://schemas.openxmlformats.org/drawingml/2006/compatibility" xmlns:p14="http://schemas.microsoft.com/office/powerpoint/2010/main" xmlns:p15="http://schemas.microsoft.com/office/powerpoint/2012/main">
+  <p:cSld>
+    <p:bg>
+      <p:bgPr>
+        <a:solidFill>
+          <a:srgbClr val="EFEFEF"/>
+        </a:solidFill>
+      </p:bgPr>
+    </p:bg>
+    <p:spTree>
+      <p:nvGrpSpPr>
+        <p:cNvPr id="150" name="Shape 150"/>
+        <p:cNvGrpSpPr/>
+        <p:nvPr/>
+      </p:nvGrpSpPr>
+      <p:grpSpPr>
+        <a:xfrm>
+          <a:off x="0" y="0"/>
+          <a:ext cx="0" cy="0"/>
+          <a:chOff x="0" y="0"/>
+          <a:chExt cx="0" cy="0"/>
+        </a:xfrm>
+      </p:grpSpPr>
+      <p:sp>
+        <p:nvSpPr>
+          <p:cNvPr id="151" name="Shape 151"/>
+          <p:cNvSpPr txBox="1"/>
           <p:nvPr/>
         </p:nvSpPr>
         <p:spPr>
@@ -6764,11 +7163,7 @@
             </a:pPr>
             <a:r>
               <a:rPr lang="es"/>
-              <a:t>S</a:t>
-            </a:r>
-            <a:r>
-              <a:rPr lang="es"/>
-              <a:t>equence diagrams </a:t>
+              <a:t>Changes from last iteration</a:t>
             </a:r>
           </a:p>
           <a:p>
@@ -6783,7 +7178,11 @@
             </a:pPr>
             <a:r>
               <a:rPr lang="es"/>
-              <a:t>Class diagram</a:t>
+              <a:t>S</a:t>
+            </a:r>
+            <a:r>
+              <a:rPr lang="es"/>
+              <a:t>equence diagrams </a:t>
             </a:r>
           </a:p>
           <a:p>
@@ -6798,7 +7197,7 @@
             </a:pPr>
             <a:r>
               <a:rPr lang="es"/>
-              <a:t>System test cases</a:t>
+              <a:t>Class diagram</a:t>
             </a:r>
           </a:p>
           <a:p>
@@ -6813,7 +7212,22 @@
             </a:pPr>
             <a:r>
               <a:rPr lang="es"/>
-              <a:t> JUnit test cases.</a:t>
+              <a:t>System test cases</a:t>
+            </a:r>
+          </a:p>
+          <a:p>
+            <a:pPr indent="-342900" lvl="0" marL="457200" rtl="0">
+              <a:lnSpc>
+                <a:spcPct val="200000"/>
+              </a:lnSpc>
+              <a:spcBef>
+                <a:spcPts val="0"/>
+              </a:spcBef>
+              <a:buChar char="●"/>
+            </a:pPr>
+            <a:r>
+              <a:rPr lang="es"/>
+              <a:t>JUnit test cases.</a:t>
             </a:r>
           </a:p>
           <a:p>
@@ -6907,7 +7321,7 @@
                 <a:cs typeface="Cambria"/>
                 <a:sym typeface="Cambria"/>
               </a:rPr>
-              <a:t>Sequence diagrams </a:t>
+              <a:t>Domain Model Changes</a:t>
             </a:r>
           </a:p>
         </p:txBody>
@@ -6923,7 +7337,7 @@
         <p:spPr>
           <a:xfrm>
             <a:off x="311700" y="1152475"/>
-            <a:ext cx="8520600" cy="3416400"/>
+            <a:ext cx="4112100" cy="3416400"/>
           </a:xfrm>
           <a:prstGeom prst="rect">
             <a:avLst/>
@@ -6937,7 +7351,7 @@
           <a:p>
             <a:pPr indent="-342900" lvl="0" marL="457200" rtl="0">
               <a:lnSpc>
-                <a:spcPct val="200000"/>
+                <a:spcPct val="115000"/>
               </a:lnSpc>
               <a:spcBef>
                 <a:spcPts val="0"/>
@@ -6946,71 +7360,91 @@
             </a:pPr>
             <a:r>
               <a:rPr lang="es"/>
-              <a:t>Login</a:t>
-            </a:r>
-          </a:p>
-          <a:p>
-            <a:pPr indent="-342900" lvl="0" marL="457200" rtl="0">
+              <a:t>Removed </a:t>
+            </a:r>
+            <a:r>
+              <a:rPr i="1" lang="es"/>
+              <a:t>piece</a:t>
+            </a:r>
+            <a:r>
+              <a:rPr lang="es"/>
+              <a:t> from </a:t>
+            </a:r>
+            <a:r>
+              <a:rPr b="1" lang="es"/>
+              <a:t>BoardSquare</a:t>
+            </a:r>
+            <a:r>
+              <a:rPr lang="es"/>
+              <a:t> and </a:t>
+            </a:r>
+            <a:r>
+              <a:rPr i="1" lang="es"/>
+              <a:t>players</a:t>
+            </a:r>
+            <a:r>
+              <a:rPr lang="es"/>
+              <a:t> from </a:t>
+            </a:r>
+            <a:r>
+              <a:rPr b="1" lang="es"/>
+              <a:t>Game</a:t>
+            </a:r>
+            <a:r>
+              <a:rPr lang="es"/>
+              <a:t>.</a:t>
+            </a:r>
+          </a:p>
+          <a:p>
+            <a:pPr indent="-317500" lvl="1" marL="914400" rtl="0">
               <a:lnSpc>
-                <a:spcPct val="200000"/>
+                <a:spcPct val="115000"/>
               </a:lnSpc>
               <a:spcBef>
                 <a:spcPts val="0"/>
               </a:spcBef>
-              <a:buChar char="●"/>
+              <a:buChar char="○"/>
             </a:pPr>
             <a:r>
               <a:rPr lang="es"/>
-              <a:t>Game Invite</a:t>
-            </a:r>
-          </a:p>
-          <a:p>
-            <a:pPr indent="-342900" lvl="0" marL="457200" rtl="0">
-              <a:lnSpc>
-                <a:spcPct val="200000"/>
-              </a:lnSpc>
-              <a:spcBef>
-                <a:spcPts val="0"/>
-              </a:spcBef>
-              <a:buChar char="●"/>
-            </a:pPr>
-            <a:r>
-              <a:rPr lang="es"/>
-              <a:t>Game Create</a:t>
-            </a:r>
-          </a:p>
-          <a:p>
-            <a:pPr indent="-342900" lvl="0" marL="457200" rtl="0">
-              <a:lnSpc>
-                <a:spcPct val="200000"/>
-              </a:lnSpc>
-              <a:spcBef>
-                <a:spcPts val="0"/>
-              </a:spcBef>
-              <a:buChar char="●"/>
-            </a:pPr>
-            <a:r>
-              <a:rPr lang="es"/>
-              <a:t> Register</a:t>
-            </a:r>
-          </a:p>
-          <a:p>
-            <a:pPr indent="-342900" lvl="0" marL="457200" rtl="0">
-              <a:lnSpc>
-                <a:spcPct val="200000"/>
-              </a:lnSpc>
-              <a:spcBef>
-                <a:spcPts val="0"/>
-              </a:spcBef>
-              <a:buChar char="●"/>
-            </a:pPr>
-            <a:r>
-              <a:rPr lang="es"/>
-              <a:t>Take Turn</a:t>
+              <a:t>To keep notation consistent (association vs attribute vs both).</a:t>
             </a:r>
           </a:p>
         </p:txBody>
       </p:sp>
+      <p:pic>
+        <p:nvPicPr>
+          <p:cNvPr descr="Domain Model - Domain Model (1).png" id="71" name="Shape 71"/>
+          <p:cNvPicPr preferRelativeResize="0"/>
+          <p:nvPr/>
+        </p:nvPicPr>
+        <p:blipFill rotWithShape="1">
+          <a:blip r:embed="rId3">
+            <a:alphaModFix/>
+          </a:blip>
+          <a:srcRect b="0" l="10648" r="10648" t="0"/>
+          <a:stretch/>
+        </p:blipFill>
+        <p:spPr>
+          <a:xfrm>
+            <a:off x="4378425" y="445025"/>
+            <a:ext cx="4295101" cy="4217099"/>
+          </a:xfrm>
+          <a:prstGeom prst="rect">
+            <a:avLst/>
+          </a:prstGeom>
+          <a:noFill/>
+          <a:ln cap="flat" cmpd="sng" w="9525">
+            <a:solidFill>
+              <a:schemeClr val="dk2"/>
+            </a:solidFill>
+            <a:prstDash val="solid"/>
+            <a:round/>
+            <a:headEnd len="med" w="med" type="none"/>
+            <a:tailEnd len="med" w="med" type="none"/>
+          </a:ln>
+        </p:spPr>
+      </p:pic>
     </p:spTree>
   </p:cSld>
   <p:clrMapOvr>
@@ -7031,7 +7465,7 @@
     </p:bg>
     <p:spTree>
       <p:nvGrpSpPr>
-        <p:cNvPr id="74" name="Shape 74"/>
+        <p:cNvPr id="75" name="Shape 75"/>
         <p:cNvGrpSpPr/>
         <p:nvPr/>
       </p:nvGrpSpPr>
@@ -7045,7 +7479,7 @@
       </p:grpSpPr>
       <p:sp>
         <p:nvSpPr>
-          <p:cNvPr id="75" name="Shape 75"/>
+          <p:cNvPr id="76" name="Shape 76"/>
           <p:cNvSpPr txBox="1"/>
           <p:nvPr>
             <p:ph type="title"/>
@@ -7066,10 +7500,16 @@
           </a:bodyPr>
           <a:lstStyle/>
           <a:p>
-            <a:pPr lvl="0" rtl="0" algn="l">
-              <a:spcBef>
-                <a:spcPts val="0"/>
-              </a:spcBef>
+            <a:pPr indent="0" lvl="0" marL="0" marR="0" rtl="0" algn="l">
+              <a:lnSpc>
+                <a:spcPct val="100000"/>
+              </a:lnSpc>
+              <a:spcBef>
+                <a:spcPts val="0"/>
+              </a:spcBef>
+              <a:spcAft>
+                <a:spcPts val="0"/>
+              </a:spcAft>
               <a:buNone/>
             </a:pPr>
             <a:r>
@@ -7079,14 +7519,88 @@
                 <a:cs typeface="Cambria"/>
                 <a:sym typeface="Cambria"/>
               </a:rPr>
-              <a:t>Login</a:t>
+              <a:t>Glossary</a:t>
+            </a:r>
+            <a:r>
+              <a:rPr b="1" i="1" lang="es">
+                <a:latin typeface="Cambria"/>
+                <a:ea typeface="Cambria"/>
+                <a:cs typeface="Cambria"/>
+                <a:sym typeface="Cambria"/>
+              </a:rPr>
+              <a:t> Changes</a:t>
+            </a:r>
+          </a:p>
+        </p:txBody>
+      </p:sp>
+      <p:sp>
+        <p:nvSpPr>
+          <p:cNvPr id="77" name="Shape 77"/>
+          <p:cNvSpPr txBox="1"/>
+          <p:nvPr>
+            <p:ph idx="1" type="body"/>
+          </p:nvPr>
+        </p:nvSpPr>
+        <p:spPr>
+          <a:xfrm>
+            <a:off x="311700" y="1152475"/>
+            <a:ext cx="4112100" cy="3416400"/>
+          </a:xfrm>
+          <a:prstGeom prst="rect">
+            <a:avLst/>
+          </a:prstGeom>
+        </p:spPr>
+        <p:txBody>
+          <a:bodyPr anchorCtr="0" anchor="t" bIns="91425" lIns="91425" rIns="91425" wrap="square" tIns="91425">
+            <a:noAutofit/>
+          </a:bodyPr>
+          <a:lstStyle/>
+          <a:p>
+            <a:pPr indent="-342900" lvl="0" marL="457200" marR="0" rtl="0" algn="l">
+              <a:lnSpc>
+                <a:spcPct val="115000"/>
+              </a:lnSpc>
+              <a:spcBef>
+                <a:spcPts val="0"/>
+              </a:spcBef>
+              <a:spcAft>
+                <a:spcPts val="1600"/>
+              </a:spcAft>
+              <a:buClr>
+                <a:schemeClr val="dk2"/>
+              </a:buClr>
+              <a:buSzPct val="100000"/>
+              <a:buFont typeface="Arial"/>
+              <a:buChar char="●"/>
+            </a:pPr>
+            <a:r>
+              <a:rPr lang="es"/>
+              <a:t>Added entries for attributes.</a:t>
+            </a:r>
+          </a:p>
+          <a:p>
+            <a:pPr indent="-342900" lvl="0" marL="457200" marR="0" rtl="0" algn="l">
+              <a:lnSpc>
+                <a:spcPct val="115000"/>
+              </a:lnSpc>
+              <a:spcBef>
+                <a:spcPts val="0"/>
+              </a:spcBef>
+              <a:spcAft>
+                <a:spcPts val="1600"/>
+              </a:spcAft>
+              <a:buChar char="●"/>
+            </a:pPr>
+            <a:r>
+              <a:rPr lang="es"/>
+              <a:t>Sorted items alphabetically.</a:t>
             </a:r>
           </a:p>
         </p:txBody>
       </p:sp>
       <p:pic>
         <p:nvPicPr>
-          <p:cNvPr descr="Login.png" id="76" name="Shape 76"/>
+          <p:cNvPr id="78" name="Shape 78"/>
           <p:cNvPicPr preferRelativeResize="0"/>
           <p:nvPr/>
         </p:nvPicPr>
@@ -7094,20 +7608,26 @@
           <a:blip r:embed="rId3">
             <a:alphaModFix/>
           </a:blip>
-          <a:srcRect b="14537" l="5123" r="0" t="0"/>
+          <a:srcRect b="34712" l="0" r="6393" t="3880"/>
           <a:stretch/>
         </p:blipFill>
         <p:spPr>
           <a:xfrm>
-            <a:off x="1257050" y="303000"/>
-            <a:ext cx="6692326" cy="4658698"/>
+            <a:off x="3738075" y="445025"/>
+            <a:ext cx="5289150" cy="4486374"/>
           </a:xfrm>
           <a:prstGeom prst="rect">
             <a:avLst/>
           </a:prstGeom>
           <a:noFill/>
-          <a:ln>
-            <a:noFill/>
+          <a:ln cap="flat" cmpd="sng" w="9525">
+            <a:solidFill>
+              <a:schemeClr val="dk2"/>
+            </a:solidFill>
+            <a:prstDash val="solid"/>
+            <a:round/>
+            <a:headEnd len="med" w="med" type="none"/>
+            <a:tailEnd len="med" w="med" type="none"/>
           </a:ln>
         </p:spPr>
       </p:pic>
@@ -7131,7 +7651,7 @@
     </p:bg>
     <p:spTree>
       <p:nvGrpSpPr>
-        <p:cNvPr id="80" name="Shape 80"/>
+        <p:cNvPr id="82" name="Shape 82"/>
         <p:cNvGrpSpPr/>
         <p:nvPr/>
       </p:nvGrpSpPr>
@@ -7145,7 +7665,7 @@
       </p:grpSpPr>
       <p:sp>
         <p:nvSpPr>
-          <p:cNvPr id="81" name="Shape 81"/>
+          <p:cNvPr id="83" name="Shape 83"/>
           <p:cNvSpPr txBox="1"/>
           <p:nvPr>
             <p:ph type="title"/>
@@ -7153,7 +7673,7 @@
         </p:nvSpPr>
         <p:spPr>
           <a:xfrm>
-            <a:off x="311700" y="209075"/>
+            <a:off x="311700" y="445025"/>
             <a:ext cx="8520600" cy="572700"/>
           </a:xfrm>
           <a:prstGeom prst="rect">
@@ -7166,10 +7686,16 @@
           </a:bodyPr>
           <a:lstStyle/>
           <a:p>
-            <a:pPr lvl="0" rtl="0" algn="l">
-              <a:spcBef>
-                <a:spcPts val="0"/>
-              </a:spcBef>
+            <a:pPr indent="0" lvl="0" marL="0" marR="0" rtl="0" algn="l">
+              <a:lnSpc>
+                <a:spcPct val="100000"/>
+              </a:lnSpc>
+              <a:spcBef>
+                <a:spcPts val="0"/>
+              </a:spcBef>
+              <a:spcAft>
+                <a:spcPts val="0"/>
+              </a:spcAft>
               <a:buNone/>
             </a:pPr>
             <a:r>
@@ -7179,38 +7705,110 @@
                 <a:cs typeface="Cambria"/>
                 <a:sym typeface="Cambria"/>
               </a:rPr>
-              <a:t>Register</a:t>
+              <a:t>Sequence diagrams </a:t>
             </a:r>
           </a:p>
         </p:txBody>
       </p:sp>
-      <p:pic>
-        <p:nvPicPr>
-          <p:cNvPr descr="Sequence Diagrams - Register.png" id="82" name="Shape 82"/>
-          <p:cNvPicPr preferRelativeResize="0"/>
-          <p:nvPr/>
-        </p:nvPicPr>
-        <p:blipFill rotWithShape="1">
-          <a:blip r:embed="rId3">
-            <a:alphaModFix/>
-          </a:blip>
-          <a:srcRect b="13650" l="0" r="2210" t="3016"/>
-          <a:stretch/>
-        </p:blipFill>
-        <p:spPr>
-          <a:xfrm>
-            <a:off x="1363950" y="213562"/>
-            <a:ext cx="7161474" cy="4716376"/>
+      <p:sp>
+        <p:nvSpPr>
+          <p:cNvPr id="84" name="Shape 84"/>
+          <p:cNvSpPr txBox="1"/>
+          <p:nvPr>
+            <p:ph idx="1" type="body"/>
+          </p:nvPr>
+        </p:nvSpPr>
+        <p:spPr>
+          <a:xfrm>
+            <a:off x="311700" y="1152475"/>
+            <a:ext cx="8520600" cy="3416400"/>
           </a:xfrm>
           <a:prstGeom prst="rect">
             <a:avLst/>
           </a:prstGeom>
-          <a:noFill/>
-          <a:ln>
-            <a:noFill/>
-          </a:ln>
-        </p:spPr>
-      </p:pic>
+        </p:spPr>
+        <p:txBody>
+          <a:bodyPr anchorCtr="0" anchor="t" bIns="91425" lIns="91425" rIns="91425" wrap="square" tIns="91425">
+            <a:noAutofit/>
+          </a:bodyPr>
+          <a:lstStyle/>
+          <a:p>
+            <a:pPr indent="-342900" lvl="0" marL="457200" rtl="0">
+              <a:lnSpc>
+                <a:spcPct val="200000"/>
+              </a:lnSpc>
+              <a:spcBef>
+                <a:spcPts val="0"/>
+              </a:spcBef>
+              <a:buChar char="●"/>
+            </a:pPr>
+            <a:r>
+              <a:rPr lang="es"/>
+              <a:t>Login</a:t>
+            </a:r>
+          </a:p>
+          <a:p>
+            <a:pPr indent="-342900" lvl="0" marL="457200" rtl="0">
+              <a:lnSpc>
+                <a:spcPct val="200000"/>
+              </a:lnSpc>
+              <a:spcBef>
+                <a:spcPts val="0"/>
+              </a:spcBef>
+              <a:buChar char="●"/>
+            </a:pPr>
+            <a:r>
+              <a:rPr lang="es"/>
+              <a:t>Game Invite</a:t>
+            </a:r>
+          </a:p>
+          <a:p>
+            <a:pPr indent="-342900" lvl="0" marL="457200" rtl="0">
+              <a:lnSpc>
+                <a:spcPct val="200000"/>
+              </a:lnSpc>
+              <a:spcBef>
+                <a:spcPts val="0"/>
+              </a:spcBef>
+              <a:buChar char="●"/>
+            </a:pPr>
+            <a:r>
+              <a:rPr lang="es"/>
+              <a:t>Game Create</a:t>
+            </a:r>
+          </a:p>
+          <a:p>
+            <a:pPr indent="-342900" lvl="0" marL="457200" rtl="0">
+              <a:lnSpc>
+                <a:spcPct val="200000"/>
+              </a:lnSpc>
+              <a:spcBef>
+                <a:spcPts val="0"/>
+              </a:spcBef>
+              <a:buChar char="●"/>
+            </a:pPr>
+            <a:r>
+              <a:rPr lang="es"/>
+              <a:t>Register</a:t>
+            </a:r>
+          </a:p>
+          <a:p>
+            <a:pPr indent="-342900" lvl="0" marL="457200" rtl="0">
+              <a:lnSpc>
+                <a:spcPct val="200000"/>
+              </a:lnSpc>
+              <a:spcBef>
+                <a:spcPts val="0"/>
+              </a:spcBef>
+              <a:buChar char="●"/>
+            </a:pPr>
+            <a:r>
+              <a:rPr lang="es"/>
+              <a:t>Take Turn</a:t>
+            </a:r>
+          </a:p>
+        </p:txBody>
+      </p:sp>
     </p:spTree>
   </p:cSld>
   <p:clrMapOvr>
@@ -7231,7 +7829,7 @@
     </p:bg>
     <p:spTree>
       <p:nvGrpSpPr>
-        <p:cNvPr id="86" name="Shape 86"/>
+        <p:cNvPr id="88" name="Shape 88"/>
         <p:cNvGrpSpPr/>
         <p:nvPr/>
       </p:nvGrpSpPr>
@@ -7245,7 +7843,7 @@
       </p:grpSpPr>
       <p:sp>
         <p:nvSpPr>
-          <p:cNvPr id="87" name="Shape 87"/>
+          <p:cNvPr id="89" name="Shape 89"/>
           <p:cNvSpPr txBox="1"/>
           <p:nvPr>
             <p:ph type="title"/>
@@ -7279,23 +7877,14 @@
                 <a:cs typeface="Cambria"/>
                 <a:sym typeface="Cambria"/>
               </a:rPr>
-              <a:t>Game Invite</a:t>
-            </a:r>
-            <a:r>
-              <a:rPr b="1" i="1" lang="es">
-                <a:latin typeface="Cambria"/>
-                <a:ea typeface="Cambria"/>
-                <a:cs typeface="Cambria"/>
-                <a:sym typeface="Cambria"/>
-              </a:rPr>
-              <a:t> </a:t>
+              <a:t>Login</a:t>
             </a:r>
           </a:p>
         </p:txBody>
       </p:sp>
       <p:pic>
         <p:nvPicPr>
-          <p:cNvPr descr="Game Invite.png" id="88" name="Shape 88"/>
+          <p:cNvPr descr="Login.png" id="90" name="Shape 90"/>
           <p:cNvPicPr preferRelativeResize="0"/>
           <p:nvPr/>
         </p:nvPicPr>
@@ -7303,13 +7892,13 @@
           <a:blip r:embed="rId3">
             <a:alphaModFix/>
           </a:blip>
-          <a:srcRect b="37984" l="0" r="21042" t="0"/>
+          <a:srcRect b="14537" l="5123" r="0" t="0"/>
           <a:stretch/>
         </p:blipFill>
         <p:spPr>
           <a:xfrm>
-            <a:off x="997650" y="1017725"/>
-            <a:ext cx="7433449" cy="3872474"/>
+            <a:off x="1257050" y="303000"/>
+            <a:ext cx="6692326" cy="4658698"/>
           </a:xfrm>
           <a:prstGeom prst="rect">
             <a:avLst/>
@@ -7340,7 +7929,7 @@
     </p:bg>
     <p:spTree>
       <p:nvGrpSpPr>
-        <p:cNvPr id="92" name="Shape 92"/>
+        <p:cNvPr id="94" name="Shape 94"/>
         <p:cNvGrpSpPr/>
         <p:nvPr/>
       </p:nvGrpSpPr>
@@ -7354,7 +7943,7 @@
       </p:grpSpPr>
       <p:sp>
         <p:nvSpPr>
-          <p:cNvPr id="93" name="Shape 93"/>
+          <p:cNvPr id="95" name="Shape 95"/>
           <p:cNvSpPr txBox="1"/>
           <p:nvPr>
             <p:ph type="title"/>
@@ -7362,7 +7951,7 @@
         </p:nvSpPr>
         <p:spPr>
           <a:xfrm>
-            <a:off x="311700" y="114700"/>
+            <a:off x="311700" y="209075"/>
             <a:ext cx="8520600" cy="572700"/>
           </a:xfrm>
           <a:prstGeom prst="rect">
@@ -7388,23 +7977,14 @@
                 <a:cs typeface="Cambria"/>
                 <a:sym typeface="Cambria"/>
               </a:rPr>
-              <a:t>Create G</a:t>
-            </a:r>
-            <a:r>
-              <a:rPr b="1" i="1" lang="es">
-                <a:latin typeface="Cambria"/>
-                <a:ea typeface="Cambria"/>
-                <a:cs typeface="Cambria"/>
-                <a:sym typeface="Cambria"/>
-              </a:rPr>
-              <a:t>ame </a:t>
+              <a:t>Register</a:t>
             </a:r>
           </a:p>
         </p:txBody>
       </p:sp>
       <p:pic>
         <p:nvPicPr>
-          <p:cNvPr descr="Create Game.png" id="94" name="Shape 94"/>
+          <p:cNvPr descr="Sequence Diagrams - Register.png" id="96" name="Shape 96"/>
           <p:cNvPicPr preferRelativeResize="0"/>
           <p:nvPr/>
         </p:nvPicPr>
@@ -7412,13 +7992,13 @@
           <a:blip r:embed="rId3">
             <a:alphaModFix/>
           </a:blip>
-          <a:srcRect b="21544" l="0" r="0" t="0"/>
+          <a:srcRect b="13650" l="0" r="2210" t="3016"/>
           <a:stretch/>
         </p:blipFill>
         <p:spPr>
           <a:xfrm>
-            <a:off x="2031375" y="-93500"/>
-            <a:ext cx="6359551" cy="5237001"/>
+            <a:off x="1363950" y="213562"/>
+            <a:ext cx="7161474" cy="4716376"/>
           </a:xfrm>
           <a:prstGeom prst="rect">
             <a:avLst/>
@@ -7449,7 +8029,7 @@
     </p:bg>
     <p:spTree>
       <p:nvGrpSpPr>
-        <p:cNvPr id="98" name="Shape 98"/>
+        <p:cNvPr id="100" name="Shape 100"/>
         <p:cNvGrpSpPr/>
         <p:nvPr/>
       </p:nvGrpSpPr>
@@ -7461,24 +8041,73 @@
           <a:chExt cx="0" cy="0"/>
         </a:xfrm>
       </p:grpSpPr>
+      <p:sp>
+        <p:nvSpPr>
+          <p:cNvPr id="101" name="Shape 101"/>
+          <p:cNvSpPr txBox="1"/>
+          <p:nvPr>
+            <p:ph type="title"/>
+          </p:nvPr>
+        </p:nvSpPr>
+        <p:spPr>
+          <a:xfrm>
+            <a:off x="311700" y="445025"/>
+            <a:ext cx="8520600" cy="572700"/>
+          </a:xfrm>
+          <a:prstGeom prst="rect">
+            <a:avLst/>
+          </a:prstGeom>
+        </p:spPr>
+        <p:txBody>
+          <a:bodyPr anchorCtr="0" anchor="t" bIns="91425" lIns="91425" rIns="91425" wrap="square" tIns="91425">
+            <a:noAutofit/>
+          </a:bodyPr>
+          <a:lstStyle/>
+          <a:p>
+            <a:pPr lvl="0" rtl="0" algn="l">
+              <a:spcBef>
+                <a:spcPts val="0"/>
+              </a:spcBef>
+              <a:buNone/>
+            </a:pPr>
+            <a:r>
+              <a:rPr b="1" i="1" lang="es">
+                <a:latin typeface="Cambria"/>
+                <a:ea typeface="Cambria"/>
+                <a:cs typeface="Cambria"/>
+                <a:sym typeface="Cambria"/>
+              </a:rPr>
+              <a:t>Game Invite</a:t>
+            </a:r>
+            <a:r>
+              <a:rPr b="1" i="1" lang="es">
+                <a:latin typeface="Cambria"/>
+                <a:ea typeface="Cambria"/>
+                <a:cs typeface="Cambria"/>
+                <a:sym typeface="Cambria"/>
+              </a:rPr>
+              <a:t> </a:t>
+            </a:r>
+          </a:p>
+        </p:txBody>
+      </p:sp>
       <p:pic>
         <p:nvPicPr>
-          <p:cNvPr id="99" name="Shape 99"/>
+          <p:cNvPr descr="Game Invite.png" id="102" name="Shape 102"/>
           <p:cNvPicPr preferRelativeResize="0"/>
           <p:nvPr/>
         </p:nvPicPr>
-        <p:blipFill>
+        <p:blipFill rotWithShape="1">
           <a:blip r:embed="rId3">
             <a:alphaModFix/>
           </a:blip>
-          <a:stretch>
-            <a:fillRect/>
-          </a:stretch>
+          <a:srcRect b="37984" l="0" r="21042" t="0"/>
+          <a:stretch/>
         </p:blipFill>
         <p:spPr>
           <a:xfrm>
-            <a:off x="3387850" y="221525"/>
-            <a:ext cx="4181475" cy="4476750"/>
+            <a:off x="997650" y="1017725"/>
+            <a:ext cx="7433449" cy="3872474"/>
           </a:xfrm>
           <a:prstGeom prst="rect">
             <a:avLst/>
@@ -7489,52 +8118,6 @@
           </a:ln>
         </p:spPr>
       </p:pic>
-      <p:sp>
-        <p:nvSpPr>
-          <p:cNvPr id="100" name="Shape 100"/>
-          <p:cNvSpPr txBox="1"/>
-          <p:nvPr/>
-        </p:nvSpPr>
-        <p:spPr>
-          <a:xfrm>
-            <a:off x="0" y="0"/>
-            <a:ext cx="3000000" cy="698100"/>
-          </a:xfrm>
-          <a:prstGeom prst="rect">
-            <a:avLst/>
-          </a:prstGeom>
-          <a:noFill/>
-          <a:ln>
-            <a:noFill/>
-          </a:ln>
-        </p:spPr>
-        <p:txBody>
-          <a:bodyPr anchorCtr="0" anchor="ctr" bIns="91425" lIns="91425" rIns="91425" wrap="square" tIns="91425">
-            <a:noAutofit/>
-          </a:bodyPr>
-          <a:lstStyle/>
-          <a:p>
-            <a:pPr lvl="0" rtl="0">
-              <a:spcBef>
-                <a:spcPts val="0"/>
-              </a:spcBef>
-              <a:buNone/>
-            </a:pPr>
-            <a:r>
-              <a:rPr b="1" i="1" lang="es" sz="2800">
-                <a:solidFill>
-                  <a:schemeClr val="dk1"/>
-                </a:solidFill>
-                <a:latin typeface="Cambria"/>
-                <a:ea typeface="Cambria"/>
-                <a:cs typeface="Cambria"/>
-                <a:sym typeface="Cambria"/>
-              </a:rPr>
-              <a:t>Class Diagram</a:t>
-            </a:r>
-          </a:p>
-        </p:txBody>
-      </p:sp>
     </p:spTree>
   </p:cSld>
   <p:clrMapOvr>
@@ -7555,7 +8138,7 @@
     </p:bg>
     <p:spTree>
       <p:nvGrpSpPr>
-        <p:cNvPr id="104" name="Shape 104"/>
+        <p:cNvPr id="106" name="Shape 106"/>
         <p:cNvGrpSpPr/>
         <p:nvPr/>
       </p:nvGrpSpPr>
@@ -7569,7 +8152,7 @@
       </p:grpSpPr>
       <p:sp>
         <p:nvSpPr>
-          <p:cNvPr id="105" name="Shape 105"/>
+          <p:cNvPr id="107" name="Shape 107"/>
           <p:cNvSpPr txBox="1"/>
           <p:nvPr>
             <p:ph type="title"/>
@@ -7603,29 +8186,37 @@
                 <a:cs typeface="Cambria"/>
                 <a:sym typeface="Cambria"/>
               </a:rPr>
-              <a:t>Class Diagram</a:t>
+              <a:t>Create G</a:t>
+            </a:r>
+            <a:r>
+              <a:rPr b="1" i="1" lang="es">
+                <a:latin typeface="Cambria"/>
+                <a:ea typeface="Cambria"/>
+                <a:cs typeface="Cambria"/>
+                <a:sym typeface="Cambria"/>
+              </a:rPr>
+              <a:t>ame </a:t>
             </a:r>
           </a:p>
         </p:txBody>
       </p:sp>
       <p:pic>
         <p:nvPicPr>
-          <p:cNvPr id="106" name="Shape 106"/>
+          <p:cNvPr descr="Create Game.png" id="108" name="Shape 108"/>
           <p:cNvPicPr preferRelativeResize="0"/>
           <p:nvPr/>
         </p:nvPicPr>
-        <p:blipFill>
+        <p:blipFill rotWithShape="1">
           <a:blip r:embed="rId3">
             <a:alphaModFix/>
           </a:blip>
-          <a:stretch>
-            <a:fillRect/>
-          </a:stretch>
+          <a:srcRect b="21544" l="0" r="0" t="0"/>
+          <a:stretch/>
         </p:blipFill>
         <p:spPr>
           <a:xfrm>
-            <a:off x="152400" y="839800"/>
-            <a:ext cx="7963901" cy="4223700"/>
+            <a:off x="2031375" y="-93500"/>
+            <a:ext cx="6359551" cy="5237001"/>
           </a:xfrm>
           <a:prstGeom prst="rect">
             <a:avLst/>
@@ -7645,6 +8236,285 @@
 </file>
 
 <file path=ppt/theme/theme1.xml><?xml version="1.0" encoding="utf-8"?>
+<a:theme xmlns:a="http://schemas.openxmlformats.org/drawingml/2006/main" xmlns:r="http://schemas.openxmlformats.org/officeDocument/2006/relationships" name="Simple Light">
+  <a:themeElements>
+    <a:clrScheme name="Simple Light">
+      <a:dk1>
+        <a:srgbClr val="000000"/>
+      </a:dk1>
+      <a:lt1>
+        <a:srgbClr val="FFFFFF"/>
+      </a:lt1>
+      <a:dk2>
+        <a:srgbClr val="595959"/>
+      </a:dk2>
+      <a:lt2>
+        <a:srgbClr val="EEEEEE"/>
+      </a:lt2>
+      <a:accent1>
+        <a:srgbClr val="FFAB40"/>
+      </a:accent1>
+      <a:accent2>
+        <a:srgbClr val="212121"/>
+      </a:accent2>
+      <a:accent3>
+        <a:srgbClr val="78909C"/>
+      </a:accent3>
+      <a:accent4>
+        <a:srgbClr val="FFAB40"/>
+      </a:accent4>
+      <a:accent5>
+        <a:srgbClr val="0097A7"/>
+      </a:accent5>
+      <a:accent6>
+        <a:srgbClr val="EEFF41"/>
+      </a:accent6>
+      <a:hlink>
+        <a:srgbClr val="0097A7"/>
+      </a:hlink>
+      <a:folHlink>
+        <a:srgbClr val="0097A7"/>
+      </a:folHlink>
+    </a:clrScheme>
+    <a:fontScheme name="Office">
+      <a:majorFont>
+        <a:latin typeface="Arial"/>
+        <a:ea typeface=""/>
+        <a:cs typeface=""/>
+        <a:font script="Jpan" typeface="ＭＳ Ｐゴシック"/>
+        <a:font script="Hang" typeface="맑은 고딕"/>
+        <a:font script="Hans" typeface="宋体"/>
+        <a:font script="Hant" typeface="新細明體"/>
+        <a:font script="Arab" typeface="Times New Roman"/>
+        <a:font script="Hebr" typeface="Times New Roman"/>
+        <a:font script="Thai" typeface="Angsana New"/>
+        <a:font script="Ethi" typeface="Nyala"/>
+        <a:font script="Beng" typeface="Vrinda"/>
+        <a:font script="Gujr" typeface="Shruti"/>
+        <a:font script="Khmr" typeface="MoolBoran"/>
+        <a:font script="Knda" typeface="Tunga"/>
+        <a:font script="Guru" typeface="Raavi"/>
+        <a:font script="Cans" typeface="Euphemia"/>
+        <a:font script="Cher" typeface="Plantagenet Cherokee"/>
+        <a:font script="Yiii" typeface="Microsoft Yi Baiti"/>
+        <a:font script="Tibt" typeface="Microsoft Himalaya"/>
+        <a:font script="Thaa" typeface="MV Boli"/>
+        <a:font script="Deva" typeface="Mangal"/>
+        <a:font script="Telu" typeface="Gautami"/>
+        <a:font script="Taml" typeface="Latha"/>
+        <a:font script="Syrc" typeface="Estrangelo Edessa"/>
+        <a:font script="Orya" typeface="Kalinga"/>
+        <a:font script="Mlym" typeface="Kartika"/>
+        <a:font script="Laoo" typeface="DokChampa"/>
+        <a:font script="Sinh" typeface="Iskoola Pota"/>
+        <a:font script="Mong" typeface="Mongolian Baiti"/>
+        <a:font script="Viet" typeface="Times New Roman"/>
+        <a:font script="Uigh" typeface="Microsoft Uighur"/>
+        <a:font script="Geor" typeface="Sylfaen"/>
+      </a:majorFont>
+      <a:minorFont>
+        <a:latin typeface="Arial"/>
+        <a:ea typeface=""/>
+        <a:cs typeface=""/>
+        <a:font script="Jpan" typeface="ＭＳ Ｐゴシック"/>
+        <a:font script="Hang" typeface="맑은 고딕"/>
+        <a:font script="Hans" typeface="宋体"/>
+        <a:font script="Hant" typeface="新細明體"/>
+        <a:font script="Arab" typeface="Arial"/>
+        <a:font script="Hebr" typeface="Arial"/>
+        <a:font script="Thai" typeface="Cordia New"/>
+        <a:font script="Ethi" typeface="Nyala"/>
+        <a:font script="Beng" typeface="Vrinda"/>
+        <a:font script="Gujr" typeface="Shruti"/>
+        <a:font script="Khmr" typeface="DaunPenh"/>
+        <a:font script="Knda" typeface="Tunga"/>
+        <a:font script="Guru" typeface="Raavi"/>
+        <a:font script="Cans" typeface="Euphemia"/>
+        <a:font script="Cher" typeface="Plantagenet Cherokee"/>
+        <a:font script="Yiii" typeface="Microsoft Yi Baiti"/>
+        <a:font script="Tibt" typeface="Microsoft Himalaya"/>
+        <a:font script="Thaa" typeface="MV Boli"/>
+        <a:font script="Deva" typeface="Mangal"/>
+        <a:font script="Telu" typeface="Gautami"/>
+        <a:font script="Taml" typeface="Latha"/>
+        <a:font script="Syrc" typeface="Estrangelo Edessa"/>
+        <a:font script="Orya" typeface="Kalinga"/>
+        <a:font script="Mlym" typeface="Kartika"/>
+        <a:font script="Laoo" typeface="DokChampa"/>
+        <a:font script="Sinh" typeface="Iskoola Pota"/>
+        <a:font script="Mong" typeface="Mongolian Baiti"/>
+        <a:font script="Viet" typeface="Arial"/>
+        <a:font script="Uigh" typeface="Microsoft Uighur"/>
+        <a:font script="Geor" typeface="Sylfaen"/>
+      </a:minorFont>
+    </a:fontScheme>
+    <a:fmtScheme name="Office">
+      <a:fillStyleLst>
+        <a:solidFill>
+          <a:schemeClr val="phClr"/>
+        </a:solidFill>
+        <a:gradFill rotWithShape="1">
+          <a:gsLst>
+            <a:gs pos="0">
+              <a:schemeClr val="phClr">
+                <a:tint val="50000"/>
+                <a:satMod val="300000"/>
+              </a:schemeClr>
+            </a:gs>
+            <a:gs pos="35000">
+              <a:schemeClr val="phClr">
+                <a:tint val="37000"/>
+                <a:satMod val="300000"/>
+              </a:schemeClr>
+            </a:gs>
+            <a:gs pos="100000">
+              <a:schemeClr val="phClr">
+                <a:tint val="15000"/>
+                <a:satMod val="350000"/>
+              </a:schemeClr>
+            </a:gs>
+          </a:gsLst>
+          <a:lin ang="16200000" scaled="1"/>
+        </a:gradFill>
+        <a:gradFill rotWithShape="1">
+          <a:gsLst>
+            <a:gs pos="0">
+              <a:schemeClr val="phClr">
+                <a:tint val="100000"/>
+                <a:shade val="100000"/>
+                <a:satMod val="130000"/>
+              </a:schemeClr>
+            </a:gs>
+            <a:gs pos="100000">
+              <a:schemeClr val="phClr">
+                <a:tint val="50000"/>
+                <a:shade val="100000"/>
+                <a:satMod val="350000"/>
+              </a:schemeClr>
+            </a:gs>
+          </a:gsLst>
+          <a:lin ang="16200000" scaled="0"/>
+        </a:gradFill>
+      </a:fillStyleLst>
+      <a:lnStyleLst>
+        <a:ln w="9525" cap="flat" cmpd="sng" algn="ctr">
+          <a:solidFill>
+            <a:schemeClr val="phClr">
+              <a:shade val="95000"/>
+              <a:satMod val="105000"/>
+            </a:schemeClr>
+          </a:solidFill>
+          <a:prstDash val="solid"/>
+        </a:ln>
+        <a:ln w="25400" cap="flat" cmpd="sng" algn="ctr">
+          <a:solidFill>
+            <a:schemeClr val="phClr"/>
+          </a:solidFill>
+          <a:prstDash val="solid"/>
+        </a:ln>
+        <a:ln w="38100" cap="flat" cmpd="sng" algn="ctr">
+          <a:solidFill>
+            <a:schemeClr val="phClr"/>
+          </a:solidFill>
+          <a:prstDash val="solid"/>
+        </a:ln>
+      </a:lnStyleLst>
+      <a:effectStyleLst>
+        <a:effectStyle>
+          <a:effectLst>
+            <a:outerShdw blurRad="40000" dist="20000" dir="5400000" rotWithShape="0">
+              <a:srgbClr val="000000">
+                <a:alpha val="38000"/>
+              </a:srgbClr>
+            </a:outerShdw>
+          </a:effectLst>
+        </a:effectStyle>
+        <a:effectStyle>
+          <a:effectLst>
+            <a:outerShdw blurRad="40000" dist="23000" dir="5400000" rotWithShape="0">
+              <a:srgbClr val="000000">
+                <a:alpha val="35000"/>
+              </a:srgbClr>
+            </a:outerShdw>
+          </a:effectLst>
+        </a:effectStyle>
+        <a:effectStyle>
+          <a:effectLst>
+            <a:outerShdw blurRad="40000" dist="23000" dir="5400000" rotWithShape="0">
+              <a:srgbClr val="000000">
+                <a:alpha val="35000"/>
+              </a:srgbClr>
+            </a:outerShdw>
+          </a:effectLst>
+          <a:scene3d>
+            <a:camera prst="orthographicFront">
+              <a:rot lat="0" lon="0" rev="0"/>
+            </a:camera>
+            <a:lightRig rig="threePt" dir="t">
+              <a:rot lat="0" lon="0" rev="1200000"/>
+            </a:lightRig>
+          </a:scene3d>
+          <a:sp3d>
+            <a:bevelT w="63500" h="25400"/>
+          </a:sp3d>
+        </a:effectStyle>
+      </a:effectStyleLst>
+      <a:bgFillStyleLst>
+        <a:solidFill>
+          <a:schemeClr val="phClr"/>
+        </a:solidFill>
+        <a:gradFill rotWithShape="1">
+          <a:gsLst>
+            <a:gs pos="0">
+              <a:schemeClr val="phClr">
+                <a:tint val="40000"/>
+                <a:satMod val="350000"/>
+              </a:schemeClr>
+            </a:gs>
+            <a:gs pos="40000">
+              <a:schemeClr val="phClr">
+                <a:tint val="45000"/>
+                <a:shade val="99000"/>
+                <a:satMod val="350000"/>
+              </a:schemeClr>
+            </a:gs>
+            <a:gs pos="100000">
+              <a:schemeClr val="phClr">
+                <a:shade val="20000"/>
+                <a:satMod val="255000"/>
+              </a:schemeClr>
+            </a:gs>
+          </a:gsLst>
+          <a:path path="circle">
+            <a:fillToRect l="50000" t="-80000" r="50000" b="180000"/>
+          </a:path>
+        </a:gradFill>
+        <a:gradFill rotWithShape="1">
+          <a:gsLst>
+            <a:gs pos="0">
+              <a:schemeClr val="phClr">
+                <a:tint val="80000"/>
+                <a:satMod val="300000"/>
+              </a:schemeClr>
+            </a:gs>
+            <a:gs pos="100000">
+              <a:schemeClr val="phClr">
+                <a:shade val="30000"/>
+                <a:satMod val="200000"/>
+              </a:schemeClr>
+            </a:gs>
+          </a:gsLst>
+          <a:path path="circle">
+            <a:fillToRect l="50000" t="50000" r="50000" b="50000"/>
+          </a:path>
+        </a:gradFill>
+      </a:bgFillStyleLst>
+    </a:fmtScheme>
+  </a:themeElements>
+</a:theme>
+</file>
+
+<file path=ppt/theme/theme2.xml><?xml version="1.0" encoding="utf-8"?>
 <a:theme xmlns:a="http://schemas.openxmlformats.org/drawingml/2006/main" xmlns:r="http://schemas.openxmlformats.org/officeDocument/2006/relationships" name="Custom Theme">
   <a:themeElements>
     <a:clrScheme name="Default">
@@ -7921,283 +8791,4 @@
     </a:fmtScheme>
   </a:themeElements>
 </a:theme>
-</file>
-
-<file path=ppt/theme/theme2.xml><?xml version="1.0" encoding="utf-8"?>
-<a:theme xmlns:a="http://schemas.openxmlformats.org/drawingml/2006/main" xmlns:r="http://schemas.openxmlformats.org/officeDocument/2006/relationships" name="Simple Light">
-  <a:themeElements>
-    <a:clrScheme name="Simple Light">
-      <a:dk1>
-        <a:srgbClr val="000000"/>
-      </a:dk1>
-      <a:lt1>
-        <a:srgbClr val="FFFFFF"/>
-      </a:lt1>
-      <a:dk2>
-        <a:srgbClr val="595959"/>
-      </a:dk2>
-      <a:lt2>
-        <a:srgbClr val="EEEEEE"/>
-      </a:lt2>
-      <a:accent1>
-        <a:srgbClr val="FFAB40"/>
-      </a:accent1>
-      <a:accent2>
-        <a:srgbClr val="212121"/>
-      </a:accent2>
-      <a:accent3>
-        <a:srgbClr val="78909C"/>
-      </a:accent3>
-      <a:accent4>
-        <a:srgbClr val="FFAB40"/>
-      </a:accent4>
-      <a:accent5>
-        <a:srgbClr val="0097A7"/>
-      </a:accent5>
-      <a:accent6>
-        <a:srgbClr val="EEFF41"/>
-      </a:accent6>
-      <a:hlink>
-        <a:srgbClr val="0097A7"/>
-      </a:hlink>
-      <a:folHlink>
-        <a:srgbClr val="0097A7"/>
-      </a:folHlink>
-    </a:clrScheme>
-    <a:fontScheme name="Office">
-      <a:majorFont>
-        <a:latin typeface="Arial"/>
-        <a:ea typeface=""/>
-        <a:cs typeface=""/>
-        <a:font script="Jpan" typeface="ＭＳ Ｐゴシック"/>
-        <a:font script="Hang" typeface="맑은 고딕"/>
-        <a:font script="Hans" typeface="宋体"/>
-        <a:font script="Hant" typeface="新細明體"/>
-        <a:font script="Arab" typeface="Times New Roman"/>
-        <a:font script="Hebr" typeface="Times New Roman"/>
-        <a:font script="Thai" typeface="Angsana New"/>
-        <a:font script="Ethi" typeface="Nyala"/>
-        <a:font script="Beng" typeface="Vrinda"/>
-        <a:font script="Gujr" typeface="Shruti"/>
-        <a:font script="Khmr" typeface="MoolBoran"/>
-        <a:font script="Knda" typeface="Tunga"/>
-        <a:font script="Guru" typeface="Raavi"/>
-        <a:font script="Cans" typeface="Euphemia"/>
-        <a:font script="Cher" typeface="Plantagenet Cherokee"/>
-        <a:font script="Yiii" typeface="Microsoft Yi Baiti"/>
-        <a:font script="Tibt" typeface="Microsoft Himalaya"/>
-        <a:font script="Thaa" typeface="MV Boli"/>
-        <a:font script="Deva" typeface="Mangal"/>
-        <a:font script="Telu" typeface="Gautami"/>
-        <a:font script="Taml" typeface="Latha"/>
-        <a:font script="Syrc" typeface="Estrangelo Edessa"/>
-        <a:font script="Orya" typeface="Kalinga"/>
-        <a:font script="Mlym" typeface="Kartika"/>
-        <a:font script="Laoo" typeface="DokChampa"/>
-        <a:font script="Sinh" typeface="Iskoola Pota"/>
-        <a:font script="Mong" typeface="Mongolian Baiti"/>
-        <a:font script="Viet" typeface="Times New Roman"/>
-        <a:font script="Uigh" typeface="Microsoft Uighur"/>
-        <a:font script="Geor" typeface="Sylfaen"/>
-      </a:majorFont>
-      <a:minorFont>
-        <a:latin typeface="Arial"/>
-        <a:ea typeface=""/>
-        <a:cs typeface=""/>
-        <a:font script="Jpan" typeface="ＭＳ Ｐゴシック"/>
-        <a:font script="Hang" typeface="맑은 고딕"/>
-        <a:font script="Hans" typeface="宋体"/>
-        <a:font script="Hant" typeface="新細明體"/>
-        <a:font script="Arab" typeface="Arial"/>
-        <a:font script="Hebr" typeface="Arial"/>
-        <a:font script="Thai" typeface="Cordia New"/>
-        <a:font script="Ethi" typeface="Nyala"/>
-        <a:font script="Beng" typeface="Vrinda"/>
-        <a:font script="Gujr" typeface="Shruti"/>
-        <a:font script="Khmr" typeface="DaunPenh"/>
-        <a:font script="Knda" typeface="Tunga"/>
-        <a:font script="Guru" typeface="Raavi"/>
-        <a:font script="Cans" typeface="Euphemia"/>
-        <a:font script="Cher" typeface="Plantagenet Cherokee"/>
-        <a:font script="Yiii" typeface="Microsoft Yi Baiti"/>
-        <a:font script="Tibt" typeface="Microsoft Himalaya"/>
-        <a:font script="Thaa" typeface="MV Boli"/>
-        <a:font script="Deva" typeface="Mangal"/>
-        <a:font script="Telu" typeface="Gautami"/>
-        <a:font script="Taml" typeface="Latha"/>
-        <a:font script="Syrc" typeface="Estrangelo Edessa"/>
-        <a:font script="Orya" typeface="Kalinga"/>
-        <a:font script="Mlym" typeface="Kartika"/>
-        <a:font script="Laoo" typeface="DokChampa"/>
-        <a:font script="Sinh" typeface="Iskoola Pota"/>
-        <a:font script="Mong" typeface="Mongolian Baiti"/>
-        <a:font script="Viet" typeface="Arial"/>
-        <a:font script="Uigh" typeface="Microsoft Uighur"/>
-        <a:font script="Geor" typeface="Sylfaen"/>
-      </a:minorFont>
-    </a:fontScheme>
-    <a:fmtScheme name="Office">
-      <a:fillStyleLst>
-        <a:solidFill>
-          <a:schemeClr val="phClr"/>
-        </a:solidFill>
-        <a:gradFill rotWithShape="1">
-          <a:gsLst>
-            <a:gs pos="0">
-              <a:schemeClr val="phClr">
-                <a:tint val="50000"/>
-                <a:satMod val="300000"/>
-              </a:schemeClr>
-            </a:gs>
-            <a:gs pos="35000">
-              <a:schemeClr val="phClr">
-                <a:tint val="37000"/>
-                <a:satMod val="300000"/>
-              </a:schemeClr>
-            </a:gs>
-            <a:gs pos="100000">
-              <a:schemeClr val="phClr">
-                <a:tint val="15000"/>
-                <a:satMod val="350000"/>
-              </a:schemeClr>
-            </a:gs>
-          </a:gsLst>
-          <a:lin ang="16200000" scaled="1"/>
-        </a:gradFill>
-        <a:gradFill rotWithShape="1">
-          <a:gsLst>
-            <a:gs pos="0">
-              <a:schemeClr val="phClr">
-                <a:tint val="100000"/>
-                <a:shade val="100000"/>
-                <a:satMod val="130000"/>
-              </a:schemeClr>
-            </a:gs>
-            <a:gs pos="100000">
-              <a:schemeClr val="phClr">
-                <a:tint val="50000"/>
-                <a:shade val="100000"/>
-                <a:satMod val="350000"/>
-              </a:schemeClr>
-            </a:gs>
-          </a:gsLst>
-          <a:lin ang="16200000" scaled="0"/>
-        </a:gradFill>
-      </a:fillStyleLst>
-      <a:lnStyleLst>
-        <a:ln w="9525" cap="flat" cmpd="sng" algn="ctr">
-          <a:solidFill>
-            <a:schemeClr val="phClr">
-              <a:shade val="95000"/>
-              <a:satMod val="105000"/>
-            </a:schemeClr>
-          </a:solidFill>
-          <a:prstDash val="solid"/>
-        </a:ln>
-        <a:ln w="25400" cap="flat" cmpd="sng" algn="ctr">
-          <a:solidFill>
-            <a:schemeClr val="phClr"/>
-          </a:solidFill>
-          <a:prstDash val="solid"/>
-        </a:ln>
-        <a:ln w="38100" cap="flat" cmpd="sng" algn="ctr">
-          <a:solidFill>
-            <a:schemeClr val="phClr"/>
-          </a:solidFill>
-          <a:prstDash val="solid"/>
-        </a:ln>
-      </a:lnStyleLst>
-      <a:effectStyleLst>
-        <a:effectStyle>
-          <a:effectLst>
-            <a:outerShdw blurRad="40000" dist="20000" dir="5400000" rotWithShape="0">
-              <a:srgbClr val="000000">
-                <a:alpha val="38000"/>
-              </a:srgbClr>
-            </a:outerShdw>
-          </a:effectLst>
-        </a:effectStyle>
-        <a:effectStyle>
-          <a:effectLst>
-            <a:outerShdw blurRad="40000" dist="23000" dir="5400000" rotWithShape="0">
-              <a:srgbClr val="000000">
-                <a:alpha val="35000"/>
-              </a:srgbClr>
-            </a:outerShdw>
-          </a:effectLst>
-        </a:effectStyle>
-        <a:effectStyle>
-          <a:effectLst>
-            <a:outerShdw blurRad="40000" dist="23000" dir="5400000" rotWithShape="0">
-              <a:srgbClr val="000000">
-                <a:alpha val="35000"/>
-              </a:srgbClr>
-            </a:outerShdw>
-          </a:effectLst>
-          <a:scene3d>
-            <a:camera prst="orthographicFront">
-              <a:rot lat="0" lon="0" rev="0"/>
-            </a:camera>
-            <a:lightRig rig="threePt" dir="t">
-              <a:rot lat="0" lon="0" rev="1200000"/>
-            </a:lightRig>
-          </a:scene3d>
-          <a:sp3d>
-            <a:bevelT w="63500" h="25400"/>
-          </a:sp3d>
-        </a:effectStyle>
-      </a:effectStyleLst>
-      <a:bgFillStyleLst>
-        <a:solidFill>
-          <a:schemeClr val="phClr"/>
-        </a:solidFill>
-        <a:gradFill rotWithShape="1">
-          <a:gsLst>
-            <a:gs pos="0">
-              <a:schemeClr val="phClr">
-                <a:tint val="40000"/>
-                <a:satMod val="350000"/>
-              </a:schemeClr>
-            </a:gs>
-            <a:gs pos="40000">
-              <a:schemeClr val="phClr">
-                <a:tint val="45000"/>
-                <a:shade val="99000"/>
-                <a:satMod val="350000"/>
-              </a:schemeClr>
-            </a:gs>
-            <a:gs pos="100000">
-              <a:schemeClr val="phClr">
-                <a:shade val="20000"/>
-                <a:satMod val="255000"/>
-              </a:schemeClr>
-            </a:gs>
-          </a:gsLst>
-          <a:path path="circle">
-            <a:fillToRect l="50000" t="-80000" r="50000" b="180000"/>
-          </a:path>
-        </a:gradFill>
-        <a:gradFill rotWithShape="1">
-          <a:gsLst>
-            <a:gs pos="0">
-              <a:schemeClr val="phClr">
-                <a:tint val="80000"/>
-                <a:satMod val="300000"/>
-              </a:schemeClr>
-            </a:gs>
-            <a:gs pos="100000">
-              <a:schemeClr val="phClr">
-                <a:shade val="30000"/>
-                <a:satMod val="200000"/>
-              </a:schemeClr>
-            </a:gs>
-          </a:gsLst>
-          <a:path path="circle">
-            <a:fillToRect l="50000" t="50000" r="50000" b="50000"/>
-          </a:path>
-        </a:gradFill>
-      </a:bgFillStyleLst>
-    </a:fmtScheme>
-  </a:themeElements>
-</a:theme>
 </file>
</xml_diff>